<commit_message>
Adiciona o status report da semana 29/09
</commit_message>
<xml_diff>
--- a/documentacao/Status Report/Status_Report_-_Grupo_09.pptx
+++ b/documentacao/Status Report/Status_Report_-_Grupo_09.pptx
@@ -7,10 +7,10 @@
     <p:sldMasterId id="2147483665" r:id="rId6"/>
   </p:sldMasterIdLst>
   <p:notesMasterIdLst>
-    <p:notesMasterId r:id="rId13"/>
+    <p:notesMasterId r:id="rId14"/>
   </p:notesMasterIdLst>
   <p:handoutMasterIdLst>
-    <p:handoutMasterId r:id="rId14"/>
+    <p:handoutMasterId r:id="rId15"/>
   </p:handoutMasterIdLst>
   <p:sldIdLst>
     <p:sldId id="344" r:id="rId7"/>
@@ -19,6 +19,7 @@
     <p:sldId id="473" r:id="rId10"/>
     <p:sldId id="474" r:id="rId11"/>
     <p:sldId id="475" r:id="rId12"/>
+    <p:sldId id="476" r:id="rId13"/>
   </p:sldIdLst>
   <p:sldSz cx="13442950" cy="7561263"/>
   <p:notesSz cx="7104063" cy="10234613"/>
@@ -131,6 +132,7 @@
             <p14:sldId id="473"/>
             <p14:sldId id="474"/>
             <p14:sldId id="475"/>
+            <p14:sldId id="476"/>
           </p14:sldIdLst>
         </p14:section>
       </p14:sectionLst>
@@ -429,7 +431,7 @@
             <a:fld id="{C3CD65D1-5C11-455D-9F9A-0E035F00A0DA}" type="datetimeFigureOut">
               <a:rPr lang="pt-BR" smtClean="0"/>
               <a:pPr/>
-              <a:t>21/09/2021</a:t>
+              <a:t>29/09/2021</a:t>
             </a:fld>
             <a:endParaRPr lang="pt-BR"/>
           </a:p>
@@ -597,7 +599,7 @@
             <a:fld id="{A05DA3EF-18EA-43DE-B1BB-402A3C558822}" type="datetimeFigureOut">
               <a:rPr lang="pt-BR" smtClean="0"/>
               <a:pPr/>
-              <a:t>21/09/2021</a:t>
+              <a:t>29/09/2021</a:t>
             </a:fld>
             <a:endParaRPr lang="pt-BR"/>
           </a:p>
@@ -1409,6 +1411,99 @@
     <p:extLst>
       <p:ext uri="{BB962C8B-B14F-4D97-AF65-F5344CB8AC3E}">
         <p14:creationId xmlns:p14="http://schemas.microsoft.com/office/powerpoint/2010/main" val="1678713793"/>
+      </p:ext>
+    </p:extLst>
+  </p:cSld>
+  <p:clrMapOvr>
+    <a:masterClrMapping/>
+  </p:clrMapOvr>
+</p:notes>
+</file>
+
+<file path=ppt/notesSlides/notesSlide7.xml><?xml version="1.0" encoding="utf-8"?>
+<p:notes xmlns:a="http://schemas.openxmlformats.org/drawingml/2006/main" xmlns:r="http://schemas.openxmlformats.org/officeDocument/2006/relationships" xmlns:p="http://schemas.openxmlformats.org/presentationml/2006/main">
+  <p:cSld>
+    <p:spTree>
+      <p:nvGrpSpPr>
+        <p:cNvPr id="1" name=""/>
+        <p:cNvGrpSpPr/>
+        <p:nvPr/>
+      </p:nvGrpSpPr>
+      <p:grpSpPr>
+        <a:xfrm>
+          <a:off x="0" y="0"/>
+          <a:ext cx="0" cy="0"/>
+          <a:chOff x="0" y="0"/>
+          <a:chExt cx="0" cy="0"/>
+        </a:xfrm>
+      </p:grpSpPr>
+      <p:sp>
+        <p:nvSpPr>
+          <p:cNvPr id="2" name="Slide Image Placeholder 1"/>
+          <p:cNvSpPr>
+            <a:spLocks noGrp="1" noRot="1" noChangeAspect="1"/>
+          </p:cNvSpPr>
+          <p:nvPr>
+            <p:ph type="sldImg"/>
+          </p:nvPr>
+        </p:nvSpPr>
+        <p:spPr/>
+      </p:sp>
+      <p:sp>
+        <p:nvSpPr>
+          <p:cNvPr id="3" name="Notes Placeholder 2"/>
+          <p:cNvSpPr>
+            <a:spLocks noGrp="1"/>
+          </p:cNvSpPr>
+          <p:nvPr>
+            <p:ph type="body" idx="1"/>
+          </p:nvPr>
+        </p:nvSpPr>
+        <p:spPr/>
+        <p:txBody>
+          <a:bodyPr/>
+          <a:lstStyle/>
+          <a:p>
+            <a:endParaRPr lang="en-US"/>
+          </a:p>
+        </p:txBody>
+      </p:sp>
+      <p:sp>
+        <p:nvSpPr>
+          <p:cNvPr id="4" name="Slide Number Placeholder 3"/>
+          <p:cNvSpPr>
+            <a:spLocks noGrp="1"/>
+          </p:cNvSpPr>
+          <p:nvPr>
+            <p:ph type="sldNum" sz="quarter" idx="10"/>
+          </p:nvPr>
+        </p:nvSpPr>
+        <p:spPr/>
+        <p:txBody>
+          <a:bodyPr/>
+          <a:lstStyle/>
+          <a:p>
+            <a:fld id="{B39AF3DB-B6A1-2444-9DD8-53D016F8E638}" type="slidenum">
+              <a:rPr lang="pt-BR" smtClean="0">
+                <a:solidFill>
+                  <a:prstClr val="black"/>
+                </a:solidFill>
+              </a:rPr>
+              <a:pPr/>
+              <a:t>7</a:t>
+            </a:fld>
+            <a:endParaRPr lang="pt-BR">
+              <a:solidFill>
+                <a:prstClr val="black"/>
+              </a:solidFill>
+            </a:endParaRPr>
+          </a:p>
+        </p:txBody>
+      </p:sp>
+    </p:spTree>
+    <p:extLst>
+      <p:ext uri="{BB962C8B-B14F-4D97-AF65-F5344CB8AC3E}">
+        <p14:creationId xmlns:p14="http://schemas.microsoft.com/office/powerpoint/2010/main" val="1022460388"/>
       </p:ext>
     </p:extLst>
   </p:cSld>
@@ -31870,6 +31965,2090 @@
     <p:extLst>
       <p:ext uri="{BB962C8B-B14F-4D97-AF65-F5344CB8AC3E}">
         <p14:creationId xmlns:p14="http://schemas.microsoft.com/office/powerpoint/2010/main" val="3583372606"/>
+      </p:ext>
+    </p:extLst>
+  </p:cSld>
+  <p:clrMapOvr>
+    <a:masterClrMapping/>
+  </p:clrMapOvr>
+</p:sld>
+</file>
+
+<file path=ppt/slides/slide7.xml><?xml version="1.0" encoding="utf-8"?>
+<p:sld xmlns:a="http://schemas.openxmlformats.org/drawingml/2006/main" xmlns:r="http://schemas.openxmlformats.org/officeDocument/2006/relationships" xmlns:p="http://schemas.openxmlformats.org/presentationml/2006/main">
+  <p:cSld>
+    <p:spTree>
+      <p:nvGrpSpPr>
+        <p:cNvPr id="1" name=""/>
+        <p:cNvGrpSpPr/>
+        <p:nvPr/>
+      </p:nvGrpSpPr>
+      <p:grpSpPr>
+        <a:xfrm>
+          <a:off x="0" y="0"/>
+          <a:ext cx="0" cy="0"/>
+          <a:chOff x="0" y="0"/>
+          <a:chExt cx="0" cy="0"/>
+        </a:xfrm>
+      </p:grpSpPr>
+      <p:sp>
+        <p:nvSpPr>
+          <p:cNvPr id="43" name="Rectangle 42"/>
+          <p:cNvSpPr/>
+          <p:nvPr/>
+        </p:nvSpPr>
+        <p:spPr>
+          <a:xfrm>
+            <a:off x="6804884" y="1106495"/>
+            <a:ext cx="6254624" cy="2191469"/>
+          </a:xfrm>
+          <a:prstGeom prst="rect">
+            <a:avLst/>
+          </a:prstGeom>
+          <a:noFill/>
+          <a:ln w="12700">
+            <a:solidFill>
+              <a:schemeClr val="bg1">
+                <a:lumMod val="50000"/>
+              </a:schemeClr>
+            </a:solidFill>
+          </a:ln>
+        </p:spPr>
+        <p:style>
+          <a:lnRef idx="2">
+            <a:schemeClr val="accent4"/>
+          </a:lnRef>
+          <a:fillRef idx="1">
+            <a:schemeClr val="lt1"/>
+          </a:fillRef>
+          <a:effectRef idx="0">
+            <a:schemeClr val="accent4"/>
+          </a:effectRef>
+          <a:fontRef idx="minor">
+            <a:schemeClr val="dk1"/>
+          </a:fontRef>
+        </p:style>
+        <p:txBody>
+          <a:bodyPr tIns="105844" rtlCol="0" anchor="t"/>
+          <a:lstStyle/>
+          <a:p>
+            <a:pPr defTabSz="672130">
+              <a:spcAft>
+                <a:spcPts val="882"/>
+              </a:spcAft>
+            </a:pPr>
+            <a:endParaRPr lang="pt-BR" sz="1470" dirty="0">
+              <a:solidFill>
+                <a:schemeClr val="tx1"/>
+              </a:solidFill>
+              <a:latin typeface="Exo 2 Medium" panose="00000600000000000000" pitchFamily="50" charset="0"/>
+              <a:cs typeface="Simplon BP Regular"/>
+            </a:endParaRPr>
+          </a:p>
+        </p:txBody>
+      </p:sp>
+      <p:sp>
+        <p:nvSpPr>
+          <p:cNvPr id="3" name="Title 2"/>
+          <p:cNvSpPr>
+            <a:spLocks noGrp="1"/>
+          </p:cNvSpPr>
+          <p:nvPr>
+            <p:ph type="title"/>
+          </p:nvPr>
+        </p:nvSpPr>
+        <p:spPr>
+          <a:xfrm>
+            <a:off x="469692" y="185232"/>
+            <a:ext cx="12098020" cy="800352"/>
+          </a:xfrm>
+        </p:spPr>
+        <p:txBody>
+          <a:bodyPr vert="horz" wrap="square" lIns="105844" tIns="0" rIns="105844" bIns="0" numCol="1" anchor="t" anchorCtr="0" compatLnSpc="1">
+            <a:prstTxWarp prst="textNoShape">
+              <a:avLst/>
+            </a:prstTxWarp>
+            <a:noAutofit/>
+          </a:bodyPr>
+          <a:lstStyle/>
+          <a:p>
+            <a:pPr algn="l">
+              <a:spcAft>
+                <a:spcPts val="882"/>
+              </a:spcAft>
+            </a:pPr>
+            <a:r>
+              <a:rPr lang="en-US" sz="2646" dirty="0">
+                <a:solidFill>
+                  <a:prstClr val="black"/>
+                </a:solidFill>
+                <a:latin typeface="Exo 2 Medium" panose="00000600000000000000" pitchFamily="50" charset="0"/>
+                <a:cs typeface="Simplon Oi Headline"/>
+              </a:rPr>
+              <a:t>SEMANA 6 - 29/09/2021</a:t>
+            </a:r>
+          </a:p>
+        </p:txBody>
+      </p:sp>
+      <p:sp>
+        <p:nvSpPr>
+          <p:cNvPr id="78" name="TextBox 118"/>
+          <p:cNvSpPr txBox="1"/>
+          <p:nvPr/>
+        </p:nvSpPr>
+        <p:spPr>
+          <a:xfrm>
+            <a:off x="11822773" y="576471"/>
+            <a:ext cx="899678" cy="179824"/>
+          </a:xfrm>
+          <a:prstGeom prst="rect">
+            <a:avLst/>
+          </a:prstGeom>
+          <a:noFill/>
+          <a:ln w="12700">
+            <a:noFill/>
+          </a:ln>
+        </p:spPr>
+        <p:style>
+          <a:lnRef idx="2">
+            <a:schemeClr val="accent4"/>
+          </a:lnRef>
+          <a:fillRef idx="1">
+            <a:schemeClr val="lt1"/>
+          </a:fillRef>
+          <a:effectRef idx="0">
+            <a:schemeClr val="accent4"/>
+          </a:effectRef>
+          <a:fontRef idx="minor">
+            <a:schemeClr val="dk1"/>
+          </a:fontRef>
+        </p:style>
+        <p:txBody>
+          <a:bodyPr wrap="none" lIns="52922" tIns="52922" rIns="52922" bIns="0" rtlCol="0" anchor="b"/>
+          <a:lstStyle>
+            <a:defPPr>
+              <a:defRPr lang="en-US"/>
+            </a:defPPr>
+            <a:lvl1pPr algn="ctr">
+              <a:defRPr sz="1000" b="1">
+                <a:latin typeface="Simplon BP Regular"/>
+                <a:cs typeface="Simplon BP Regular"/>
+              </a:defRPr>
+            </a:lvl1pPr>
+            <a:lvl2pPr>
+              <a:defRPr>
+                <a:solidFill>
+                  <a:schemeClr val="dk1"/>
+                </a:solidFill>
+              </a:defRPr>
+            </a:lvl2pPr>
+            <a:lvl3pPr>
+              <a:defRPr>
+                <a:solidFill>
+                  <a:schemeClr val="dk1"/>
+                </a:solidFill>
+              </a:defRPr>
+            </a:lvl3pPr>
+            <a:lvl4pPr>
+              <a:defRPr>
+                <a:solidFill>
+                  <a:schemeClr val="dk1"/>
+                </a:solidFill>
+              </a:defRPr>
+            </a:lvl4pPr>
+            <a:lvl5pPr>
+              <a:defRPr>
+                <a:solidFill>
+                  <a:schemeClr val="dk1"/>
+                </a:solidFill>
+              </a:defRPr>
+            </a:lvl5pPr>
+            <a:lvl6pPr>
+              <a:defRPr>
+                <a:solidFill>
+                  <a:schemeClr val="dk1"/>
+                </a:solidFill>
+              </a:defRPr>
+            </a:lvl6pPr>
+            <a:lvl7pPr>
+              <a:defRPr>
+                <a:solidFill>
+                  <a:schemeClr val="dk1"/>
+                </a:solidFill>
+              </a:defRPr>
+            </a:lvl7pPr>
+            <a:lvl8pPr>
+              <a:defRPr>
+                <a:solidFill>
+                  <a:schemeClr val="dk1"/>
+                </a:solidFill>
+              </a:defRPr>
+            </a:lvl8pPr>
+            <a:lvl9pPr>
+              <a:defRPr>
+                <a:solidFill>
+                  <a:schemeClr val="dk1"/>
+                </a:solidFill>
+              </a:defRPr>
+            </a:lvl9pPr>
+          </a:lstStyle>
+          <a:p>
+            <a:pPr defTabSz="672130"/>
+            <a:r>
+              <a:rPr lang="pt-BR" sz="1176" b="0" dirty="0">
+                <a:solidFill>
+                  <a:prstClr val="black"/>
+                </a:solidFill>
+                <a:latin typeface="Exo 2 Medium" panose="00000600000000000000" pitchFamily="50" charset="0"/>
+              </a:rPr>
+              <a:t>Negócios</a:t>
+            </a:r>
+          </a:p>
+        </p:txBody>
+      </p:sp>
+      <p:sp>
+        <p:nvSpPr>
+          <p:cNvPr id="109" name="Oval 120"/>
+          <p:cNvSpPr>
+            <a:spLocks noChangeAspect="1"/>
+          </p:cNvSpPr>
+          <p:nvPr/>
+        </p:nvSpPr>
+        <p:spPr>
+          <a:xfrm>
+            <a:off x="11193898" y="297930"/>
+            <a:ext cx="211404" cy="211689"/>
+          </a:xfrm>
+          <a:prstGeom prst="ellipse">
+            <a:avLst/>
+          </a:prstGeom>
+          <a:solidFill>
+            <a:srgbClr val="1BCF13"/>
+          </a:solidFill>
+          <a:ln w="12700">
+            <a:solidFill>
+              <a:schemeClr val="accent3"/>
+            </a:solidFill>
+          </a:ln>
+        </p:spPr>
+        <p:style>
+          <a:lnRef idx="2">
+            <a:schemeClr val="accent1">
+              <a:shade val="50000"/>
+            </a:schemeClr>
+          </a:lnRef>
+          <a:fillRef idx="1">
+            <a:schemeClr val="accent1"/>
+          </a:fillRef>
+          <a:effectRef idx="0">
+            <a:schemeClr val="accent1"/>
+          </a:effectRef>
+          <a:fontRef idx="minor">
+            <a:schemeClr val="lt1"/>
+          </a:fontRef>
+        </p:style>
+        <p:txBody>
+          <a:bodyPr wrap="none" lIns="52922" tIns="52922" rIns="52922" rtlCol="0" anchor="ctr"/>
+          <a:lstStyle/>
+          <a:p>
+            <a:pPr algn="ctr" defTabSz="672130"/>
+            <a:endParaRPr lang="en-US" sz="1176" dirty="0">
+              <a:solidFill>
+                <a:prstClr val="black"/>
+              </a:solidFill>
+              <a:latin typeface="Exo 2 Medium" panose="00000600000000000000" pitchFamily="50" charset="0"/>
+              <a:cs typeface="Simplon BP Regular"/>
+            </a:endParaRPr>
+          </a:p>
+        </p:txBody>
+      </p:sp>
+      <p:sp>
+        <p:nvSpPr>
+          <p:cNvPr id="80" name="TextBox 123"/>
+          <p:cNvSpPr txBox="1"/>
+          <p:nvPr/>
+        </p:nvSpPr>
+        <p:spPr>
+          <a:xfrm>
+            <a:off x="10852497" y="576471"/>
+            <a:ext cx="899678" cy="179824"/>
+          </a:xfrm>
+          <a:prstGeom prst="rect">
+            <a:avLst/>
+          </a:prstGeom>
+          <a:noFill/>
+          <a:ln w="12700">
+            <a:noFill/>
+          </a:ln>
+        </p:spPr>
+        <p:style>
+          <a:lnRef idx="2">
+            <a:schemeClr val="accent4"/>
+          </a:lnRef>
+          <a:fillRef idx="1">
+            <a:schemeClr val="lt1"/>
+          </a:fillRef>
+          <a:effectRef idx="0">
+            <a:schemeClr val="accent4"/>
+          </a:effectRef>
+          <a:fontRef idx="minor">
+            <a:schemeClr val="dk1"/>
+          </a:fontRef>
+        </p:style>
+        <p:txBody>
+          <a:bodyPr wrap="none" lIns="52922" tIns="52922" rIns="52922" bIns="0" rtlCol="0" anchor="b"/>
+          <a:lstStyle>
+            <a:defPPr>
+              <a:defRPr lang="en-US"/>
+            </a:defPPr>
+            <a:lvl1pPr algn="ctr">
+              <a:defRPr sz="1000" b="1">
+                <a:latin typeface="Simplon BP Regular"/>
+                <a:cs typeface="Simplon BP Regular"/>
+              </a:defRPr>
+            </a:lvl1pPr>
+            <a:lvl2pPr>
+              <a:defRPr>
+                <a:solidFill>
+                  <a:schemeClr val="dk1"/>
+                </a:solidFill>
+              </a:defRPr>
+            </a:lvl2pPr>
+            <a:lvl3pPr>
+              <a:defRPr>
+                <a:solidFill>
+                  <a:schemeClr val="dk1"/>
+                </a:solidFill>
+              </a:defRPr>
+            </a:lvl3pPr>
+            <a:lvl4pPr>
+              <a:defRPr>
+                <a:solidFill>
+                  <a:schemeClr val="dk1"/>
+                </a:solidFill>
+              </a:defRPr>
+            </a:lvl4pPr>
+            <a:lvl5pPr>
+              <a:defRPr>
+                <a:solidFill>
+                  <a:schemeClr val="dk1"/>
+                </a:solidFill>
+              </a:defRPr>
+            </a:lvl5pPr>
+            <a:lvl6pPr>
+              <a:defRPr>
+                <a:solidFill>
+                  <a:schemeClr val="dk1"/>
+                </a:solidFill>
+              </a:defRPr>
+            </a:lvl6pPr>
+            <a:lvl7pPr>
+              <a:defRPr>
+                <a:solidFill>
+                  <a:schemeClr val="dk1"/>
+                </a:solidFill>
+              </a:defRPr>
+            </a:lvl7pPr>
+            <a:lvl8pPr>
+              <a:defRPr>
+                <a:solidFill>
+                  <a:schemeClr val="dk1"/>
+                </a:solidFill>
+              </a:defRPr>
+            </a:lvl8pPr>
+            <a:lvl9pPr>
+              <a:defRPr>
+                <a:solidFill>
+                  <a:schemeClr val="dk1"/>
+                </a:solidFill>
+              </a:defRPr>
+            </a:lvl9pPr>
+          </a:lstStyle>
+          <a:p>
+            <a:pPr defTabSz="672130"/>
+            <a:r>
+              <a:rPr lang="pt-BR" sz="1176" b="0" dirty="0">
+                <a:solidFill>
+                  <a:prstClr val="black"/>
+                </a:solidFill>
+                <a:latin typeface="Exo 2 Medium" panose="00000600000000000000" pitchFamily="50" charset="0"/>
+              </a:rPr>
+              <a:t>Plataforma</a:t>
+            </a:r>
+          </a:p>
+        </p:txBody>
+      </p:sp>
+      <p:sp>
+        <p:nvSpPr>
+          <p:cNvPr id="82" name="TextBox 128"/>
+          <p:cNvSpPr txBox="1"/>
+          <p:nvPr/>
+        </p:nvSpPr>
+        <p:spPr>
+          <a:xfrm>
+            <a:off x="9854245" y="576471"/>
+            <a:ext cx="899678" cy="179824"/>
+          </a:xfrm>
+          <a:prstGeom prst="rect">
+            <a:avLst/>
+          </a:prstGeom>
+          <a:noFill/>
+          <a:ln w="12700">
+            <a:noFill/>
+          </a:ln>
+        </p:spPr>
+        <p:style>
+          <a:lnRef idx="2">
+            <a:schemeClr val="accent4"/>
+          </a:lnRef>
+          <a:fillRef idx="1">
+            <a:schemeClr val="lt1"/>
+          </a:fillRef>
+          <a:effectRef idx="0">
+            <a:schemeClr val="accent4"/>
+          </a:effectRef>
+          <a:fontRef idx="minor">
+            <a:schemeClr val="dk1"/>
+          </a:fontRef>
+        </p:style>
+        <p:txBody>
+          <a:bodyPr wrap="none" lIns="52922" tIns="52922" rIns="52922" bIns="0" rtlCol="0" anchor="b"/>
+          <a:lstStyle>
+            <a:defPPr>
+              <a:defRPr lang="en-US"/>
+            </a:defPPr>
+            <a:lvl1pPr algn="ctr">
+              <a:defRPr sz="1000" b="1">
+                <a:latin typeface="Simplon BP Regular"/>
+                <a:cs typeface="Simplon BP Regular"/>
+              </a:defRPr>
+            </a:lvl1pPr>
+            <a:lvl2pPr>
+              <a:defRPr>
+                <a:solidFill>
+                  <a:schemeClr val="dk1"/>
+                </a:solidFill>
+              </a:defRPr>
+            </a:lvl2pPr>
+            <a:lvl3pPr>
+              <a:defRPr>
+                <a:solidFill>
+                  <a:schemeClr val="dk1"/>
+                </a:solidFill>
+              </a:defRPr>
+            </a:lvl3pPr>
+            <a:lvl4pPr>
+              <a:defRPr>
+                <a:solidFill>
+                  <a:schemeClr val="dk1"/>
+                </a:solidFill>
+              </a:defRPr>
+            </a:lvl4pPr>
+            <a:lvl5pPr>
+              <a:defRPr>
+                <a:solidFill>
+                  <a:schemeClr val="dk1"/>
+                </a:solidFill>
+              </a:defRPr>
+            </a:lvl5pPr>
+            <a:lvl6pPr>
+              <a:defRPr>
+                <a:solidFill>
+                  <a:schemeClr val="dk1"/>
+                </a:solidFill>
+              </a:defRPr>
+            </a:lvl6pPr>
+            <a:lvl7pPr>
+              <a:defRPr>
+                <a:solidFill>
+                  <a:schemeClr val="dk1"/>
+                </a:solidFill>
+              </a:defRPr>
+            </a:lvl7pPr>
+            <a:lvl8pPr>
+              <a:defRPr>
+                <a:solidFill>
+                  <a:schemeClr val="dk1"/>
+                </a:solidFill>
+              </a:defRPr>
+            </a:lvl8pPr>
+            <a:lvl9pPr>
+              <a:defRPr>
+                <a:solidFill>
+                  <a:schemeClr val="dk1"/>
+                </a:solidFill>
+              </a:defRPr>
+            </a:lvl9pPr>
+          </a:lstStyle>
+          <a:p>
+            <a:pPr defTabSz="672130"/>
+            <a:r>
+              <a:rPr lang="pt-BR" sz="1176" b="0" dirty="0">
+                <a:solidFill>
+                  <a:prstClr val="black"/>
+                </a:solidFill>
+                <a:latin typeface="Exo 2 Medium" panose="00000600000000000000" pitchFamily="50" charset="0"/>
+              </a:rPr>
+              <a:t>Back</a:t>
+            </a:r>
+          </a:p>
+        </p:txBody>
+      </p:sp>
+      <p:sp>
+        <p:nvSpPr>
+          <p:cNvPr id="84" name="TextBox 133"/>
+          <p:cNvSpPr txBox="1"/>
+          <p:nvPr/>
+        </p:nvSpPr>
+        <p:spPr>
+          <a:xfrm>
+            <a:off x="8986650" y="576471"/>
+            <a:ext cx="899678" cy="179824"/>
+          </a:xfrm>
+          <a:prstGeom prst="rect">
+            <a:avLst/>
+          </a:prstGeom>
+          <a:noFill/>
+          <a:ln w="12700">
+            <a:noFill/>
+          </a:ln>
+        </p:spPr>
+        <p:style>
+          <a:lnRef idx="2">
+            <a:schemeClr val="accent4"/>
+          </a:lnRef>
+          <a:fillRef idx="1">
+            <a:schemeClr val="lt1"/>
+          </a:fillRef>
+          <a:effectRef idx="0">
+            <a:schemeClr val="accent4"/>
+          </a:effectRef>
+          <a:fontRef idx="minor">
+            <a:schemeClr val="dk1"/>
+          </a:fontRef>
+        </p:style>
+        <p:txBody>
+          <a:bodyPr wrap="none" lIns="52922" tIns="52922" rIns="52922" bIns="0" rtlCol="0" anchor="b"/>
+          <a:lstStyle>
+            <a:defPPr>
+              <a:defRPr lang="en-US"/>
+            </a:defPPr>
+            <a:lvl1pPr algn="ctr">
+              <a:defRPr sz="1000" b="1">
+                <a:latin typeface="Simplon BP Regular"/>
+                <a:cs typeface="Simplon BP Regular"/>
+              </a:defRPr>
+            </a:lvl1pPr>
+            <a:lvl2pPr>
+              <a:defRPr>
+                <a:solidFill>
+                  <a:schemeClr val="dk1"/>
+                </a:solidFill>
+              </a:defRPr>
+            </a:lvl2pPr>
+            <a:lvl3pPr>
+              <a:defRPr>
+                <a:solidFill>
+                  <a:schemeClr val="dk1"/>
+                </a:solidFill>
+              </a:defRPr>
+            </a:lvl3pPr>
+            <a:lvl4pPr>
+              <a:defRPr>
+                <a:solidFill>
+                  <a:schemeClr val="dk1"/>
+                </a:solidFill>
+              </a:defRPr>
+            </a:lvl4pPr>
+            <a:lvl5pPr>
+              <a:defRPr>
+                <a:solidFill>
+                  <a:schemeClr val="dk1"/>
+                </a:solidFill>
+              </a:defRPr>
+            </a:lvl5pPr>
+            <a:lvl6pPr>
+              <a:defRPr>
+                <a:solidFill>
+                  <a:schemeClr val="dk1"/>
+                </a:solidFill>
+              </a:defRPr>
+            </a:lvl6pPr>
+            <a:lvl7pPr>
+              <a:defRPr>
+                <a:solidFill>
+                  <a:schemeClr val="dk1"/>
+                </a:solidFill>
+              </a:defRPr>
+            </a:lvl7pPr>
+            <a:lvl8pPr>
+              <a:defRPr>
+                <a:solidFill>
+                  <a:schemeClr val="dk1"/>
+                </a:solidFill>
+              </a:defRPr>
+            </a:lvl8pPr>
+            <a:lvl9pPr>
+              <a:defRPr>
+                <a:solidFill>
+                  <a:schemeClr val="dk1"/>
+                </a:solidFill>
+              </a:defRPr>
+            </a:lvl9pPr>
+          </a:lstStyle>
+          <a:p>
+            <a:pPr defTabSz="672130"/>
+            <a:r>
+              <a:rPr lang="pt-BR" sz="1176" b="0" dirty="0">
+                <a:solidFill>
+                  <a:prstClr val="black"/>
+                </a:solidFill>
+                <a:latin typeface="Exo 2 Medium" panose="00000600000000000000" pitchFamily="50" charset="0"/>
+              </a:rPr>
+              <a:t>Front</a:t>
+            </a:r>
+          </a:p>
+        </p:txBody>
+      </p:sp>
+      <p:sp>
+        <p:nvSpPr>
+          <p:cNvPr id="88" name="Oval 134"/>
+          <p:cNvSpPr>
+            <a:spLocks noChangeAspect="1"/>
+          </p:cNvSpPr>
+          <p:nvPr/>
+        </p:nvSpPr>
+        <p:spPr>
+          <a:xfrm>
+            <a:off x="8443555" y="297930"/>
+            <a:ext cx="211404" cy="211689"/>
+          </a:xfrm>
+          <a:prstGeom prst="ellipse">
+            <a:avLst/>
+          </a:prstGeom>
+          <a:solidFill>
+            <a:srgbClr val="1BCF13"/>
+          </a:solidFill>
+          <a:ln w="12700">
+            <a:solidFill>
+              <a:schemeClr val="accent3"/>
+            </a:solidFill>
+          </a:ln>
+        </p:spPr>
+        <p:style>
+          <a:lnRef idx="2">
+            <a:schemeClr val="accent1">
+              <a:shade val="50000"/>
+            </a:schemeClr>
+          </a:lnRef>
+          <a:fillRef idx="1">
+            <a:schemeClr val="accent1"/>
+          </a:fillRef>
+          <a:effectRef idx="0">
+            <a:schemeClr val="accent1"/>
+          </a:effectRef>
+          <a:fontRef idx="minor">
+            <a:schemeClr val="lt1"/>
+          </a:fontRef>
+        </p:style>
+        <p:txBody>
+          <a:bodyPr wrap="none" lIns="52922" tIns="52922" rIns="52922" rtlCol="0" anchor="ctr"/>
+          <a:lstStyle/>
+          <a:p>
+            <a:pPr algn="ctr" defTabSz="672130"/>
+            <a:endParaRPr lang="en-US" sz="1176" dirty="0">
+              <a:solidFill>
+                <a:prstClr val="black"/>
+              </a:solidFill>
+              <a:latin typeface="Exo 2 Medium" panose="00000600000000000000" pitchFamily="50" charset="0"/>
+              <a:cs typeface="Simplon BP Regular"/>
+            </a:endParaRPr>
+          </a:p>
+        </p:txBody>
+      </p:sp>
+      <p:sp>
+        <p:nvSpPr>
+          <p:cNvPr id="86" name="TextBox 138"/>
+          <p:cNvSpPr txBox="1"/>
+          <p:nvPr/>
+        </p:nvSpPr>
+        <p:spPr>
+          <a:xfrm>
+            <a:off x="8126053" y="576471"/>
+            <a:ext cx="899678" cy="179824"/>
+          </a:xfrm>
+          <a:prstGeom prst="rect">
+            <a:avLst/>
+          </a:prstGeom>
+          <a:noFill/>
+          <a:ln w="12700">
+            <a:noFill/>
+          </a:ln>
+        </p:spPr>
+        <p:style>
+          <a:lnRef idx="2">
+            <a:schemeClr val="accent4"/>
+          </a:lnRef>
+          <a:fillRef idx="1">
+            <a:schemeClr val="lt1"/>
+          </a:fillRef>
+          <a:effectRef idx="0">
+            <a:schemeClr val="accent4"/>
+          </a:effectRef>
+          <a:fontRef idx="minor">
+            <a:schemeClr val="dk1"/>
+          </a:fontRef>
+        </p:style>
+        <p:txBody>
+          <a:bodyPr wrap="none" lIns="52922" tIns="52922" rIns="52922" bIns="0" rtlCol="0" anchor="b"/>
+          <a:lstStyle>
+            <a:defPPr>
+              <a:defRPr lang="en-US"/>
+            </a:defPPr>
+            <a:lvl1pPr algn="ctr">
+              <a:defRPr sz="1000" b="1">
+                <a:latin typeface="Simplon BP Regular"/>
+                <a:cs typeface="Simplon BP Regular"/>
+              </a:defRPr>
+            </a:lvl1pPr>
+            <a:lvl2pPr>
+              <a:defRPr>
+                <a:solidFill>
+                  <a:schemeClr val="dk1"/>
+                </a:solidFill>
+              </a:defRPr>
+            </a:lvl2pPr>
+            <a:lvl3pPr>
+              <a:defRPr>
+                <a:solidFill>
+                  <a:schemeClr val="dk1"/>
+                </a:solidFill>
+              </a:defRPr>
+            </a:lvl3pPr>
+            <a:lvl4pPr>
+              <a:defRPr>
+                <a:solidFill>
+                  <a:schemeClr val="dk1"/>
+                </a:solidFill>
+              </a:defRPr>
+            </a:lvl4pPr>
+            <a:lvl5pPr>
+              <a:defRPr>
+                <a:solidFill>
+                  <a:schemeClr val="dk1"/>
+                </a:solidFill>
+              </a:defRPr>
+            </a:lvl5pPr>
+            <a:lvl6pPr>
+              <a:defRPr>
+                <a:solidFill>
+                  <a:schemeClr val="dk1"/>
+                </a:solidFill>
+              </a:defRPr>
+            </a:lvl6pPr>
+            <a:lvl7pPr>
+              <a:defRPr>
+                <a:solidFill>
+                  <a:schemeClr val="dk1"/>
+                </a:solidFill>
+              </a:defRPr>
+            </a:lvl7pPr>
+            <a:lvl8pPr>
+              <a:defRPr>
+                <a:solidFill>
+                  <a:schemeClr val="dk1"/>
+                </a:solidFill>
+              </a:defRPr>
+            </a:lvl8pPr>
+            <a:lvl9pPr>
+              <a:defRPr>
+                <a:solidFill>
+                  <a:schemeClr val="dk1"/>
+                </a:solidFill>
+              </a:defRPr>
+            </a:lvl9pPr>
+          </a:lstStyle>
+          <a:p>
+            <a:pPr defTabSz="672130"/>
+            <a:r>
+              <a:rPr lang="en-US" sz="1176" b="0" dirty="0">
+                <a:solidFill>
+                  <a:prstClr val="black"/>
+                </a:solidFill>
+                <a:latin typeface="Exo 2 Medium" panose="00000600000000000000" pitchFamily="50" charset="0"/>
+              </a:rPr>
+              <a:t>Equipe</a:t>
+            </a:r>
+          </a:p>
+        </p:txBody>
+      </p:sp>
+      <p:sp>
+        <p:nvSpPr>
+          <p:cNvPr id="64" name="Retângulo 63"/>
+          <p:cNvSpPr/>
+          <p:nvPr/>
+        </p:nvSpPr>
+        <p:spPr>
+          <a:xfrm>
+            <a:off x="512766" y="868345"/>
+            <a:ext cx="6186608" cy="238150"/>
+          </a:xfrm>
+          <a:prstGeom prst="rect">
+            <a:avLst/>
+          </a:prstGeom>
+          <a:solidFill>
+            <a:schemeClr val="bg1">
+              <a:lumMod val="85000"/>
+            </a:schemeClr>
+          </a:solidFill>
+        </p:spPr>
+        <p:txBody>
+          <a:bodyPr vert="horz" lIns="134422" tIns="67211" rIns="134422" bIns="67211" rtlCol="0" anchor="ctr"/>
+          <a:lstStyle/>
+          <a:p>
+            <a:pPr defTabSz="672130"/>
+            <a:r>
+              <a:rPr lang="en-US" sz="1544" dirty="0">
+                <a:latin typeface="Exo 2 Medium" panose="00000600000000000000" pitchFamily="50" charset="0"/>
+                <a:ea typeface="Simplon Oi Headline" charset="0"/>
+                <a:cs typeface="Simplon Oi Headline" charset="0"/>
+              </a:rPr>
+              <a:t>Progressos c/ responsáveis </a:t>
+            </a:r>
+          </a:p>
+        </p:txBody>
+      </p:sp>
+      <p:sp>
+        <p:nvSpPr>
+          <p:cNvPr id="65" name="Retângulo 64"/>
+          <p:cNvSpPr/>
+          <p:nvPr/>
+        </p:nvSpPr>
+        <p:spPr>
+          <a:xfrm>
+            <a:off x="6814576" y="868344"/>
+            <a:ext cx="6244932" cy="250902"/>
+          </a:xfrm>
+          <a:prstGeom prst="rect">
+            <a:avLst/>
+          </a:prstGeom>
+          <a:solidFill>
+            <a:schemeClr val="bg1">
+              <a:lumMod val="85000"/>
+            </a:schemeClr>
+          </a:solidFill>
+        </p:spPr>
+        <p:txBody>
+          <a:bodyPr vert="horz" lIns="134422" tIns="67211" rIns="134422" bIns="67211" rtlCol="0" anchor="ctr"/>
+          <a:lstStyle/>
+          <a:p>
+            <a:pPr defTabSz="672130"/>
+            <a:r>
+              <a:rPr lang="pt-BR" sz="1544" dirty="0">
+                <a:latin typeface="Exo 2 Medium" panose="00000600000000000000" pitchFamily="50" charset="0"/>
+                <a:ea typeface="Simplon Oi Headline" charset="0"/>
+                <a:cs typeface="Simplon Oi Headline" charset="0"/>
+              </a:rPr>
+              <a:t>Pontos atenção/ Principais Riscos</a:t>
+            </a:r>
+          </a:p>
+        </p:txBody>
+      </p:sp>
+      <p:sp>
+        <p:nvSpPr>
+          <p:cNvPr id="66" name="Retângulo 65"/>
+          <p:cNvSpPr/>
+          <p:nvPr/>
+        </p:nvSpPr>
+        <p:spPr>
+          <a:xfrm>
+            <a:off x="507536" y="3418875"/>
+            <a:ext cx="12551972" cy="238150"/>
+          </a:xfrm>
+          <a:prstGeom prst="rect">
+            <a:avLst/>
+          </a:prstGeom>
+          <a:solidFill>
+            <a:schemeClr val="bg1">
+              <a:lumMod val="85000"/>
+            </a:schemeClr>
+          </a:solidFill>
+        </p:spPr>
+        <p:txBody>
+          <a:bodyPr vert="horz" lIns="134422" tIns="67211" rIns="134422" bIns="67211" rtlCol="0" anchor="ctr"/>
+          <a:lstStyle/>
+          <a:p>
+            <a:pPr defTabSz="672130"/>
+            <a:r>
+              <a:rPr lang="pt-BR" sz="1544" dirty="0">
+                <a:latin typeface="Exo 2 Medium" panose="00000600000000000000" pitchFamily="50" charset="0"/>
+                <a:ea typeface="Simplon Oi Headline" charset="0"/>
+                <a:cs typeface="Simplon Oi Headline" charset="0"/>
+              </a:rPr>
+              <a:t>Próximos Passos c/ responsáveis </a:t>
+            </a:r>
+          </a:p>
+        </p:txBody>
+      </p:sp>
+      <p:sp>
+        <p:nvSpPr>
+          <p:cNvPr id="63" name="Rectangle 37"/>
+          <p:cNvSpPr/>
+          <p:nvPr/>
+        </p:nvSpPr>
+        <p:spPr>
+          <a:xfrm>
+            <a:off x="496765" y="1106495"/>
+            <a:ext cx="6207777" cy="2235805"/>
+          </a:xfrm>
+          <a:prstGeom prst="rect">
+            <a:avLst/>
+          </a:prstGeom>
+          <a:noFill/>
+          <a:ln w="12700">
+            <a:solidFill>
+              <a:schemeClr val="bg1">
+                <a:lumMod val="50000"/>
+              </a:schemeClr>
+            </a:solidFill>
+          </a:ln>
+        </p:spPr>
+        <p:style>
+          <a:lnRef idx="2">
+            <a:schemeClr val="accent4"/>
+          </a:lnRef>
+          <a:fillRef idx="1">
+            <a:schemeClr val="lt1"/>
+          </a:fillRef>
+          <a:effectRef idx="0">
+            <a:schemeClr val="accent4"/>
+          </a:effectRef>
+          <a:fontRef idx="minor">
+            <a:schemeClr val="dk1"/>
+          </a:fontRef>
+        </p:style>
+        <p:txBody>
+          <a:bodyPr tIns="105844" rtlCol="0" anchor="t"/>
+          <a:lstStyle/>
+          <a:p>
+            <a:pPr marL="252049" indent="-252049" fontAlgn="base">
+              <a:spcBef>
+                <a:spcPct val="0"/>
+              </a:spcBef>
+              <a:buFont typeface="Wingdings" panose="05000000000000000000" pitchFamily="2" charset="2"/>
+              <a:buChar char="ü"/>
+              <a:defRPr/>
+            </a:pPr>
+            <a:r>
+              <a:rPr lang="pt-BR" sz="1323" dirty="0">
+                <a:solidFill>
+                  <a:schemeClr val="tx1"/>
+                </a:solidFill>
+                <a:latin typeface="Exo 2 Medium" panose="00000600000000000000" pitchFamily="50" charset="0"/>
+                <a:cs typeface="Simplon BP Regular"/>
+              </a:rPr>
+              <a:t>Protótipo de Tela de Cadastro </a:t>
+            </a:r>
+            <a:r>
+              <a:rPr lang="pt-BR" sz="1323" b="1" dirty="0">
+                <a:solidFill>
+                  <a:schemeClr val="tx1"/>
+                </a:solidFill>
+                <a:latin typeface="Exo 2 Medium" panose="00000600000000000000" pitchFamily="50" charset="0"/>
+                <a:cs typeface="Simplon BP Regular"/>
+              </a:rPr>
+              <a:t>#Vinicius</a:t>
+            </a:r>
+          </a:p>
+          <a:p>
+            <a:pPr marL="252049" indent="-252049" fontAlgn="base">
+              <a:spcBef>
+                <a:spcPct val="0"/>
+              </a:spcBef>
+              <a:buFont typeface="Wingdings" panose="05000000000000000000" pitchFamily="2" charset="2"/>
+              <a:buChar char="ü"/>
+              <a:defRPr/>
+            </a:pPr>
+            <a:r>
+              <a:rPr lang="pt-BR" sz="1323" dirty="0">
+                <a:solidFill>
+                  <a:schemeClr val="tx1"/>
+                </a:solidFill>
+                <a:latin typeface="Exo 2 Medium" panose="00000600000000000000" pitchFamily="50" charset="0"/>
+                <a:cs typeface="Simplon BP Regular"/>
+              </a:rPr>
+              <a:t>README do repositório GitHub </a:t>
+            </a:r>
+            <a:r>
+              <a:rPr lang="pt-BR" sz="1323" b="1" dirty="0">
+                <a:solidFill>
+                  <a:schemeClr val="tx1"/>
+                </a:solidFill>
+                <a:latin typeface="Exo 2 Medium" panose="00000600000000000000" pitchFamily="50" charset="0"/>
+                <a:cs typeface="Simplon BP Regular"/>
+              </a:rPr>
+              <a:t>#Vinicius</a:t>
+            </a:r>
+          </a:p>
+          <a:p>
+            <a:pPr marL="252049" indent="-252049" fontAlgn="base">
+              <a:spcBef>
+                <a:spcPct val="0"/>
+              </a:spcBef>
+              <a:buFont typeface="Wingdings" panose="05000000000000000000" pitchFamily="2" charset="2"/>
+              <a:buChar char="ü"/>
+              <a:defRPr/>
+            </a:pPr>
+            <a:r>
+              <a:rPr lang="pt-BR" sz="1323" dirty="0">
+                <a:solidFill>
+                  <a:schemeClr val="tx1"/>
+                </a:solidFill>
+                <a:latin typeface="Exo 2 Medium" panose="00000600000000000000" pitchFamily="50" charset="0"/>
+                <a:cs typeface="Simplon BP Regular"/>
+              </a:rPr>
+              <a:t>Início ao protótipo da aplicação de agendamentos </a:t>
+            </a:r>
+            <a:r>
+              <a:rPr lang="pt-BR" sz="1323" b="1" dirty="0">
+                <a:solidFill>
+                  <a:schemeClr val="tx1"/>
+                </a:solidFill>
+                <a:latin typeface="Exo 2 Medium" panose="00000600000000000000" pitchFamily="50" charset="0"/>
+                <a:cs typeface="Simplon BP Regular"/>
+              </a:rPr>
+              <a:t>#Vinicius e Ferraz</a:t>
+            </a:r>
+          </a:p>
+          <a:p>
+            <a:pPr marL="252049" indent="-252049" fontAlgn="base">
+              <a:spcBef>
+                <a:spcPct val="0"/>
+              </a:spcBef>
+              <a:buFont typeface="Wingdings" panose="05000000000000000000" pitchFamily="2" charset="2"/>
+              <a:buChar char="ü"/>
+              <a:defRPr/>
+            </a:pPr>
+            <a:r>
+              <a:rPr lang="pt-BR" sz="1323" dirty="0">
+                <a:solidFill>
+                  <a:schemeClr val="tx1"/>
+                </a:solidFill>
+                <a:latin typeface="Exo 2 Medium" panose="00000600000000000000" pitchFamily="50" charset="0"/>
+                <a:cs typeface="Simplon BP Regular"/>
+              </a:rPr>
+              <a:t>Implementação do Modelo Lógico </a:t>
+            </a:r>
+            <a:r>
+              <a:rPr lang="pt-BR" sz="1323" b="1" dirty="0">
+                <a:solidFill>
+                  <a:schemeClr val="tx1"/>
+                </a:solidFill>
+                <a:latin typeface="Exo 2 Medium" panose="00000600000000000000" pitchFamily="50" charset="0"/>
+                <a:cs typeface="Simplon BP Regular"/>
+              </a:rPr>
+              <a:t>#Pedro</a:t>
+            </a:r>
+          </a:p>
+          <a:p>
+            <a:pPr marL="252049" indent="-252049" fontAlgn="base">
+              <a:spcBef>
+                <a:spcPct val="0"/>
+              </a:spcBef>
+              <a:buFont typeface="Wingdings" panose="05000000000000000000" pitchFamily="2" charset="2"/>
+              <a:buChar char="ü"/>
+              <a:defRPr/>
+            </a:pPr>
+            <a:r>
+              <a:rPr lang="pt-BR" sz="1323" dirty="0">
+                <a:solidFill>
+                  <a:schemeClr val="tx1"/>
+                </a:solidFill>
+                <a:latin typeface="Exo 2 Medium" panose="00000600000000000000" pitchFamily="50" charset="0"/>
+                <a:cs typeface="Simplon BP Regular"/>
+              </a:rPr>
+              <a:t>Início ao Script do banco de dados (MySQL) </a:t>
+            </a:r>
+            <a:r>
+              <a:rPr lang="pt-BR" sz="1323" b="1" dirty="0">
+                <a:solidFill>
+                  <a:schemeClr val="tx1"/>
+                </a:solidFill>
+                <a:latin typeface="Exo 2 Medium" panose="00000600000000000000" pitchFamily="50" charset="0"/>
+                <a:cs typeface="Simplon BP Regular"/>
+              </a:rPr>
+              <a:t>#Pedro</a:t>
+            </a:r>
+          </a:p>
+          <a:p>
+            <a:pPr marL="252049" indent="-252049" fontAlgn="base">
+              <a:spcBef>
+                <a:spcPct val="0"/>
+              </a:spcBef>
+              <a:buFont typeface="Wingdings" panose="05000000000000000000" pitchFamily="2" charset="2"/>
+              <a:buChar char="ü"/>
+              <a:defRPr/>
+            </a:pPr>
+            <a:r>
+              <a:rPr lang="pt-BR" sz="1323" dirty="0">
+                <a:solidFill>
+                  <a:schemeClr val="tx1"/>
+                </a:solidFill>
+                <a:latin typeface="Exo 2 Medium" panose="00000600000000000000" pitchFamily="50" charset="0"/>
+                <a:cs typeface="Simplon BP Regular"/>
+              </a:rPr>
+              <a:t>Início ao desenvolvimento do site em React </a:t>
+            </a:r>
+            <a:r>
+              <a:rPr lang="pt-BR" sz="1323" b="1" dirty="0">
+                <a:solidFill>
+                  <a:schemeClr val="tx1"/>
+                </a:solidFill>
+                <a:latin typeface="Exo 2 Medium" panose="00000600000000000000" pitchFamily="50" charset="0"/>
+                <a:cs typeface="Simplon BP Regular"/>
+              </a:rPr>
+              <a:t>#Gabriel Wesley</a:t>
+            </a:r>
+          </a:p>
+          <a:p>
+            <a:pPr marL="252049" indent="-252049" fontAlgn="base">
+              <a:spcBef>
+                <a:spcPct val="0"/>
+              </a:spcBef>
+              <a:buFont typeface="Wingdings" panose="05000000000000000000" pitchFamily="2" charset="2"/>
+              <a:buChar char="ü"/>
+              <a:defRPr/>
+            </a:pPr>
+            <a:r>
+              <a:rPr lang="pt-BR" sz="1323" dirty="0">
+                <a:solidFill>
+                  <a:schemeClr val="tx1"/>
+                </a:solidFill>
+                <a:latin typeface="Exo 2 Medium" panose="00000600000000000000" pitchFamily="50" charset="0"/>
+                <a:cs typeface="Simplon BP Regular"/>
+              </a:rPr>
+              <a:t>Definição do Padrão de Projeto Observer </a:t>
+            </a:r>
+            <a:r>
+              <a:rPr lang="pt-BR" sz="1323" b="1" dirty="0">
+                <a:solidFill>
+                  <a:schemeClr val="tx1"/>
+                </a:solidFill>
+                <a:latin typeface="Exo 2 Medium" panose="00000600000000000000" pitchFamily="50" charset="0"/>
+                <a:cs typeface="Simplon BP Regular"/>
+              </a:rPr>
+              <a:t>#Equipe</a:t>
+            </a:r>
+          </a:p>
+          <a:p>
+            <a:pPr marL="252049" indent="-252049" fontAlgn="base">
+              <a:spcBef>
+                <a:spcPct val="0"/>
+              </a:spcBef>
+              <a:buFont typeface="Wingdings" panose="05000000000000000000" pitchFamily="2" charset="2"/>
+              <a:buChar char="ü"/>
+              <a:defRPr/>
+            </a:pPr>
+            <a:r>
+              <a:rPr lang="pt-BR" sz="1323" dirty="0">
+                <a:solidFill>
+                  <a:schemeClr val="tx1"/>
+                </a:solidFill>
+                <a:latin typeface="Exo 2 Medium" panose="00000600000000000000" pitchFamily="50" charset="0"/>
+                <a:cs typeface="Simplon BP Regular"/>
+              </a:rPr>
+              <a:t>Desenvolvimento e ajustes no Sprint Backlog </a:t>
+            </a:r>
+            <a:r>
+              <a:rPr lang="pt-BR" sz="1323" b="1" dirty="0">
+                <a:solidFill>
+                  <a:schemeClr val="tx1"/>
+                </a:solidFill>
+                <a:latin typeface="Exo 2 Medium" panose="00000600000000000000" pitchFamily="50" charset="0"/>
+                <a:cs typeface="Simplon BP Regular"/>
+              </a:rPr>
+              <a:t>#Wesley</a:t>
+            </a:r>
+          </a:p>
+        </p:txBody>
+      </p:sp>
+      <p:sp>
+        <p:nvSpPr>
+          <p:cNvPr id="4" name="Retângulo 3"/>
+          <p:cNvSpPr/>
+          <p:nvPr/>
+        </p:nvSpPr>
+        <p:spPr>
+          <a:xfrm>
+            <a:off x="6844996" y="1121895"/>
+            <a:ext cx="6164295" cy="499496"/>
+          </a:xfrm>
+          <a:prstGeom prst="rect">
+            <a:avLst/>
+          </a:prstGeom>
+        </p:spPr>
+        <p:txBody>
+          <a:bodyPr wrap="square">
+            <a:spAutoFit/>
+          </a:bodyPr>
+          <a:lstStyle/>
+          <a:p>
+            <a:pPr marL="252049" indent="-252049" fontAlgn="base">
+              <a:spcBef>
+                <a:spcPct val="0"/>
+              </a:spcBef>
+              <a:buFont typeface="Wingdings" panose="05000000000000000000" pitchFamily="2" charset="2"/>
+              <a:buChar char="§"/>
+              <a:defRPr/>
+            </a:pPr>
+            <a:endParaRPr lang="pt-BR" sz="1323" b="1" dirty="0">
+              <a:latin typeface="Exo 2 Medium" panose="00000600000000000000" pitchFamily="50" charset="0"/>
+              <a:cs typeface="Simplon BP Regular"/>
+            </a:endParaRPr>
+          </a:p>
+          <a:p>
+            <a:pPr marL="252049" indent="-252049" fontAlgn="base">
+              <a:spcBef>
+                <a:spcPct val="0"/>
+              </a:spcBef>
+              <a:buFont typeface="Wingdings" panose="05000000000000000000" pitchFamily="2" charset="2"/>
+              <a:buChar char="§"/>
+              <a:defRPr/>
+            </a:pPr>
+            <a:r>
+              <a:rPr lang="pt-BR" sz="1323" dirty="0">
+                <a:latin typeface="Exo 2 Medium" panose="00000600000000000000" pitchFamily="50" charset="0"/>
+                <a:cs typeface="Simplon BP Regular"/>
+              </a:rPr>
+              <a:t>Nenhum ponto a relatar</a:t>
+            </a:r>
+          </a:p>
+        </p:txBody>
+      </p:sp>
+      <p:sp>
+        <p:nvSpPr>
+          <p:cNvPr id="2" name="Rectangle 43">
+            <a:extLst>
+              <a:ext uri="{FF2B5EF4-FFF2-40B4-BE49-F238E27FC236}">
+                <a16:creationId xmlns:a16="http://schemas.microsoft.com/office/drawing/2014/main" id="{B15BA19F-C787-4E6A-ADAB-C0DFF09C66A8}"/>
+              </a:ext>
+            </a:extLst>
+          </p:cNvPr>
+          <p:cNvSpPr>
+            <a:spLocks/>
+          </p:cNvSpPr>
+          <p:nvPr/>
+        </p:nvSpPr>
+        <p:spPr>
+          <a:xfrm>
+            <a:off x="493440" y="3717591"/>
+            <a:ext cx="12566068" cy="3634138"/>
+          </a:xfrm>
+          <a:prstGeom prst="rect">
+            <a:avLst/>
+          </a:prstGeom>
+          <a:noFill/>
+          <a:ln w="12700">
+            <a:solidFill>
+              <a:schemeClr val="bg1">
+                <a:lumMod val="50000"/>
+              </a:schemeClr>
+            </a:solidFill>
+          </a:ln>
+        </p:spPr>
+        <p:style>
+          <a:lnRef idx="2">
+            <a:schemeClr val="accent4"/>
+          </a:lnRef>
+          <a:fillRef idx="1">
+            <a:schemeClr val="lt1"/>
+          </a:fillRef>
+          <a:effectRef idx="0">
+            <a:schemeClr val="accent4"/>
+          </a:effectRef>
+          <a:fontRef idx="minor">
+            <a:schemeClr val="dk1"/>
+          </a:fontRef>
+        </p:style>
+        <p:txBody>
+          <a:bodyPr wrap="square" tIns="105844" numCol="3" rtlCol="0" anchor="t"/>
+          <a:lstStyle/>
+          <a:p>
+            <a:pPr marL="0" lvl="1" defTabSz="672130"/>
+            <a:r>
+              <a:rPr lang="pt-BR" sz="1323" b="1" dirty="0">
+                <a:solidFill>
+                  <a:schemeClr val="tx1"/>
+                </a:solidFill>
+                <a:latin typeface="Exo 2 Medium" panose="00000600000000000000" pitchFamily="50" charset="0"/>
+                <a:cs typeface="Simplon BP Regular"/>
+              </a:rPr>
+              <a:t>Frente Plataforma</a:t>
+            </a:r>
+          </a:p>
+          <a:p>
+            <a:pPr marL="285750" lvl="1" indent="-285750" defTabSz="672130">
+              <a:buFont typeface="Wingdings" panose="05000000000000000000" pitchFamily="2" charset="2"/>
+              <a:buChar char="§"/>
+            </a:pPr>
+            <a:r>
+              <a:rPr lang="pt-BR" sz="1323" dirty="0">
+                <a:solidFill>
+                  <a:schemeClr val="tx1"/>
+                </a:solidFill>
+                <a:latin typeface="Exo 2 Medium" panose="00000600000000000000" pitchFamily="50" charset="0"/>
+                <a:cs typeface="Simplon BP Regular"/>
+              </a:rPr>
+              <a:t>Configuração e construção do banco de dados no Azure </a:t>
+            </a:r>
+            <a:r>
+              <a:rPr lang="pt-BR" sz="1323" b="1" dirty="0">
+                <a:solidFill>
+                  <a:schemeClr val="tx1"/>
+                </a:solidFill>
+                <a:latin typeface="Exo 2 Medium" panose="00000600000000000000" pitchFamily="50" charset="0"/>
+                <a:cs typeface="Simplon BP Regular"/>
+              </a:rPr>
+              <a:t>#Pedro</a:t>
+            </a:r>
+          </a:p>
+          <a:p>
+            <a:pPr marL="0" lvl="1" defTabSz="672130"/>
+            <a:endParaRPr lang="pt-BR" sz="1323" b="1" dirty="0">
+              <a:solidFill>
+                <a:schemeClr val="tx1"/>
+              </a:solidFill>
+              <a:latin typeface="Exo 2 Medium" panose="00000600000000000000" pitchFamily="50" charset="0"/>
+              <a:cs typeface="Simplon BP Regular"/>
+            </a:endParaRPr>
+          </a:p>
+          <a:p>
+            <a:pPr marL="0" lvl="1" defTabSz="672130"/>
+            <a:r>
+              <a:rPr lang="pt-BR" sz="1323" b="1" dirty="0">
+                <a:solidFill>
+                  <a:schemeClr val="tx1"/>
+                </a:solidFill>
+                <a:latin typeface="Exo 2 Medium" panose="00000600000000000000" pitchFamily="50" charset="0"/>
+                <a:cs typeface="Simplon BP Regular"/>
+              </a:rPr>
+              <a:t>Frente </a:t>
+            </a:r>
+            <a:r>
+              <a:rPr lang="pt-BR" sz="1323" b="1" dirty="0" err="1">
+                <a:solidFill>
+                  <a:schemeClr val="tx1"/>
+                </a:solidFill>
+                <a:latin typeface="Exo 2 Medium" panose="00000600000000000000" pitchFamily="50" charset="0"/>
+                <a:cs typeface="Simplon BP Regular"/>
+              </a:rPr>
+              <a:t>Backend</a:t>
+            </a:r>
+            <a:endParaRPr lang="pt-BR" sz="1323" b="1" dirty="0">
+              <a:solidFill>
+                <a:schemeClr val="tx1"/>
+              </a:solidFill>
+              <a:latin typeface="Exo 2 Medium" panose="00000600000000000000" pitchFamily="50" charset="0"/>
+              <a:cs typeface="Simplon BP Regular"/>
+            </a:endParaRPr>
+          </a:p>
+          <a:p>
+            <a:pPr marL="0" lvl="1" indent="-252049">
+              <a:buFont typeface="Wingdings" panose="05000000000000000000" pitchFamily="2" charset="2"/>
+              <a:buChar char="§"/>
+            </a:pPr>
+            <a:r>
+              <a:rPr lang="pt-BR" sz="1323" dirty="0">
+                <a:solidFill>
+                  <a:schemeClr val="tx1"/>
+                </a:solidFill>
+                <a:latin typeface="Exo 2 Medium" panose="00000600000000000000" pitchFamily="50" charset="0"/>
+                <a:cs typeface="Simplon BP Regular"/>
+              </a:rPr>
+              <a:t>Implementação de Lista </a:t>
+            </a:r>
+            <a:r>
+              <a:rPr lang="pt-BR" sz="1323" b="1" dirty="0">
+                <a:solidFill>
+                  <a:schemeClr val="tx1"/>
+                </a:solidFill>
+                <a:latin typeface="Exo 2 Medium" panose="00000600000000000000" pitchFamily="50" charset="0"/>
+                <a:cs typeface="Simplon BP Regular"/>
+              </a:rPr>
+              <a:t>#Pedro </a:t>
+            </a:r>
+          </a:p>
+          <a:p>
+            <a:pPr marL="0" lvl="1" indent="-252049">
+              <a:buFont typeface="Wingdings" panose="05000000000000000000" pitchFamily="2" charset="2"/>
+              <a:buChar char="§"/>
+            </a:pPr>
+            <a:r>
+              <a:rPr lang="pt-BR" sz="1323" dirty="0">
+                <a:solidFill>
+                  <a:schemeClr val="tx1"/>
+                </a:solidFill>
+                <a:latin typeface="Exo 2 Medium" panose="00000600000000000000" pitchFamily="50" charset="0"/>
+                <a:cs typeface="Simplon BP Regular"/>
+              </a:rPr>
+              <a:t>CRUD (Login &amp; </a:t>
+            </a:r>
+            <a:r>
+              <a:rPr lang="pt-BR" sz="1323" dirty="0" err="1">
+                <a:solidFill>
+                  <a:schemeClr val="tx1"/>
+                </a:solidFill>
+                <a:latin typeface="Exo 2 Medium" panose="00000600000000000000" pitchFamily="50" charset="0"/>
+                <a:cs typeface="Simplon BP Regular"/>
+              </a:rPr>
+              <a:t>Logoff</a:t>
+            </a:r>
+            <a:r>
+              <a:rPr lang="pt-BR" sz="1323" dirty="0">
+                <a:solidFill>
+                  <a:schemeClr val="tx1"/>
+                </a:solidFill>
+                <a:latin typeface="Exo 2 Medium" panose="00000600000000000000" pitchFamily="50" charset="0"/>
+                <a:cs typeface="Simplon BP Regular"/>
+              </a:rPr>
+              <a:t>) e construção dos </a:t>
+            </a:r>
+            <a:r>
+              <a:rPr lang="pt-BR" sz="1323" dirty="0" err="1">
+                <a:solidFill>
+                  <a:schemeClr val="tx1"/>
+                </a:solidFill>
+                <a:latin typeface="Exo 2 Medium" panose="00000600000000000000" pitchFamily="50" charset="0"/>
+                <a:cs typeface="Simplon BP Regular"/>
+              </a:rPr>
+              <a:t>endpoints</a:t>
+            </a:r>
+            <a:r>
+              <a:rPr lang="pt-BR" sz="1323" dirty="0">
+                <a:solidFill>
+                  <a:schemeClr val="tx1"/>
+                </a:solidFill>
+                <a:latin typeface="Exo 2 Medium" panose="00000600000000000000" pitchFamily="50" charset="0"/>
+                <a:cs typeface="Simplon BP Regular"/>
+              </a:rPr>
+              <a:t> com SpringBoot </a:t>
+            </a:r>
+            <a:r>
+              <a:rPr lang="pt-BR" sz="1323" b="1" dirty="0">
+                <a:solidFill>
+                  <a:schemeClr val="tx1"/>
+                </a:solidFill>
+                <a:latin typeface="Exo 2 Medium" panose="00000600000000000000" pitchFamily="50" charset="0"/>
+                <a:cs typeface="Simplon BP Regular"/>
+              </a:rPr>
+              <a:t>#Wesley</a:t>
+            </a:r>
+            <a:r>
+              <a:rPr lang="pt-BR" sz="1323" dirty="0">
+                <a:solidFill>
+                  <a:schemeClr val="tx1"/>
+                </a:solidFill>
+                <a:latin typeface="Exo 2 Medium" panose="00000600000000000000" pitchFamily="50" charset="0"/>
+                <a:cs typeface="Simplon BP Regular"/>
+              </a:rPr>
+              <a:t> </a:t>
+            </a:r>
+          </a:p>
+          <a:p>
+            <a:pPr marL="0" lvl="1"/>
+            <a:endParaRPr lang="pt-BR" sz="1323" b="1" dirty="0">
+              <a:solidFill>
+                <a:schemeClr val="tx1"/>
+              </a:solidFill>
+              <a:latin typeface="Exo 2 Medium" panose="00000600000000000000" pitchFamily="50" charset="0"/>
+              <a:cs typeface="Simplon BP Regular"/>
+            </a:endParaRPr>
+          </a:p>
+          <a:p>
+            <a:pPr marL="0" lvl="1" defTabSz="672130"/>
+            <a:r>
+              <a:rPr lang="pt-BR" sz="1323" b="1" dirty="0">
+                <a:solidFill>
+                  <a:schemeClr val="tx1"/>
+                </a:solidFill>
+                <a:latin typeface="Exo 2 Medium" panose="00000600000000000000" pitchFamily="50" charset="0"/>
+                <a:cs typeface="Simplon BP Regular"/>
+              </a:rPr>
+              <a:t>Frente Front </a:t>
+            </a:r>
+            <a:r>
+              <a:rPr lang="pt-BR" sz="1323" b="1" dirty="0" err="1">
+                <a:solidFill>
+                  <a:schemeClr val="tx1"/>
+                </a:solidFill>
+                <a:latin typeface="Exo 2 Medium" panose="00000600000000000000" pitchFamily="50" charset="0"/>
+                <a:cs typeface="Simplon BP Regular"/>
+              </a:rPr>
+              <a:t>End</a:t>
+            </a:r>
+            <a:endParaRPr lang="pt-BR" sz="1323" b="1" dirty="0">
+              <a:solidFill>
+                <a:schemeClr val="tx1"/>
+              </a:solidFill>
+              <a:latin typeface="Exo 2 Medium" panose="00000600000000000000" pitchFamily="50" charset="0"/>
+              <a:cs typeface="Simplon BP Regular"/>
+            </a:endParaRPr>
+          </a:p>
+          <a:p>
+            <a:pPr marL="0" lvl="1" indent="-252049">
+              <a:buFont typeface="Wingdings" panose="05000000000000000000" pitchFamily="2" charset="2"/>
+              <a:buChar char="§"/>
+            </a:pPr>
+            <a:r>
+              <a:rPr lang="pt-BR" sz="1323" dirty="0">
+                <a:solidFill>
+                  <a:schemeClr val="tx1"/>
+                </a:solidFill>
+                <a:latin typeface="Exo 2 Medium" panose="00000600000000000000" pitchFamily="50" charset="0"/>
+                <a:cs typeface="Simplon BP Regular"/>
+              </a:rPr>
+              <a:t>Continuação da prototipação da Aplicação de agendamentos </a:t>
+            </a:r>
+            <a:r>
+              <a:rPr lang="pt-BR" sz="1323" b="1" dirty="0">
+                <a:solidFill>
+                  <a:schemeClr val="tx1"/>
+                </a:solidFill>
+                <a:latin typeface="Exo 2 Medium" panose="00000600000000000000" pitchFamily="50" charset="0"/>
+                <a:cs typeface="Simplon BP Regular"/>
+              </a:rPr>
+              <a:t>#Ferraz e Vinicius</a:t>
+            </a:r>
+          </a:p>
+          <a:p>
+            <a:pPr marL="0" lvl="1" indent="-252049">
+              <a:buFont typeface="Wingdings" panose="05000000000000000000" pitchFamily="2" charset="2"/>
+              <a:buChar char="§"/>
+            </a:pPr>
+            <a:r>
+              <a:rPr lang="pt-BR" sz="1323" dirty="0">
+                <a:solidFill>
+                  <a:schemeClr val="tx1"/>
+                </a:solidFill>
+                <a:latin typeface="Exo 2 Medium" panose="00000600000000000000" pitchFamily="50" charset="0"/>
+                <a:cs typeface="Simplon BP Regular"/>
+              </a:rPr>
+              <a:t>Tela de Cadastro com React </a:t>
+            </a:r>
+            <a:r>
+              <a:rPr lang="pt-BR" sz="1323" b="1" dirty="0">
+                <a:solidFill>
+                  <a:schemeClr val="tx1"/>
+                </a:solidFill>
+                <a:latin typeface="Exo 2 Medium" panose="00000600000000000000" pitchFamily="50" charset="0"/>
+                <a:cs typeface="Simplon BP Regular"/>
+              </a:rPr>
+              <a:t>#Equipe</a:t>
+            </a:r>
+          </a:p>
+          <a:p>
+            <a:pPr marL="0" lvl="1" indent="-252049">
+              <a:buFont typeface="Wingdings" panose="05000000000000000000" pitchFamily="2" charset="2"/>
+              <a:buChar char="§"/>
+            </a:pPr>
+            <a:endParaRPr lang="pt-BR" sz="1600" b="1" dirty="0">
+              <a:solidFill>
+                <a:schemeClr val="tx1"/>
+              </a:solidFill>
+              <a:latin typeface="Exo 2 Medium" panose="00000600000000000000" pitchFamily="50" charset="0"/>
+              <a:cs typeface="Simplon BP Regular"/>
+            </a:endParaRPr>
+          </a:p>
+          <a:p>
+            <a:pPr marL="0" lvl="1" defTabSz="672130"/>
+            <a:r>
+              <a:rPr lang="pt-BR" sz="1320" b="1" dirty="0">
+                <a:solidFill>
+                  <a:schemeClr val="tx1"/>
+                </a:solidFill>
+                <a:latin typeface="Exo 2 Medium" panose="00000600000000000000" pitchFamily="50" charset="0"/>
+                <a:cs typeface="Simplon BP Regular"/>
+              </a:rPr>
+              <a:t>Frente Negócios</a:t>
+            </a:r>
+            <a:endParaRPr lang="pt-BR" sz="1320" dirty="0">
+              <a:solidFill>
+                <a:schemeClr val="tx1"/>
+              </a:solidFill>
+              <a:latin typeface="Exo 2 Medium" panose="00000600000000000000" pitchFamily="50" charset="0"/>
+              <a:cs typeface="Simplon BP Regular"/>
+            </a:endParaRPr>
+          </a:p>
+          <a:p>
+            <a:pPr marL="0" lvl="1" indent="-252049">
+              <a:buFont typeface="Wingdings" panose="05000000000000000000" pitchFamily="2" charset="2"/>
+              <a:buChar char="§"/>
+            </a:pPr>
+            <a:r>
+              <a:rPr lang="pt-BR" sz="1320" dirty="0">
+                <a:latin typeface="Exo 2 Medium" panose="00000600000000000000" pitchFamily="50" charset="0"/>
+                <a:cs typeface="Simplon BP Regular"/>
+              </a:rPr>
+              <a:t>Diagrama de Solução de Software com Containers </a:t>
+            </a:r>
+            <a:r>
+              <a:rPr lang="pt-BR" sz="1320" b="1" dirty="0">
+                <a:latin typeface="Exo 2 Medium" panose="00000600000000000000" pitchFamily="50" charset="0"/>
+                <a:cs typeface="Simplon BP Regular"/>
+              </a:rPr>
+              <a:t>#Equipe</a:t>
+            </a:r>
+          </a:p>
+          <a:p>
+            <a:pPr marL="0" lvl="1" indent="-252049">
+              <a:buFont typeface="Wingdings" panose="05000000000000000000" pitchFamily="2" charset="2"/>
+              <a:buChar char="§"/>
+            </a:pPr>
+            <a:endParaRPr lang="pt-BR" sz="1320" dirty="0">
+              <a:solidFill>
+                <a:schemeClr val="tx1"/>
+              </a:solidFill>
+              <a:latin typeface="Exo 2 Medium" panose="00000600000000000000" pitchFamily="50" charset="0"/>
+              <a:cs typeface="Simplon BP Regular"/>
+            </a:endParaRPr>
+          </a:p>
+          <a:p>
+            <a:pPr marL="0" lvl="1" indent="-252049">
+              <a:buFont typeface="Wingdings" panose="05000000000000000000" pitchFamily="2" charset="2"/>
+              <a:buChar char="§"/>
+            </a:pPr>
+            <a:endParaRPr lang="pt-BR" sz="1320" dirty="0">
+              <a:solidFill>
+                <a:schemeClr val="tx1"/>
+              </a:solidFill>
+              <a:latin typeface="Exo 2 Medium" panose="00000600000000000000" pitchFamily="50" charset="0"/>
+              <a:cs typeface="Simplon BP Regular"/>
+            </a:endParaRPr>
+          </a:p>
+          <a:p>
+            <a:pPr marL="0" lvl="1" indent="-252049">
+              <a:buFont typeface="Wingdings" panose="05000000000000000000" pitchFamily="2" charset="2"/>
+              <a:buChar char="§"/>
+            </a:pPr>
+            <a:endParaRPr lang="pt-BR" sz="1320" dirty="0">
+              <a:solidFill>
+                <a:schemeClr val="tx1"/>
+              </a:solidFill>
+              <a:latin typeface="Exo 2 Medium" panose="00000600000000000000" pitchFamily="50" charset="0"/>
+              <a:cs typeface="Simplon BP Regular"/>
+            </a:endParaRPr>
+          </a:p>
+          <a:p>
+            <a:pPr marL="0" lvl="1" indent="-252049">
+              <a:buFont typeface="Wingdings" panose="05000000000000000000" pitchFamily="2" charset="2"/>
+              <a:buChar char="§"/>
+            </a:pPr>
+            <a:endParaRPr lang="pt-BR" sz="1320" b="1" dirty="0">
+              <a:solidFill>
+                <a:schemeClr val="tx1"/>
+              </a:solidFill>
+              <a:latin typeface="Exo 2 Medium" panose="00000600000000000000" pitchFamily="50" charset="0"/>
+              <a:cs typeface="Simplon BP Regular"/>
+            </a:endParaRPr>
+          </a:p>
+          <a:p>
+            <a:pPr marL="0" lvl="1" indent="-252049">
+              <a:buFont typeface="Wingdings" panose="05000000000000000000" pitchFamily="2" charset="2"/>
+              <a:buChar char="§"/>
+            </a:pPr>
+            <a:endParaRPr lang="pt-BR" sz="1320" b="1" dirty="0">
+              <a:solidFill>
+                <a:schemeClr val="tx1"/>
+              </a:solidFill>
+              <a:latin typeface="Exo 2 Medium" panose="00000600000000000000" pitchFamily="50" charset="0"/>
+              <a:cs typeface="Simplon BP Regular"/>
+            </a:endParaRPr>
+          </a:p>
+          <a:p>
+            <a:pPr marL="0" lvl="1"/>
+            <a:endParaRPr lang="pt-BR" sz="1320" b="1" dirty="0">
+              <a:solidFill>
+                <a:schemeClr val="tx1"/>
+              </a:solidFill>
+              <a:latin typeface="Exo 2 Medium" panose="00000600000000000000" pitchFamily="50" charset="0"/>
+              <a:cs typeface="Simplon BP Regular"/>
+            </a:endParaRPr>
+          </a:p>
+        </p:txBody>
+      </p:sp>
+      <p:sp>
+        <p:nvSpPr>
+          <p:cNvPr id="6" name="Oval 134">
+            <a:extLst>
+              <a:ext uri="{FF2B5EF4-FFF2-40B4-BE49-F238E27FC236}">
+                <a16:creationId xmlns:a16="http://schemas.microsoft.com/office/drawing/2014/main" id="{70825C6F-9257-4CF5-8C62-1CA1EB2F8815}"/>
+              </a:ext>
+            </a:extLst>
+          </p:cNvPr>
+          <p:cNvSpPr>
+            <a:spLocks noChangeAspect="1"/>
+          </p:cNvSpPr>
+          <p:nvPr/>
+        </p:nvSpPr>
+        <p:spPr>
+          <a:xfrm>
+            <a:off x="9323960" y="297930"/>
+            <a:ext cx="211404" cy="211689"/>
+          </a:xfrm>
+          <a:prstGeom prst="ellipse">
+            <a:avLst/>
+          </a:prstGeom>
+          <a:solidFill>
+            <a:srgbClr val="1BCF13"/>
+          </a:solidFill>
+          <a:ln w="12700">
+            <a:solidFill>
+              <a:schemeClr val="accent3"/>
+            </a:solidFill>
+          </a:ln>
+        </p:spPr>
+        <p:style>
+          <a:lnRef idx="2">
+            <a:schemeClr val="accent1">
+              <a:shade val="50000"/>
+            </a:schemeClr>
+          </a:lnRef>
+          <a:fillRef idx="1">
+            <a:schemeClr val="accent1"/>
+          </a:fillRef>
+          <a:effectRef idx="0">
+            <a:schemeClr val="accent1"/>
+          </a:effectRef>
+          <a:fontRef idx="minor">
+            <a:schemeClr val="lt1"/>
+          </a:fontRef>
+        </p:style>
+        <p:txBody>
+          <a:bodyPr wrap="none" lIns="52922" tIns="52922" rIns="52922" rtlCol="0" anchor="ctr"/>
+          <a:lstStyle/>
+          <a:p>
+            <a:pPr algn="ctr" defTabSz="672130"/>
+            <a:endParaRPr lang="en-US" sz="1176" dirty="0">
+              <a:solidFill>
+                <a:prstClr val="black"/>
+              </a:solidFill>
+              <a:highlight>
+                <a:srgbClr val="FFFF00"/>
+              </a:highlight>
+              <a:latin typeface="Exo 2 Medium" panose="00000600000000000000" pitchFamily="50" charset="0"/>
+              <a:cs typeface="Simplon BP Regular"/>
+            </a:endParaRPr>
+          </a:p>
+        </p:txBody>
+      </p:sp>
+      <p:sp>
+        <p:nvSpPr>
+          <p:cNvPr id="9" name="Oval 134">
+            <a:extLst>
+              <a:ext uri="{FF2B5EF4-FFF2-40B4-BE49-F238E27FC236}">
+                <a16:creationId xmlns:a16="http://schemas.microsoft.com/office/drawing/2014/main" id="{B60B13C9-0C70-4C0F-82B2-D0CD4FDFC1F0}"/>
+              </a:ext>
+            </a:extLst>
+          </p:cNvPr>
+          <p:cNvSpPr>
+            <a:spLocks noChangeAspect="1"/>
+          </p:cNvSpPr>
+          <p:nvPr/>
+        </p:nvSpPr>
+        <p:spPr>
+          <a:xfrm>
+            <a:off x="12155999" y="297930"/>
+            <a:ext cx="211404" cy="211689"/>
+          </a:xfrm>
+          <a:prstGeom prst="ellipse">
+            <a:avLst/>
+          </a:prstGeom>
+          <a:solidFill>
+            <a:srgbClr val="1BCF13"/>
+          </a:solidFill>
+          <a:ln w="12700">
+            <a:solidFill>
+              <a:schemeClr val="accent3"/>
+            </a:solidFill>
+          </a:ln>
+        </p:spPr>
+        <p:style>
+          <a:lnRef idx="2">
+            <a:schemeClr val="accent1">
+              <a:shade val="50000"/>
+            </a:schemeClr>
+          </a:lnRef>
+          <a:fillRef idx="1">
+            <a:schemeClr val="accent1"/>
+          </a:fillRef>
+          <a:effectRef idx="0">
+            <a:schemeClr val="accent1"/>
+          </a:effectRef>
+          <a:fontRef idx="minor">
+            <a:schemeClr val="lt1"/>
+          </a:fontRef>
+        </p:style>
+        <p:txBody>
+          <a:bodyPr wrap="none" lIns="52922" tIns="52922" rIns="52922" rtlCol="0" anchor="ctr"/>
+          <a:lstStyle/>
+          <a:p>
+            <a:pPr algn="ctr" defTabSz="672130"/>
+            <a:endParaRPr lang="en-US" sz="1176" dirty="0">
+              <a:solidFill>
+                <a:prstClr val="black"/>
+              </a:solidFill>
+              <a:latin typeface="Exo 2 Medium" panose="00000600000000000000" pitchFamily="50" charset="0"/>
+              <a:cs typeface="Simplon BP Regular"/>
+            </a:endParaRPr>
+          </a:p>
+        </p:txBody>
+      </p:sp>
+      <p:sp>
+        <p:nvSpPr>
+          <p:cNvPr id="44" name="Oval 120">
+            <a:extLst>
+              <a:ext uri="{FF2B5EF4-FFF2-40B4-BE49-F238E27FC236}">
+                <a16:creationId xmlns:a16="http://schemas.microsoft.com/office/drawing/2014/main" id="{2688D066-DD5D-4246-B846-8AD1218C78EC}"/>
+              </a:ext>
+            </a:extLst>
+          </p:cNvPr>
+          <p:cNvSpPr>
+            <a:spLocks noChangeAspect="1"/>
+          </p:cNvSpPr>
+          <p:nvPr/>
+        </p:nvSpPr>
+        <p:spPr>
+          <a:xfrm>
+            <a:off x="10188056" y="297930"/>
+            <a:ext cx="211404" cy="211689"/>
+          </a:xfrm>
+          <a:prstGeom prst="ellipse">
+            <a:avLst/>
+          </a:prstGeom>
+          <a:solidFill>
+            <a:srgbClr val="1BCF13"/>
+          </a:solidFill>
+          <a:ln w="12700">
+            <a:solidFill>
+              <a:schemeClr val="accent3"/>
+            </a:solidFill>
+          </a:ln>
+        </p:spPr>
+        <p:style>
+          <a:lnRef idx="2">
+            <a:schemeClr val="accent1">
+              <a:shade val="50000"/>
+            </a:schemeClr>
+          </a:lnRef>
+          <a:fillRef idx="1">
+            <a:schemeClr val="accent1"/>
+          </a:fillRef>
+          <a:effectRef idx="0">
+            <a:schemeClr val="accent1"/>
+          </a:effectRef>
+          <a:fontRef idx="minor">
+            <a:schemeClr val="lt1"/>
+          </a:fontRef>
+        </p:style>
+        <p:txBody>
+          <a:bodyPr wrap="none" lIns="52922" tIns="52922" rIns="52922" rtlCol="0" anchor="ctr"/>
+          <a:lstStyle/>
+          <a:p>
+            <a:pPr algn="ctr" defTabSz="672130"/>
+            <a:endParaRPr lang="en-US" sz="1176" dirty="0">
+              <a:solidFill>
+                <a:prstClr val="black"/>
+              </a:solidFill>
+              <a:latin typeface="Exo 2 Medium" panose="00000600000000000000" pitchFamily="50" charset="0"/>
+              <a:cs typeface="Simplon BP Regular"/>
+            </a:endParaRPr>
+          </a:p>
+        </p:txBody>
+      </p:sp>
+      <p:sp>
+        <p:nvSpPr>
+          <p:cNvPr id="5" name="Retângulo 4">
+            <a:extLst>
+              <a:ext uri="{FF2B5EF4-FFF2-40B4-BE49-F238E27FC236}">
+                <a16:creationId xmlns:a16="http://schemas.microsoft.com/office/drawing/2014/main" id="{A1C14918-6027-46B3-96BF-C5F7FDEC3276}"/>
+              </a:ext>
+            </a:extLst>
+          </p:cNvPr>
+          <p:cNvSpPr/>
+          <p:nvPr/>
+        </p:nvSpPr>
+        <p:spPr>
+          <a:xfrm>
+            <a:off x="8017619" y="209534"/>
+            <a:ext cx="5041889" cy="618769"/>
+          </a:xfrm>
+          <a:prstGeom prst="rect">
+            <a:avLst/>
+          </a:prstGeom>
+          <a:noFill/>
+          <a:ln w="6350">
+            <a:solidFill>
+              <a:schemeClr val="bg1">
+                <a:lumMod val="75000"/>
+              </a:schemeClr>
+            </a:solidFill>
+          </a:ln>
+        </p:spPr>
+        <p:style>
+          <a:lnRef idx="2">
+            <a:schemeClr val="accent1">
+              <a:shade val="50000"/>
+            </a:schemeClr>
+          </a:lnRef>
+          <a:fillRef idx="1">
+            <a:schemeClr val="accent1"/>
+          </a:fillRef>
+          <a:effectRef idx="0">
+            <a:schemeClr val="accent1"/>
+          </a:effectRef>
+          <a:fontRef idx="minor">
+            <a:schemeClr val="lt1"/>
+          </a:fontRef>
+        </p:style>
+        <p:txBody>
+          <a:bodyPr rtlCol="0" anchor="ctr"/>
+          <a:lstStyle/>
+          <a:p>
+            <a:pPr algn="ctr"/>
+            <a:endParaRPr lang="pt-BR">
+              <a:latin typeface="Exo 2 Medium" panose="00000600000000000000" pitchFamily="50" charset="0"/>
+            </a:endParaRPr>
+          </a:p>
+        </p:txBody>
+      </p:sp>
+      <p:sp>
+        <p:nvSpPr>
+          <p:cNvPr id="8" name="TextBox 138">
+            <a:extLst>
+              <a:ext uri="{FF2B5EF4-FFF2-40B4-BE49-F238E27FC236}">
+                <a16:creationId xmlns:a16="http://schemas.microsoft.com/office/drawing/2014/main" id="{5CE7D08C-795B-4BF1-97F6-F9773F4E9F4C}"/>
+              </a:ext>
+            </a:extLst>
+          </p:cNvPr>
+          <p:cNvSpPr txBox="1"/>
+          <p:nvPr/>
+        </p:nvSpPr>
+        <p:spPr>
+          <a:xfrm>
+            <a:off x="9715810" y="51570"/>
+            <a:ext cx="1478088" cy="211688"/>
+          </a:xfrm>
+          <a:prstGeom prst="rect">
+            <a:avLst/>
+          </a:prstGeom>
+          <a:solidFill>
+            <a:schemeClr val="bg1"/>
+          </a:solidFill>
+          <a:ln w="12700">
+            <a:noFill/>
+          </a:ln>
+        </p:spPr>
+        <p:style>
+          <a:lnRef idx="2">
+            <a:schemeClr val="accent4"/>
+          </a:lnRef>
+          <a:fillRef idx="1">
+            <a:schemeClr val="lt1"/>
+          </a:fillRef>
+          <a:effectRef idx="0">
+            <a:schemeClr val="accent4"/>
+          </a:effectRef>
+          <a:fontRef idx="minor">
+            <a:schemeClr val="dk1"/>
+          </a:fontRef>
+        </p:style>
+        <p:txBody>
+          <a:bodyPr wrap="none" lIns="52922" tIns="52922" rIns="52922" bIns="0" rtlCol="0" anchor="b"/>
+          <a:lstStyle>
+            <a:defPPr>
+              <a:defRPr lang="en-US"/>
+            </a:defPPr>
+            <a:lvl1pPr algn="ctr">
+              <a:defRPr sz="1000" b="1">
+                <a:latin typeface="Simplon BP Regular"/>
+                <a:cs typeface="Simplon BP Regular"/>
+              </a:defRPr>
+            </a:lvl1pPr>
+            <a:lvl2pPr>
+              <a:defRPr>
+                <a:solidFill>
+                  <a:schemeClr val="dk1"/>
+                </a:solidFill>
+              </a:defRPr>
+            </a:lvl2pPr>
+            <a:lvl3pPr>
+              <a:defRPr>
+                <a:solidFill>
+                  <a:schemeClr val="dk1"/>
+                </a:solidFill>
+              </a:defRPr>
+            </a:lvl3pPr>
+            <a:lvl4pPr>
+              <a:defRPr>
+                <a:solidFill>
+                  <a:schemeClr val="dk1"/>
+                </a:solidFill>
+              </a:defRPr>
+            </a:lvl4pPr>
+            <a:lvl5pPr>
+              <a:defRPr>
+                <a:solidFill>
+                  <a:schemeClr val="dk1"/>
+                </a:solidFill>
+              </a:defRPr>
+            </a:lvl5pPr>
+            <a:lvl6pPr>
+              <a:defRPr>
+                <a:solidFill>
+                  <a:schemeClr val="dk1"/>
+                </a:solidFill>
+              </a:defRPr>
+            </a:lvl6pPr>
+            <a:lvl7pPr>
+              <a:defRPr>
+                <a:solidFill>
+                  <a:schemeClr val="dk1"/>
+                </a:solidFill>
+              </a:defRPr>
+            </a:lvl7pPr>
+            <a:lvl8pPr>
+              <a:defRPr>
+                <a:solidFill>
+                  <a:schemeClr val="dk1"/>
+                </a:solidFill>
+              </a:defRPr>
+            </a:lvl8pPr>
+            <a:lvl9pPr>
+              <a:defRPr>
+                <a:solidFill>
+                  <a:schemeClr val="dk1"/>
+                </a:solidFill>
+              </a:defRPr>
+            </a:lvl9pPr>
+          </a:lstStyle>
+          <a:p>
+            <a:pPr defTabSz="672130"/>
+            <a:r>
+              <a:rPr lang="en-US" sz="1176" b="0" dirty="0">
+                <a:solidFill>
+                  <a:prstClr val="black"/>
+                </a:solidFill>
+                <a:latin typeface="Exo 2 Medium" panose="00000600000000000000" pitchFamily="50" charset="0"/>
+              </a:rPr>
+              <a:t>    Farol do Projeto   </a:t>
+            </a:r>
+          </a:p>
+        </p:txBody>
+      </p:sp>
+    </p:spTree>
+    <p:extLst>
+      <p:ext uri="{BB962C8B-B14F-4D97-AF65-F5344CB8AC3E}">
+        <p14:creationId xmlns:p14="http://schemas.microsoft.com/office/powerpoint/2010/main" val="124554597"/>
       </p:ext>
     </p:extLst>
   </p:cSld>

</xml_diff>

<commit_message>
Adiciona o status report da oitava semana (07/10)
</commit_message>
<xml_diff>
--- a/documentacao/Status Report/Status_Report_-_Grupo_09.pptx
+++ b/documentacao/Status Report/Status_Report_-_Grupo_09.pptx
@@ -7,10 +7,10 @@
     <p:sldMasterId id="2147483665" r:id="rId6"/>
   </p:sldMasterIdLst>
   <p:notesMasterIdLst>
-    <p:notesMasterId r:id="rId14"/>
+    <p:notesMasterId r:id="rId15"/>
   </p:notesMasterIdLst>
   <p:handoutMasterIdLst>
-    <p:handoutMasterId r:id="rId15"/>
+    <p:handoutMasterId r:id="rId16"/>
   </p:handoutMasterIdLst>
   <p:sldIdLst>
     <p:sldId id="344" r:id="rId7"/>
@@ -20,6 +20,7 @@
     <p:sldId id="474" r:id="rId11"/>
     <p:sldId id="475" r:id="rId12"/>
     <p:sldId id="476" r:id="rId13"/>
+    <p:sldId id="477" r:id="rId14"/>
   </p:sldIdLst>
   <p:sldSz cx="13442950" cy="7561263"/>
   <p:notesSz cx="7104063" cy="10234613"/>
@@ -133,6 +134,7 @@
             <p14:sldId id="474"/>
             <p14:sldId id="475"/>
             <p14:sldId id="476"/>
+            <p14:sldId id="477"/>
           </p14:sldIdLst>
         </p14:section>
       </p14:sectionLst>
@@ -431,7 +433,7 @@
             <a:fld id="{C3CD65D1-5C11-455D-9F9A-0E035F00A0DA}" type="datetimeFigureOut">
               <a:rPr lang="pt-BR" smtClean="0"/>
               <a:pPr/>
-              <a:t>29/09/2021</a:t>
+              <a:t>06/10/2021</a:t>
             </a:fld>
             <a:endParaRPr lang="pt-BR"/>
           </a:p>
@@ -599,7 +601,7 @@
             <a:fld id="{A05DA3EF-18EA-43DE-B1BB-402A3C558822}" type="datetimeFigureOut">
               <a:rPr lang="pt-BR" smtClean="0"/>
               <a:pPr/>
-              <a:t>29/09/2021</a:t>
+              <a:t>06/10/2021</a:t>
             </a:fld>
             <a:endParaRPr lang="pt-BR"/>
           </a:p>
@@ -1504,6 +1506,99 @@
     <p:extLst>
       <p:ext uri="{BB962C8B-B14F-4D97-AF65-F5344CB8AC3E}">
         <p14:creationId xmlns:p14="http://schemas.microsoft.com/office/powerpoint/2010/main" val="1022460388"/>
+      </p:ext>
+    </p:extLst>
+  </p:cSld>
+  <p:clrMapOvr>
+    <a:masterClrMapping/>
+  </p:clrMapOvr>
+</p:notes>
+</file>
+
+<file path=ppt/notesSlides/notesSlide8.xml><?xml version="1.0" encoding="utf-8"?>
+<p:notes xmlns:a="http://schemas.openxmlformats.org/drawingml/2006/main" xmlns:r="http://schemas.openxmlformats.org/officeDocument/2006/relationships" xmlns:p="http://schemas.openxmlformats.org/presentationml/2006/main">
+  <p:cSld>
+    <p:spTree>
+      <p:nvGrpSpPr>
+        <p:cNvPr id="1" name=""/>
+        <p:cNvGrpSpPr/>
+        <p:nvPr/>
+      </p:nvGrpSpPr>
+      <p:grpSpPr>
+        <a:xfrm>
+          <a:off x="0" y="0"/>
+          <a:ext cx="0" cy="0"/>
+          <a:chOff x="0" y="0"/>
+          <a:chExt cx="0" cy="0"/>
+        </a:xfrm>
+      </p:grpSpPr>
+      <p:sp>
+        <p:nvSpPr>
+          <p:cNvPr id="2" name="Slide Image Placeholder 1"/>
+          <p:cNvSpPr>
+            <a:spLocks noGrp="1" noRot="1" noChangeAspect="1"/>
+          </p:cNvSpPr>
+          <p:nvPr>
+            <p:ph type="sldImg"/>
+          </p:nvPr>
+        </p:nvSpPr>
+        <p:spPr/>
+      </p:sp>
+      <p:sp>
+        <p:nvSpPr>
+          <p:cNvPr id="3" name="Notes Placeholder 2"/>
+          <p:cNvSpPr>
+            <a:spLocks noGrp="1"/>
+          </p:cNvSpPr>
+          <p:nvPr>
+            <p:ph type="body" idx="1"/>
+          </p:nvPr>
+        </p:nvSpPr>
+        <p:spPr/>
+        <p:txBody>
+          <a:bodyPr/>
+          <a:lstStyle/>
+          <a:p>
+            <a:endParaRPr lang="en-US"/>
+          </a:p>
+        </p:txBody>
+      </p:sp>
+      <p:sp>
+        <p:nvSpPr>
+          <p:cNvPr id="4" name="Slide Number Placeholder 3"/>
+          <p:cNvSpPr>
+            <a:spLocks noGrp="1"/>
+          </p:cNvSpPr>
+          <p:nvPr>
+            <p:ph type="sldNum" sz="quarter" idx="10"/>
+          </p:nvPr>
+        </p:nvSpPr>
+        <p:spPr/>
+        <p:txBody>
+          <a:bodyPr/>
+          <a:lstStyle/>
+          <a:p>
+            <a:fld id="{B39AF3DB-B6A1-2444-9DD8-53D016F8E638}" type="slidenum">
+              <a:rPr lang="pt-BR" smtClean="0">
+                <a:solidFill>
+                  <a:prstClr val="black"/>
+                </a:solidFill>
+              </a:rPr>
+              <a:pPr/>
+              <a:t>8</a:t>
+            </a:fld>
+            <a:endParaRPr lang="pt-BR">
+              <a:solidFill>
+                <a:prstClr val="black"/>
+              </a:solidFill>
+            </a:endParaRPr>
+          </a:p>
+        </p:txBody>
+      </p:sp>
+    </p:spTree>
+    <p:extLst>
+      <p:ext uri="{BB962C8B-B14F-4D97-AF65-F5344CB8AC3E}">
+        <p14:creationId xmlns:p14="http://schemas.microsoft.com/office/powerpoint/2010/main" val="3290959397"/>
       </p:ext>
     </p:extLst>
   </p:cSld>
@@ -21275,7 +21370,7 @@
         <p:spPr>
           <a:xfrm>
             <a:off x="2400995" y="2809305"/>
-            <a:ext cx="6728346" cy="2031325"/>
+            <a:ext cx="6728346" cy="1708160"/>
           </a:xfrm>
           <a:prstGeom prst="rect">
             <a:avLst/>
@@ -21303,16 +21398,6 @@
                 </a:solidFill>
               </a:rPr>
             </a:br>
-            <a:r>
-              <a:rPr lang="pt-BR" dirty="0">
-                <a:solidFill>
-                  <a:schemeClr val="bg1"/>
-                </a:solidFill>
-              </a:rPr>
-              <a:t>Gabriel Alvares</a:t>
-            </a:r>
-          </a:p>
-          <a:p>
             <a:r>
               <a:rPr lang="pt-BR" dirty="0">
                 <a:solidFill>
@@ -29228,24 +29313,14 @@
               <a:buChar char="§"/>
             </a:pPr>
             <a:r>
-              <a:rPr lang="pt-BR" sz="1323" dirty="0" err="1">
+              <a:rPr lang="pt-BR" sz="1323" dirty="0">
                 <a:solidFill>
                   <a:schemeClr val="tx1"/>
                 </a:solidFill>
                 <a:latin typeface="Exo 2 Medium" panose="00000600000000000000" pitchFamily="50" charset="0"/>
                 <a:cs typeface="Simplon BP Regular"/>
               </a:rPr>
-              <a:t>Codar</a:t>
-            </a:r>
-            <a:r>
-              <a:rPr lang="pt-BR" sz="1323" dirty="0">
-                <a:solidFill>
-                  <a:schemeClr val="tx1"/>
-                </a:solidFill>
-                <a:latin typeface="Exo 2 Medium" panose="00000600000000000000" pitchFamily="50" charset="0"/>
-                <a:cs typeface="Simplon BP Regular"/>
-              </a:rPr>
-              <a:t> Site Institucional </a:t>
+              <a:t>Codar Site Institucional </a:t>
             </a:r>
             <a:r>
               <a:rPr lang="pt-BR" sz="1323" b="1" dirty="0">
@@ -32085,7 +32160,7 @@
                 <a:latin typeface="Exo 2 Medium" panose="00000600000000000000" pitchFamily="50" charset="0"/>
                 <a:cs typeface="Simplon Oi Headline"/>
               </a:rPr>
-              <a:t>SEMANA 6 - 29/09/2021</a:t>
+              <a:t>SEMANA 7 - 29/09/2021</a:t>
             </a:r>
           </a:p>
         </p:txBody>
@@ -34049,6 +34124,2092 @@
     <p:extLst>
       <p:ext uri="{BB962C8B-B14F-4D97-AF65-F5344CB8AC3E}">
         <p14:creationId xmlns:p14="http://schemas.microsoft.com/office/powerpoint/2010/main" val="124554597"/>
+      </p:ext>
+    </p:extLst>
+  </p:cSld>
+  <p:clrMapOvr>
+    <a:masterClrMapping/>
+  </p:clrMapOvr>
+</p:sld>
+</file>
+
+<file path=ppt/slides/slide8.xml><?xml version="1.0" encoding="utf-8"?>
+<p:sld xmlns:a="http://schemas.openxmlformats.org/drawingml/2006/main" xmlns:r="http://schemas.openxmlformats.org/officeDocument/2006/relationships" xmlns:p="http://schemas.openxmlformats.org/presentationml/2006/main">
+  <p:cSld>
+    <p:spTree>
+      <p:nvGrpSpPr>
+        <p:cNvPr id="1" name=""/>
+        <p:cNvGrpSpPr/>
+        <p:nvPr/>
+      </p:nvGrpSpPr>
+      <p:grpSpPr>
+        <a:xfrm>
+          <a:off x="0" y="0"/>
+          <a:ext cx="0" cy="0"/>
+          <a:chOff x="0" y="0"/>
+          <a:chExt cx="0" cy="0"/>
+        </a:xfrm>
+      </p:grpSpPr>
+      <p:sp>
+        <p:nvSpPr>
+          <p:cNvPr id="43" name="Rectangle 42"/>
+          <p:cNvSpPr/>
+          <p:nvPr/>
+        </p:nvSpPr>
+        <p:spPr>
+          <a:xfrm>
+            <a:off x="6804884" y="1106495"/>
+            <a:ext cx="6254624" cy="2191469"/>
+          </a:xfrm>
+          <a:prstGeom prst="rect">
+            <a:avLst/>
+          </a:prstGeom>
+          <a:noFill/>
+          <a:ln w="12700">
+            <a:solidFill>
+              <a:schemeClr val="bg1">
+                <a:lumMod val="50000"/>
+              </a:schemeClr>
+            </a:solidFill>
+          </a:ln>
+        </p:spPr>
+        <p:style>
+          <a:lnRef idx="2">
+            <a:schemeClr val="accent4"/>
+          </a:lnRef>
+          <a:fillRef idx="1">
+            <a:schemeClr val="lt1"/>
+          </a:fillRef>
+          <a:effectRef idx="0">
+            <a:schemeClr val="accent4"/>
+          </a:effectRef>
+          <a:fontRef idx="minor">
+            <a:schemeClr val="dk1"/>
+          </a:fontRef>
+        </p:style>
+        <p:txBody>
+          <a:bodyPr tIns="105844" rtlCol="0" anchor="t"/>
+          <a:lstStyle/>
+          <a:p>
+            <a:pPr defTabSz="672130">
+              <a:spcAft>
+                <a:spcPts val="882"/>
+              </a:spcAft>
+            </a:pPr>
+            <a:endParaRPr lang="pt-BR" sz="1470" dirty="0">
+              <a:solidFill>
+                <a:schemeClr val="tx1"/>
+              </a:solidFill>
+              <a:latin typeface="Exo 2 Medium" panose="00000600000000000000" pitchFamily="50" charset="0"/>
+              <a:cs typeface="Simplon BP Regular"/>
+            </a:endParaRPr>
+          </a:p>
+        </p:txBody>
+      </p:sp>
+      <p:sp>
+        <p:nvSpPr>
+          <p:cNvPr id="3" name="Title 2"/>
+          <p:cNvSpPr>
+            <a:spLocks noGrp="1"/>
+          </p:cNvSpPr>
+          <p:nvPr>
+            <p:ph type="title"/>
+          </p:nvPr>
+        </p:nvSpPr>
+        <p:spPr>
+          <a:xfrm>
+            <a:off x="469692" y="185232"/>
+            <a:ext cx="12098020" cy="800352"/>
+          </a:xfrm>
+        </p:spPr>
+        <p:txBody>
+          <a:bodyPr vert="horz" wrap="square" lIns="105844" tIns="0" rIns="105844" bIns="0" numCol="1" anchor="t" anchorCtr="0" compatLnSpc="1">
+            <a:prstTxWarp prst="textNoShape">
+              <a:avLst/>
+            </a:prstTxWarp>
+            <a:noAutofit/>
+          </a:bodyPr>
+          <a:lstStyle/>
+          <a:p>
+            <a:pPr algn="l">
+              <a:spcAft>
+                <a:spcPts val="882"/>
+              </a:spcAft>
+            </a:pPr>
+            <a:r>
+              <a:rPr lang="en-US" sz="2646" dirty="0">
+                <a:solidFill>
+                  <a:prstClr val="black"/>
+                </a:solidFill>
+                <a:latin typeface="Exo 2 Medium" panose="00000600000000000000" pitchFamily="50" charset="0"/>
+                <a:cs typeface="Simplon Oi Headline"/>
+              </a:rPr>
+              <a:t>SEMANA 8 - 07/10/2021</a:t>
+            </a:r>
+          </a:p>
+        </p:txBody>
+      </p:sp>
+      <p:sp>
+        <p:nvSpPr>
+          <p:cNvPr id="78" name="TextBox 118"/>
+          <p:cNvSpPr txBox="1"/>
+          <p:nvPr/>
+        </p:nvSpPr>
+        <p:spPr>
+          <a:xfrm>
+            <a:off x="11822773" y="576471"/>
+            <a:ext cx="899678" cy="179824"/>
+          </a:xfrm>
+          <a:prstGeom prst="rect">
+            <a:avLst/>
+          </a:prstGeom>
+          <a:noFill/>
+          <a:ln w="12700">
+            <a:noFill/>
+          </a:ln>
+        </p:spPr>
+        <p:style>
+          <a:lnRef idx="2">
+            <a:schemeClr val="accent4"/>
+          </a:lnRef>
+          <a:fillRef idx="1">
+            <a:schemeClr val="lt1"/>
+          </a:fillRef>
+          <a:effectRef idx="0">
+            <a:schemeClr val="accent4"/>
+          </a:effectRef>
+          <a:fontRef idx="minor">
+            <a:schemeClr val="dk1"/>
+          </a:fontRef>
+        </p:style>
+        <p:txBody>
+          <a:bodyPr wrap="none" lIns="52922" tIns="52922" rIns="52922" bIns="0" rtlCol="0" anchor="b"/>
+          <a:lstStyle>
+            <a:defPPr>
+              <a:defRPr lang="en-US"/>
+            </a:defPPr>
+            <a:lvl1pPr algn="ctr">
+              <a:defRPr sz="1000" b="1">
+                <a:latin typeface="Simplon BP Regular"/>
+                <a:cs typeface="Simplon BP Regular"/>
+              </a:defRPr>
+            </a:lvl1pPr>
+            <a:lvl2pPr>
+              <a:defRPr>
+                <a:solidFill>
+                  <a:schemeClr val="dk1"/>
+                </a:solidFill>
+              </a:defRPr>
+            </a:lvl2pPr>
+            <a:lvl3pPr>
+              <a:defRPr>
+                <a:solidFill>
+                  <a:schemeClr val="dk1"/>
+                </a:solidFill>
+              </a:defRPr>
+            </a:lvl3pPr>
+            <a:lvl4pPr>
+              <a:defRPr>
+                <a:solidFill>
+                  <a:schemeClr val="dk1"/>
+                </a:solidFill>
+              </a:defRPr>
+            </a:lvl4pPr>
+            <a:lvl5pPr>
+              <a:defRPr>
+                <a:solidFill>
+                  <a:schemeClr val="dk1"/>
+                </a:solidFill>
+              </a:defRPr>
+            </a:lvl5pPr>
+            <a:lvl6pPr>
+              <a:defRPr>
+                <a:solidFill>
+                  <a:schemeClr val="dk1"/>
+                </a:solidFill>
+              </a:defRPr>
+            </a:lvl6pPr>
+            <a:lvl7pPr>
+              <a:defRPr>
+                <a:solidFill>
+                  <a:schemeClr val="dk1"/>
+                </a:solidFill>
+              </a:defRPr>
+            </a:lvl7pPr>
+            <a:lvl8pPr>
+              <a:defRPr>
+                <a:solidFill>
+                  <a:schemeClr val="dk1"/>
+                </a:solidFill>
+              </a:defRPr>
+            </a:lvl8pPr>
+            <a:lvl9pPr>
+              <a:defRPr>
+                <a:solidFill>
+                  <a:schemeClr val="dk1"/>
+                </a:solidFill>
+              </a:defRPr>
+            </a:lvl9pPr>
+          </a:lstStyle>
+          <a:p>
+            <a:pPr defTabSz="672130"/>
+            <a:r>
+              <a:rPr lang="pt-BR" sz="1176" b="0" dirty="0">
+                <a:solidFill>
+                  <a:prstClr val="black"/>
+                </a:solidFill>
+                <a:latin typeface="Exo 2 Medium" panose="00000600000000000000" pitchFamily="50" charset="0"/>
+              </a:rPr>
+              <a:t>Negócios</a:t>
+            </a:r>
+          </a:p>
+        </p:txBody>
+      </p:sp>
+      <p:sp>
+        <p:nvSpPr>
+          <p:cNvPr id="109" name="Oval 120"/>
+          <p:cNvSpPr>
+            <a:spLocks noChangeAspect="1"/>
+          </p:cNvSpPr>
+          <p:nvPr/>
+        </p:nvSpPr>
+        <p:spPr>
+          <a:xfrm>
+            <a:off x="11193898" y="297930"/>
+            <a:ext cx="211404" cy="211689"/>
+          </a:xfrm>
+          <a:prstGeom prst="ellipse">
+            <a:avLst/>
+          </a:prstGeom>
+          <a:solidFill>
+            <a:srgbClr val="1BCF13"/>
+          </a:solidFill>
+          <a:ln w="12700">
+            <a:solidFill>
+              <a:schemeClr val="accent3"/>
+            </a:solidFill>
+          </a:ln>
+        </p:spPr>
+        <p:style>
+          <a:lnRef idx="2">
+            <a:schemeClr val="accent1">
+              <a:shade val="50000"/>
+            </a:schemeClr>
+          </a:lnRef>
+          <a:fillRef idx="1">
+            <a:schemeClr val="accent1"/>
+          </a:fillRef>
+          <a:effectRef idx="0">
+            <a:schemeClr val="accent1"/>
+          </a:effectRef>
+          <a:fontRef idx="minor">
+            <a:schemeClr val="lt1"/>
+          </a:fontRef>
+        </p:style>
+        <p:txBody>
+          <a:bodyPr wrap="none" lIns="52922" tIns="52922" rIns="52922" rtlCol="0" anchor="ctr"/>
+          <a:lstStyle/>
+          <a:p>
+            <a:pPr algn="ctr" defTabSz="672130"/>
+            <a:endParaRPr lang="en-US" sz="1176" dirty="0">
+              <a:solidFill>
+                <a:prstClr val="black"/>
+              </a:solidFill>
+              <a:latin typeface="Exo 2 Medium" panose="00000600000000000000" pitchFamily="50" charset="0"/>
+              <a:cs typeface="Simplon BP Regular"/>
+            </a:endParaRPr>
+          </a:p>
+        </p:txBody>
+      </p:sp>
+      <p:sp>
+        <p:nvSpPr>
+          <p:cNvPr id="80" name="TextBox 123"/>
+          <p:cNvSpPr txBox="1"/>
+          <p:nvPr/>
+        </p:nvSpPr>
+        <p:spPr>
+          <a:xfrm>
+            <a:off x="10852497" y="576471"/>
+            <a:ext cx="899678" cy="179824"/>
+          </a:xfrm>
+          <a:prstGeom prst="rect">
+            <a:avLst/>
+          </a:prstGeom>
+          <a:noFill/>
+          <a:ln w="12700">
+            <a:noFill/>
+          </a:ln>
+        </p:spPr>
+        <p:style>
+          <a:lnRef idx="2">
+            <a:schemeClr val="accent4"/>
+          </a:lnRef>
+          <a:fillRef idx="1">
+            <a:schemeClr val="lt1"/>
+          </a:fillRef>
+          <a:effectRef idx="0">
+            <a:schemeClr val="accent4"/>
+          </a:effectRef>
+          <a:fontRef idx="minor">
+            <a:schemeClr val="dk1"/>
+          </a:fontRef>
+        </p:style>
+        <p:txBody>
+          <a:bodyPr wrap="none" lIns="52922" tIns="52922" rIns="52922" bIns="0" rtlCol="0" anchor="b"/>
+          <a:lstStyle>
+            <a:defPPr>
+              <a:defRPr lang="en-US"/>
+            </a:defPPr>
+            <a:lvl1pPr algn="ctr">
+              <a:defRPr sz="1000" b="1">
+                <a:latin typeface="Simplon BP Regular"/>
+                <a:cs typeface="Simplon BP Regular"/>
+              </a:defRPr>
+            </a:lvl1pPr>
+            <a:lvl2pPr>
+              <a:defRPr>
+                <a:solidFill>
+                  <a:schemeClr val="dk1"/>
+                </a:solidFill>
+              </a:defRPr>
+            </a:lvl2pPr>
+            <a:lvl3pPr>
+              <a:defRPr>
+                <a:solidFill>
+                  <a:schemeClr val="dk1"/>
+                </a:solidFill>
+              </a:defRPr>
+            </a:lvl3pPr>
+            <a:lvl4pPr>
+              <a:defRPr>
+                <a:solidFill>
+                  <a:schemeClr val="dk1"/>
+                </a:solidFill>
+              </a:defRPr>
+            </a:lvl4pPr>
+            <a:lvl5pPr>
+              <a:defRPr>
+                <a:solidFill>
+                  <a:schemeClr val="dk1"/>
+                </a:solidFill>
+              </a:defRPr>
+            </a:lvl5pPr>
+            <a:lvl6pPr>
+              <a:defRPr>
+                <a:solidFill>
+                  <a:schemeClr val="dk1"/>
+                </a:solidFill>
+              </a:defRPr>
+            </a:lvl6pPr>
+            <a:lvl7pPr>
+              <a:defRPr>
+                <a:solidFill>
+                  <a:schemeClr val="dk1"/>
+                </a:solidFill>
+              </a:defRPr>
+            </a:lvl7pPr>
+            <a:lvl8pPr>
+              <a:defRPr>
+                <a:solidFill>
+                  <a:schemeClr val="dk1"/>
+                </a:solidFill>
+              </a:defRPr>
+            </a:lvl8pPr>
+            <a:lvl9pPr>
+              <a:defRPr>
+                <a:solidFill>
+                  <a:schemeClr val="dk1"/>
+                </a:solidFill>
+              </a:defRPr>
+            </a:lvl9pPr>
+          </a:lstStyle>
+          <a:p>
+            <a:pPr defTabSz="672130"/>
+            <a:r>
+              <a:rPr lang="pt-BR" sz="1176" b="0" dirty="0">
+                <a:solidFill>
+                  <a:prstClr val="black"/>
+                </a:solidFill>
+                <a:latin typeface="Exo 2 Medium" panose="00000600000000000000" pitchFamily="50" charset="0"/>
+              </a:rPr>
+              <a:t>Plataforma</a:t>
+            </a:r>
+          </a:p>
+        </p:txBody>
+      </p:sp>
+      <p:sp>
+        <p:nvSpPr>
+          <p:cNvPr id="82" name="TextBox 128"/>
+          <p:cNvSpPr txBox="1"/>
+          <p:nvPr/>
+        </p:nvSpPr>
+        <p:spPr>
+          <a:xfrm>
+            <a:off x="9854245" y="576471"/>
+            <a:ext cx="899678" cy="179824"/>
+          </a:xfrm>
+          <a:prstGeom prst="rect">
+            <a:avLst/>
+          </a:prstGeom>
+          <a:noFill/>
+          <a:ln w="12700">
+            <a:noFill/>
+          </a:ln>
+        </p:spPr>
+        <p:style>
+          <a:lnRef idx="2">
+            <a:schemeClr val="accent4"/>
+          </a:lnRef>
+          <a:fillRef idx="1">
+            <a:schemeClr val="lt1"/>
+          </a:fillRef>
+          <a:effectRef idx="0">
+            <a:schemeClr val="accent4"/>
+          </a:effectRef>
+          <a:fontRef idx="minor">
+            <a:schemeClr val="dk1"/>
+          </a:fontRef>
+        </p:style>
+        <p:txBody>
+          <a:bodyPr wrap="none" lIns="52922" tIns="52922" rIns="52922" bIns="0" rtlCol="0" anchor="b"/>
+          <a:lstStyle>
+            <a:defPPr>
+              <a:defRPr lang="en-US"/>
+            </a:defPPr>
+            <a:lvl1pPr algn="ctr">
+              <a:defRPr sz="1000" b="1">
+                <a:latin typeface="Simplon BP Regular"/>
+                <a:cs typeface="Simplon BP Regular"/>
+              </a:defRPr>
+            </a:lvl1pPr>
+            <a:lvl2pPr>
+              <a:defRPr>
+                <a:solidFill>
+                  <a:schemeClr val="dk1"/>
+                </a:solidFill>
+              </a:defRPr>
+            </a:lvl2pPr>
+            <a:lvl3pPr>
+              <a:defRPr>
+                <a:solidFill>
+                  <a:schemeClr val="dk1"/>
+                </a:solidFill>
+              </a:defRPr>
+            </a:lvl3pPr>
+            <a:lvl4pPr>
+              <a:defRPr>
+                <a:solidFill>
+                  <a:schemeClr val="dk1"/>
+                </a:solidFill>
+              </a:defRPr>
+            </a:lvl4pPr>
+            <a:lvl5pPr>
+              <a:defRPr>
+                <a:solidFill>
+                  <a:schemeClr val="dk1"/>
+                </a:solidFill>
+              </a:defRPr>
+            </a:lvl5pPr>
+            <a:lvl6pPr>
+              <a:defRPr>
+                <a:solidFill>
+                  <a:schemeClr val="dk1"/>
+                </a:solidFill>
+              </a:defRPr>
+            </a:lvl6pPr>
+            <a:lvl7pPr>
+              <a:defRPr>
+                <a:solidFill>
+                  <a:schemeClr val="dk1"/>
+                </a:solidFill>
+              </a:defRPr>
+            </a:lvl7pPr>
+            <a:lvl8pPr>
+              <a:defRPr>
+                <a:solidFill>
+                  <a:schemeClr val="dk1"/>
+                </a:solidFill>
+              </a:defRPr>
+            </a:lvl8pPr>
+            <a:lvl9pPr>
+              <a:defRPr>
+                <a:solidFill>
+                  <a:schemeClr val="dk1"/>
+                </a:solidFill>
+              </a:defRPr>
+            </a:lvl9pPr>
+          </a:lstStyle>
+          <a:p>
+            <a:pPr defTabSz="672130"/>
+            <a:r>
+              <a:rPr lang="pt-BR" sz="1176" b="0" dirty="0">
+                <a:solidFill>
+                  <a:prstClr val="black"/>
+                </a:solidFill>
+                <a:latin typeface="Exo 2 Medium" panose="00000600000000000000" pitchFamily="50" charset="0"/>
+              </a:rPr>
+              <a:t>Back</a:t>
+            </a:r>
+          </a:p>
+        </p:txBody>
+      </p:sp>
+      <p:sp>
+        <p:nvSpPr>
+          <p:cNvPr id="84" name="TextBox 133"/>
+          <p:cNvSpPr txBox="1"/>
+          <p:nvPr/>
+        </p:nvSpPr>
+        <p:spPr>
+          <a:xfrm>
+            <a:off x="8986650" y="576471"/>
+            <a:ext cx="899678" cy="179824"/>
+          </a:xfrm>
+          <a:prstGeom prst="rect">
+            <a:avLst/>
+          </a:prstGeom>
+          <a:noFill/>
+          <a:ln w="12700">
+            <a:noFill/>
+          </a:ln>
+        </p:spPr>
+        <p:style>
+          <a:lnRef idx="2">
+            <a:schemeClr val="accent4"/>
+          </a:lnRef>
+          <a:fillRef idx="1">
+            <a:schemeClr val="lt1"/>
+          </a:fillRef>
+          <a:effectRef idx="0">
+            <a:schemeClr val="accent4"/>
+          </a:effectRef>
+          <a:fontRef idx="minor">
+            <a:schemeClr val="dk1"/>
+          </a:fontRef>
+        </p:style>
+        <p:txBody>
+          <a:bodyPr wrap="none" lIns="52922" tIns="52922" rIns="52922" bIns="0" rtlCol="0" anchor="b"/>
+          <a:lstStyle>
+            <a:defPPr>
+              <a:defRPr lang="en-US"/>
+            </a:defPPr>
+            <a:lvl1pPr algn="ctr">
+              <a:defRPr sz="1000" b="1">
+                <a:latin typeface="Simplon BP Regular"/>
+                <a:cs typeface="Simplon BP Regular"/>
+              </a:defRPr>
+            </a:lvl1pPr>
+            <a:lvl2pPr>
+              <a:defRPr>
+                <a:solidFill>
+                  <a:schemeClr val="dk1"/>
+                </a:solidFill>
+              </a:defRPr>
+            </a:lvl2pPr>
+            <a:lvl3pPr>
+              <a:defRPr>
+                <a:solidFill>
+                  <a:schemeClr val="dk1"/>
+                </a:solidFill>
+              </a:defRPr>
+            </a:lvl3pPr>
+            <a:lvl4pPr>
+              <a:defRPr>
+                <a:solidFill>
+                  <a:schemeClr val="dk1"/>
+                </a:solidFill>
+              </a:defRPr>
+            </a:lvl4pPr>
+            <a:lvl5pPr>
+              <a:defRPr>
+                <a:solidFill>
+                  <a:schemeClr val="dk1"/>
+                </a:solidFill>
+              </a:defRPr>
+            </a:lvl5pPr>
+            <a:lvl6pPr>
+              <a:defRPr>
+                <a:solidFill>
+                  <a:schemeClr val="dk1"/>
+                </a:solidFill>
+              </a:defRPr>
+            </a:lvl6pPr>
+            <a:lvl7pPr>
+              <a:defRPr>
+                <a:solidFill>
+                  <a:schemeClr val="dk1"/>
+                </a:solidFill>
+              </a:defRPr>
+            </a:lvl7pPr>
+            <a:lvl8pPr>
+              <a:defRPr>
+                <a:solidFill>
+                  <a:schemeClr val="dk1"/>
+                </a:solidFill>
+              </a:defRPr>
+            </a:lvl8pPr>
+            <a:lvl9pPr>
+              <a:defRPr>
+                <a:solidFill>
+                  <a:schemeClr val="dk1"/>
+                </a:solidFill>
+              </a:defRPr>
+            </a:lvl9pPr>
+          </a:lstStyle>
+          <a:p>
+            <a:pPr defTabSz="672130"/>
+            <a:r>
+              <a:rPr lang="pt-BR" sz="1176" b="0" dirty="0">
+                <a:solidFill>
+                  <a:prstClr val="black"/>
+                </a:solidFill>
+                <a:latin typeface="Exo 2 Medium" panose="00000600000000000000" pitchFamily="50" charset="0"/>
+              </a:rPr>
+              <a:t>Front</a:t>
+            </a:r>
+          </a:p>
+        </p:txBody>
+      </p:sp>
+      <p:sp>
+        <p:nvSpPr>
+          <p:cNvPr id="88" name="Oval 134"/>
+          <p:cNvSpPr>
+            <a:spLocks noChangeAspect="1"/>
+          </p:cNvSpPr>
+          <p:nvPr/>
+        </p:nvSpPr>
+        <p:spPr>
+          <a:xfrm>
+            <a:off x="8443555" y="297930"/>
+            <a:ext cx="211404" cy="211689"/>
+          </a:xfrm>
+          <a:prstGeom prst="ellipse">
+            <a:avLst/>
+          </a:prstGeom>
+          <a:solidFill>
+            <a:srgbClr val="1BCF13"/>
+          </a:solidFill>
+          <a:ln w="12700">
+            <a:solidFill>
+              <a:schemeClr val="accent3"/>
+            </a:solidFill>
+          </a:ln>
+        </p:spPr>
+        <p:style>
+          <a:lnRef idx="2">
+            <a:schemeClr val="accent1">
+              <a:shade val="50000"/>
+            </a:schemeClr>
+          </a:lnRef>
+          <a:fillRef idx="1">
+            <a:schemeClr val="accent1"/>
+          </a:fillRef>
+          <a:effectRef idx="0">
+            <a:schemeClr val="accent1"/>
+          </a:effectRef>
+          <a:fontRef idx="minor">
+            <a:schemeClr val="lt1"/>
+          </a:fontRef>
+        </p:style>
+        <p:txBody>
+          <a:bodyPr wrap="none" lIns="52922" tIns="52922" rIns="52922" rtlCol="0" anchor="ctr"/>
+          <a:lstStyle/>
+          <a:p>
+            <a:pPr algn="ctr" defTabSz="672130"/>
+            <a:endParaRPr lang="en-US" sz="1176" dirty="0">
+              <a:solidFill>
+                <a:prstClr val="black"/>
+              </a:solidFill>
+              <a:latin typeface="Exo 2 Medium" panose="00000600000000000000" pitchFamily="50" charset="0"/>
+              <a:cs typeface="Simplon BP Regular"/>
+            </a:endParaRPr>
+          </a:p>
+        </p:txBody>
+      </p:sp>
+      <p:sp>
+        <p:nvSpPr>
+          <p:cNvPr id="86" name="TextBox 138"/>
+          <p:cNvSpPr txBox="1"/>
+          <p:nvPr/>
+        </p:nvSpPr>
+        <p:spPr>
+          <a:xfrm>
+            <a:off x="8126053" y="576471"/>
+            <a:ext cx="899678" cy="179824"/>
+          </a:xfrm>
+          <a:prstGeom prst="rect">
+            <a:avLst/>
+          </a:prstGeom>
+          <a:noFill/>
+          <a:ln w="12700">
+            <a:noFill/>
+          </a:ln>
+        </p:spPr>
+        <p:style>
+          <a:lnRef idx="2">
+            <a:schemeClr val="accent4"/>
+          </a:lnRef>
+          <a:fillRef idx="1">
+            <a:schemeClr val="lt1"/>
+          </a:fillRef>
+          <a:effectRef idx="0">
+            <a:schemeClr val="accent4"/>
+          </a:effectRef>
+          <a:fontRef idx="minor">
+            <a:schemeClr val="dk1"/>
+          </a:fontRef>
+        </p:style>
+        <p:txBody>
+          <a:bodyPr wrap="none" lIns="52922" tIns="52922" rIns="52922" bIns="0" rtlCol="0" anchor="b"/>
+          <a:lstStyle>
+            <a:defPPr>
+              <a:defRPr lang="en-US"/>
+            </a:defPPr>
+            <a:lvl1pPr algn="ctr">
+              <a:defRPr sz="1000" b="1">
+                <a:latin typeface="Simplon BP Regular"/>
+                <a:cs typeface="Simplon BP Regular"/>
+              </a:defRPr>
+            </a:lvl1pPr>
+            <a:lvl2pPr>
+              <a:defRPr>
+                <a:solidFill>
+                  <a:schemeClr val="dk1"/>
+                </a:solidFill>
+              </a:defRPr>
+            </a:lvl2pPr>
+            <a:lvl3pPr>
+              <a:defRPr>
+                <a:solidFill>
+                  <a:schemeClr val="dk1"/>
+                </a:solidFill>
+              </a:defRPr>
+            </a:lvl3pPr>
+            <a:lvl4pPr>
+              <a:defRPr>
+                <a:solidFill>
+                  <a:schemeClr val="dk1"/>
+                </a:solidFill>
+              </a:defRPr>
+            </a:lvl4pPr>
+            <a:lvl5pPr>
+              <a:defRPr>
+                <a:solidFill>
+                  <a:schemeClr val="dk1"/>
+                </a:solidFill>
+              </a:defRPr>
+            </a:lvl5pPr>
+            <a:lvl6pPr>
+              <a:defRPr>
+                <a:solidFill>
+                  <a:schemeClr val="dk1"/>
+                </a:solidFill>
+              </a:defRPr>
+            </a:lvl6pPr>
+            <a:lvl7pPr>
+              <a:defRPr>
+                <a:solidFill>
+                  <a:schemeClr val="dk1"/>
+                </a:solidFill>
+              </a:defRPr>
+            </a:lvl7pPr>
+            <a:lvl8pPr>
+              <a:defRPr>
+                <a:solidFill>
+                  <a:schemeClr val="dk1"/>
+                </a:solidFill>
+              </a:defRPr>
+            </a:lvl8pPr>
+            <a:lvl9pPr>
+              <a:defRPr>
+                <a:solidFill>
+                  <a:schemeClr val="dk1"/>
+                </a:solidFill>
+              </a:defRPr>
+            </a:lvl9pPr>
+          </a:lstStyle>
+          <a:p>
+            <a:pPr defTabSz="672130"/>
+            <a:r>
+              <a:rPr lang="en-US" sz="1176" b="0" dirty="0">
+                <a:solidFill>
+                  <a:prstClr val="black"/>
+                </a:solidFill>
+                <a:latin typeface="Exo 2 Medium" panose="00000600000000000000" pitchFamily="50" charset="0"/>
+              </a:rPr>
+              <a:t>Equipe</a:t>
+            </a:r>
+          </a:p>
+        </p:txBody>
+      </p:sp>
+      <p:sp>
+        <p:nvSpPr>
+          <p:cNvPr id="64" name="Retângulo 63"/>
+          <p:cNvSpPr/>
+          <p:nvPr/>
+        </p:nvSpPr>
+        <p:spPr>
+          <a:xfrm>
+            <a:off x="512766" y="868345"/>
+            <a:ext cx="6186608" cy="238150"/>
+          </a:xfrm>
+          <a:prstGeom prst="rect">
+            <a:avLst/>
+          </a:prstGeom>
+          <a:solidFill>
+            <a:schemeClr val="bg1">
+              <a:lumMod val="85000"/>
+            </a:schemeClr>
+          </a:solidFill>
+        </p:spPr>
+        <p:txBody>
+          <a:bodyPr vert="horz" lIns="134422" tIns="67211" rIns="134422" bIns="67211" rtlCol="0" anchor="ctr"/>
+          <a:lstStyle/>
+          <a:p>
+            <a:pPr defTabSz="672130"/>
+            <a:r>
+              <a:rPr lang="en-US" sz="1544" dirty="0">
+                <a:latin typeface="Exo 2 Medium" panose="00000600000000000000" pitchFamily="50" charset="0"/>
+                <a:ea typeface="Simplon Oi Headline" charset="0"/>
+                <a:cs typeface="Simplon Oi Headline" charset="0"/>
+              </a:rPr>
+              <a:t>Progressos c/ responsáveis </a:t>
+            </a:r>
+          </a:p>
+        </p:txBody>
+      </p:sp>
+      <p:sp>
+        <p:nvSpPr>
+          <p:cNvPr id="65" name="Retângulo 64"/>
+          <p:cNvSpPr/>
+          <p:nvPr/>
+        </p:nvSpPr>
+        <p:spPr>
+          <a:xfrm>
+            <a:off x="6814576" y="868344"/>
+            <a:ext cx="6244932" cy="250902"/>
+          </a:xfrm>
+          <a:prstGeom prst="rect">
+            <a:avLst/>
+          </a:prstGeom>
+          <a:solidFill>
+            <a:schemeClr val="bg1">
+              <a:lumMod val="85000"/>
+            </a:schemeClr>
+          </a:solidFill>
+        </p:spPr>
+        <p:txBody>
+          <a:bodyPr vert="horz" lIns="134422" tIns="67211" rIns="134422" bIns="67211" rtlCol="0" anchor="ctr"/>
+          <a:lstStyle/>
+          <a:p>
+            <a:pPr defTabSz="672130"/>
+            <a:r>
+              <a:rPr lang="pt-BR" sz="1544" dirty="0">
+                <a:latin typeface="Exo 2 Medium" panose="00000600000000000000" pitchFamily="50" charset="0"/>
+                <a:ea typeface="Simplon Oi Headline" charset="0"/>
+                <a:cs typeface="Simplon Oi Headline" charset="0"/>
+              </a:rPr>
+              <a:t>Pontos atenção/ Principais Riscos</a:t>
+            </a:r>
+          </a:p>
+        </p:txBody>
+      </p:sp>
+      <p:sp>
+        <p:nvSpPr>
+          <p:cNvPr id="66" name="Retângulo 65"/>
+          <p:cNvSpPr/>
+          <p:nvPr/>
+        </p:nvSpPr>
+        <p:spPr>
+          <a:xfrm>
+            <a:off x="507536" y="3418875"/>
+            <a:ext cx="12551972" cy="238150"/>
+          </a:xfrm>
+          <a:prstGeom prst="rect">
+            <a:avLst/>
+          </a:prstGeom>
+          <a:solidFill>
+            <a:schemeClr val="bg1">
+              <a:lumMod val="85000"/>
+            </a:schemeClr>
+          </a:solidFill>
+        </p:spPr>
+        <p:txBody>
+          <a:bodyPr vert="horz" lIns="134422" tIns="67211" rIns="134422" bIns="67211" rtlCol="0" anchor="ctr"/>
+          <a:lstStyle/>
+          <a:p>
+            <a:pPr defTabSz="672130"/>
+            <a:r>
+              <a:rPr lang="pt-BR" sz="1544" dirty="0">
+                <a:latin typeface="Exo 2 Medium" panose="00000600000000000000" pitchFamily="50" charset="0"/>
+                <a:ea typeface="Simplon Oi Headline" charset="0"/>
+                <a:cs typeface="Simplon Oi Headline" charset="0"/>
+              </a:rPr>
+              <a:t>Próximos Passos c/ responsáveis </a:t>
+            </a:r>
+          </a:p>
+        </p:txBody>
+      </p:sp>
+      <p:sp>
+        <p:nvSpPr>
+          <p:cNvPr id="63" name="Rectangle 37"/>
+          <p:cNvSpPr/>
+          <p:nvPr/>
+        </p:nvSpPr>
+        <p:spPr>
+          <a:xfrm>
+            <a:off x="496765" y="1106495"/>
+            <a:ext cx="6207777" cy="2235805"/>
+          </a:xfrm>
+          <a:prstGeom prst="rect">
+            <a:avLst/>
+          </a:prstGeom>
+          <a:noFill/>
+          <a:ln w="12700">
+            <a:solidFill>
+              <a:schemeClr val="bg1">
+                <a:lumMod val="50000"/>
+              </a:schemeClr>
+            </a:solidFill>
+          </a:ln>
+        </p:spPr>
+        <p:style>
+          <a:lnRef idx="2">
+            <a:schemeClr val="accent4"/>
+          </a:lnRef>
+          <a:fillRef idx="1">
+            <a:schemeClr val="lt1"/>
+          </a:fillRef>
+          <a:effectRef idx="0">
+            <a:schemeClr val="accent4"/>
+          </a:effectRef>
+          <a:fontRef idx="minor">
+            <a:schemeClr val="dk1"/>
+          </a:fontRef>
+        </p:style>
+        <p:txBody>
+          <a:bodyPr tIns="105844" rtlCol="0" anchor="t"/>
+          <a:lstStyle/>
+          <a:p>
+            <a:pPr marL="252049" indent="-252049" fontAlgn="base">
+              <a:spcBef>
+                <a:spcPct val="0"/>
+              </a:spcBef>
+              <a:buFont typeface="Wingdings" panose="05000000000000000000" pitchFamily="2" charset="2"/>
+              <a:buChar char="ü"/>
+              <a:defRPr/>
+            </a:pPr>
+            <a:r>
+              <a:rPr lang="pt-BR" sz="1323" dirty="0">
+                <a:solidFill>
+                  <a:schemeClr val="tx1"/>
+                </a:solidFill>
+                <a:latin typeface="Exo 2 Medium" panose="00000600000000000000" pitchFamily="50" charset="0"/>
+                <a:cs typeface="Simplon BP Regular"/>
+              </a:rPr>
+              <a:t>Detalhes da prototipação da Aplicação de agendamentos </a:t>
+            </a:r>
+            <a:r>
+              <a:rPr lang="pt-BR" sz="1323" b="1" dirty="0">
+                <a:solidFill>
+                  <a:schemeClr val="tx1"/>
+                </a:solidFill>
+                <a:latin typeface="Exo 2 Medium" panose="00000600000000000000" pitchFamily="50" charset="0"/>
+                <a:cs typeface="Simplon BP Regular"/>
+              </a:rPr>
+              <a:t>#Ferraz e Vinicius</a:t>
+            </a:r>
+          </a:p>
+          <a:p>
+            <a:pPr marL="252049" indent="-252049" fontAlgn="base">
+              <a:spcBef>
+                <a:spcPct val="0"/>
+              </a:spcBef>
+              <a:buFont typeface="Wingdings" panose="05000000000000000000" pitchFamily="2" charset="2"/>
+              <a:buChar char="ü"/>
+              <a:defRPr/>
+            </a:pPr>
+            <a:r>
+              <a:rPr lang="pt-BR" sz="1323" dirty="0">
+                <a:solidFill>
+                  <a:schemeClr val="tx1"/>
+                </a:solidFill>
+                <a:latin typeface="Exo 2 Medium" panose="00000600000000000000" pitchFamily="50" charset="0"/>
+                <a:cs typeface="Simplon BP Regular"/>
+              </a:rPr>
+              <a:t>Atualizações do Endpoints CRUD  </a:t>
+            </a:r>
+            <a:r>
+              <a:rPr lang="pt-BR" sz="1323" b="1" dirty="0">
+                <a:solidFill>
+                  <a:schemeClr val="tx1"/>
+                </a:solidFill>
+                <a:latin typeface="Exo 2 Medium" panose="00000600000000000000" pitchFamily="50" charset="0"/>
+                <a:cs typeface="Simplon BP Regular"/>
+              </a:rPr>
+              <a:t>#Wesley</a:t>
+            </a:r>
+          </a:p>
+          <a:p>
+            <a:pPr marL="252049" indent="-252049" fontAlgn="base">
+              <a:spcBef>
+                <a:spcPct val="0"/>
+              </a:spcBef>
+              <a:buFont typeface="Wingdings" panose="05000000000000000000" pitchFamily="2" charset="2"/>
+              <a:buChar char="ü"/>
+              <a:defRPr/>
+            </a:pPr>
+            <a:r>
+              <a:rPr lang="pt-BR" sz="1323" dirty="0">
+                <a:solidFill>
+                  <a:schemeClr val="tx1"/>
+                </a:solidFill>
+                <a:latin typeface="Exo 2 Medium" panose="00000600000000000000" pitchFamily="50" charset="0"/>
+                <a:cs typeface="Simplon BP Regular"/>
+              </a:rPr>
+              <a:t>Modelo logico do Banco de dados </a:t>
+            </a:r>
+            <a:r>
+              <a:rPr lang="pt-BR" sz="1323" b="1" dirty="0">
+                <a:solidFill>
+                  <a:schemeClr val="tx1"/>
+                </a:solidFill>
+                <a:latin typeface="Exo 2 Medium" panose="00000600000000000000" pitchFamily="50" charset="0"/>
+                <a:cs typeface="Simplon BP Regular"/>
+              </a:rPr>
+              <a:t>#Pedro</a:t>
+            </a:r>
+          </a:p>
+          <a:p>
+            <a:pPr marL="252049" indent="-252049" fontAlgn="base">
+              <a:spcBef>
+                <a:spcPct val="0"/>
+              </a:spcBef>
+              <a:buFont typeface="Wingdings" panose="05000000000000000000" pitchFamily="2" charset="2"/>
+              <a:buChar char="ü"/>
+              <a:defRPr/>
+            </a:pPr>
+            <a:r>
+              <a:rPr lang="pt-BR" sz="1323" dirty="0">
+                <a:solidFill>
+                  <a:schemeClr val="tx1"/>
+                </a:solidFill>
+                <a:latin typeface="Exo 2 Medium" panose="00000600000000000000" pitchFamily="50" charset="0"/>
+                <a:cs typeface="Simplon BP Regular"/>
+              </a:rPr>
+              <a:t>Provisionamento do banco de dados na Azure </a:t>
+            </a:r>
+            <a:r>
+              <a:rPr lang="pt-BR" sz="1323" b="1" dirty="0">
+                <a:solidFill>
+                  <a:schemeClr val="tx1"/>
+                </a:solidFill>
+                <a:latin typeface="Exo 2 Medium" panose="00000600000000000000" pitchFamily="50" charset="0"/>
+                <a:cs typeface="Simplon BP Regular"/>
+              </a:rPr>
+              <a:t>#Pedro</a:t>
+            </a:r>
+          </a:p>
+          <a:p>
+            <a:pPr marL="252049" indent="-252049" fontAlgn="base">
+              <a:spcBef>
+                <a:spcPct val="0"/>
+              </a:spcBef>
+              <a:buFont typeface="Wingdings" panose="05000000000000000000" pitchFamily="2" charset="2"/>
+              <a:buChar char="ü"/>
+              <a:defRPr/>
+            </a:pPr>
+            <a:endParaRPr lang="pt-BR" sz="1323" b="1" dirty="0">
+              <a:solidFill>
+                <a:schemeClr val="tx1"/>
+              </a:solidFill>
+              <a:latin typeface="Exo 2 Medium" panose="00000600000000000000" pitchFamily="50" charset="0"/>
+              <a:cs typeface="Simplon BP Regular"/>
+            </a:endParaRPr>
+          </a:p>
+          <a:p>
+            <a:pPr marL="252049" indent="-252049" fontAlgn="base">
+              <a:spcBef>
+                <a:spcPct val="0"/>
+              </a:spcBef>
+              <a:buFont typeface="Wingdings" panose="05000000000000000000" pitchFamily="2" charset="2"/>
+              <a:buChar char="ü"/>
+              <a:defRPr/>
+            </a:pPr>
+            <a:endParaRPr lang="pt-BR" sz="1323" b="1" dirty="0">
+              <a:solidFill>
+                <a:schemeClr val="tx1"/>
+              </a:solidFill>
+              <a:latin typeface="Exo 2 Medium" panose="00000600000000000000" pitchFamily="50" charset="0"/>
+              <a:cs typeface="Simplon BP Regular"/>
+            </a:endParaRPr>
+          </a:p>
+          <a:p>
+            <a:pPr marL="252049" indent="-252049" fontAlgn="base">
+              <a:spcBef>
+                <a:spcPct val="0"/>
+              </a:spcBef>
+              <a:buFont typeface="Wingdings" panose="05000000000000000000" pitchFamily="2" charset="2"/>
+              <a:buChar char="ü"/>
+              <a:defRPr/>
+            </a:pPr>
+            <a:endParaRPr lang="pt-BR" sz="1323" b="1" dirty="0">
+              <a:solidFill>
+                <a:schemeClr val="tx1"/>
+              </a:solidFill>
+              <a:latin typeface="Exo 2 Medium" panose="00000600000000000000" pitchFamily="50" charset="0"/>
+              <a:cs typeface="Simplon BP Regular"/>
+            </a:endParaRPr>
+          </a:p>
+        </p:txBody>
+      </p:sp>
+      <p:sp>
+        <p:nvSpPr>
+          <p:cNvPr id="4" name="Retângulo 3"/>
+          <p:cNvSpPr/>
+          <p:nvPr/>
+        </p:nvSpPr>
+        <p:spPr>
+          <a:xfrm>
+            <a:off x="6844996" y="1121895"/>
+            <a:ext cx="6164295" cy="1110240"/>
+          </a:xfrm>
+          <a:prstGeom prst="rect">
+            <a:avLst/>
+          </a:prstGeom>
+        </p:spPr>
+        <p:txBody>
+          <a:bodyPr wrap="square">
+            <a:spAutoFit/>
+          </a:bodyPr>
+          <a:lstStyle/>
+          <a:p>
+            <a:pPr marL="252049" indent="-252049" fontAlgn="base">
+              <a:spcBef>
+                <a:spcPct val="0"/>
+              </a:spcBef>
+              <a:buFont typeface="Wingdings" panose="05000000000000000000" pitchFamily="2" charset="2"/>
+              <a:buChar char="§"/>
+              <a:defRPr/>
+            </a:pPr>
+            <a:endParaRPr lang="pt-BR" sz="1323" b="1" dirty="0">
+              <a:latin typeface="Exo 2 Medium" panose="00000600000000000000" pitchFamily="50" charset="0"/>
+              <a:cs typeface="Simplon BP Regular"/>
+            </a:endParaRPr>
+          </a:p>
+          <a:p>
+            <a:pPr marL="252049" indent="-252049" fontAlgn="base">
+              <a:spcBef>
+                <a:spcPct val="0"/>
+              </a:spcBef>
+              <a:buFont typeface="Wingdings" panose="05000000000000000000" pitchFamily="2" charset="2"/>
+              <a:buChar char="§"/>
+              <a:defRPr/>
+            </a:pPr>
+            <a:r>
+              <a:rPr lang="pt-BR" sz="1323" dirty="0">
+                <a:latin typeface="Exo 2 Medium" panose="00000600000000000000" pitchFamily="50" charset="0"/>
+                <a:cs typeface="Simplon BP Regular"/>
+              </a:rPr>
+              <a:t>Atraso nas prototipações (falta prototipar aplicação de agendamentos)</a:t>
+            </a:r>
+          </a:p>
+          <a:p>
+            <a:pPr marL="252049" indent="-252049" fontAlgn="base">
+              <a:spcBef>
+                <a:spcPct val="0"/>
+              </a:spcBef>
+              <a:buFont typeface="Wingdings" panose="05000000000000000000" pitchFamily="2" charset="2"/>
+              <a:buChar char="§"/>
+              <a:defRPr/>
+            </a:pPr>
+            <a:r>
+              <a:rPr lang="pt-BR" sz="1323" dirty="0">
+                <a:latin typeface="Exo 2 Medium" panose="00000600000000000000" pitchFamily="50" charset="0"/>
+                <a:cs typeface="Simplon BP Regular"/>
+              </a:rPr>
+              <a:t>Começar a pensar em codar logo a tela de cadastro e login em React</a:t>
+            </a:r>
+          </a:p>
+          <a:p>
+            <a:pPr marL="252049" indent="-252049" fontAlgn="base">
+              <a:spcBef>
+                <a:spcPct val="0"/>
+              </a:spcBef>
+              <a:buFont typeface="Wingdings" panose="05000000000000000000" pitchFamily="2" charset="2"/>
+              <a:buChar char="§"/>
+              <a:defRPr/>
+            </a:pPr>
+            <a:endParaRPr lang="pt-BR" sz="1323" dirty="0">
+              <a:latin typeface="Exo 2 Medium" panose="00000600000000000000" pitchFamily="50" charset="0"/>
+              <a:cs typeface="Simplon BP Regular"/>
+            </a:endParaRPr>
+          </a:p>
+          <a:p>
+            <a:pPr marL="252049" indent="-252049" fontAlgn="base">
+              <a:spcBef>
+                <a:spcPct val="0"/>
+              </a:spcBef>
+              <a:buFont typeface="Wingdings" panose="05000000000000000000" pitchFamily="2" charset="2"/>
+              <a:buChar char="§"/>
+              <a:defRPr/>
+            </a:pPr>
+            <a:endParaRPr lang="pt-BR" sz="1323" dirty="0">
+              <a:latin typeface="Exo 2 Medium" panose="00000600000000000000" pitchFamily="50" charset="0"/>
+              <a:cs typeface="Simplon BP Regular"/>
+            </a:endParaRPr>
+          </a:p>
+        </p:txBody>
+      </p:sp>
+      <p:sp>
+        <p:nvSpPr>
+          <p:cNvPr id="2" name="Rectangle 43">
+            <a:extLst>
+              <a:ext uri="{FF2B5EF4-FFF2-40B4-BE49-F238E27FC236}">
+                <a16:creationId xmlns:a16="http://schemas.microsoft.com/office/drawing/2014/main" id="{B15BA19F-C787-4E6A-ADAB-C0DFF09C66A8}"/>
+              </a:ext>
+            </a:extLst>
+          </p:cNvPr>
+          <p:cNvSpPr>
+            <a:spLocks/>
+          </p:cNvSpPr>
+          <p:nvPr/>
+        </p:nvSpPr>
+        <p:spPr>
+          <a:xfrm>
+            <a:off x="493440" y="3717591"/>
+            <a:ext cx="12566068" cy="3634138"/>
+          </a:xfrm>
+          <a:prstGeom prst="rect">
+            <a:avLst/>
+          </a:prstGeom>
+          <a:noFill/>
+          <a:ln w="12700">
+            <a:solidFill>
+              <a:schemeClr val="bg1">
+                <a:lumMod val="50000"/>
+              </a:schemeClr>
+            </a:solidFill>
+          </a:ln>
+        </p:spPr>
+        <p:style>
+          <a:lnRef idx="2">
+            <a:schemeClr val="accent4"/>
+          </a:lnRef>
+          <a:fillRef idx="1">
+            <a:schemeClr val="lt1"/>
+          </a:fillRef>
+          <a:effectRef idx="0">
+            <a:schemeClr val="accent4"/>
+          </a:effectRef>
+          <a:fontRef idx="minor">
+            <a:schemeClr val="dk1"/>
+          </a:fontRef>
+        </p:style>
+        <p:txBody>
+          <a:bodyPr wrap="square" tIns="105844" numCol="3" rtlCol="0" anchor="t"/>
+          <a:lstStyle/>
+          <a:p>
+            <a:pPr marL="0" lvl="1" defTabSz="672130"/>
+            <a:r>
+              <a:rPr lang="pt-BR" sz="1323" b="1" dirty="0">
+                <a:solidFill>
+                  <a:schemeClr val="tx1"/>
+                </a:solidFill>
+                <a:latin typeface="Exo 2 Medium" panose="00000600000000000000" pitchFamily="50" charset="0"/>
+                <a:cs typeface="Simplon BP Regular"/>
+              </a:rPr>
+              <a:t>Frente Plataforma</a:t>
+            </a:r>
+          </a:p>
+          <a:p>
+            <a:pPr marL="0" lvl="1" defTabSz="672130"/>
+            <a:r>
+              <a:rPr lang="pt-BR" sz="1323" dirty="0">
+                <a:solidFill>
+                  <a:schemeClr val="tx1"/>
+                </a:solidFill>
+                <a:latin typeface="Exo 2 Medium" panose="00000600000000000000" pitchFamily="50" charset="0"/>
+                <a:cs typeface="Simplon BP Regular"/>
+              </a:rPr>
+              <a:t>Sem atividades no momento</a:t>
+            </a:r>
+          </a:p>
+          <a:p>
+            <a:pPr marL="0" lvl="1" defTabSz="672130"/>
+            <a:endParaRPr lang="pt-BR" sz="1323" b="1" dirty="0">
+              <a:solidFill>
+                <a:schemeClr val="tx1"/>
+              </a:solidFill>
+              <a:latin typeface="Exo 2 Medium" panose="00000600000000000000" pitchFamily="50" charset="0"/>
+              <a:cs typeface="Simplon BP Regular"/>
+            </a:endParaRPr>
+          </a:p>
+          <a:p>
+            <a:pPr marL="0" lvl="1" defTabSz="672130"/>
+            <a:r>
+              <a:rPr lang="pt-BR" sz="1323" b="1" dirty="0">
+                <a:solidFill>
+                  <a:schemeClr val="tx1"/>
+                </a:solidFill>
+                <a:latin typeface="Exo 2 Medium" panose="00000600000000000000" pitchFamily="50" charset="0"/>
+                <a:cs typeface="Simplon BP Regular"/>
+              </a:rPr>
+              <a:t>Frente </a:t>
+            </a:r>
+            <a:r>
+              <a:rPr lang="pt-BR" sz="1323" b="1" dirty="0" err="1">
+                <a:solidFill>
+                  <a:schemeClr val="tx1"/>
+                </a:solidFill>
+                <a:latin typeface="Exo 2 Medium" panose="00000600000000000000" pitchFamily="50" charset="0"/>
+                <a:cs typeface="Simplon BP Regular"/>
+              </a:rPr>
+              <a:t>Backend</a:t>
+            </a:r>
+            <a:endParaRPr lang="pt-BR" sz="1323" b="1" dirty="0">
+              <a:solidFill>
+                <a:schemeClr val="tx1"/>
+              </a:solidFill>
+              <a:latin typeface="Exo 2 Medium" panose="00000600000000000000" pitchFamily="50" charset="0"/>
+              <a:cs typeface="Simplon BP Regular"/>
+            </a:endParaRPr>
+          </a:p>
+          <a:p>
+            <a:pPr marL="0" lvl="1" indent="-252049">
+              <a:buFont typeface="Wingdings" panose="05000000000000000000" pitchFamily="2" charset="2"/>
+              <a:buChar char="§"/>
+            </a:pPr>
+            <a:r>
+              <a:rPr lang="pt-BR" sz="1323" dirty="0">
+                <a:solidFill>
+                  <a:schemeClr val="tx1"/>
+                </a:solidFill>
+                <a:latin typeface="Exo 2 Medium" panose="00000600000000000000" pitchFamily="50" charset="0"/>
+                <a:cs typeface="Simplon BP Regular"/>
+              </a:rPr>
+              <a:t>Continuação a implementação de Lista </a:t>
+            </a:r>
+            <a:r>
+              <a:rPr lang="pt-BR" sz="1323" b="1" dirty="0">
+                <a:solidFill>
+                  <a:schemeClr val="tx1"/>
+                </a:solidFill>
+                <a:latin typeface="Exo 2 Medium" panose="00000600000000000000" pitchFamily="50" charset="0"/>
+                <a:cs typeface="Simplon BP Regular"/>
+              </a:rPr>
+              <a:t>#Pedro </a:t>
+            </a:r>
+          </a:p>
+          <a:p>
+            <a:pPr marL="0" lvl="1" indent="-252049">
+              <a:buFont typeface="Wingdings" panose="05000000000000000000" pitchFamily="2" charset="2"/>
+              <a:buChar char="§"/>
+            </a:pPr>
+            <a:r>
+              <a:rPr lang="pt-BR" sz="1323" dirty="0">
+                <a:solidFill>
+                  <a:schemeClr val="tx1"/>
+                </a:solidFill>
+                <a:latin typeface="Exo 2 Medium" panose="00000600000000000000" pitchFamily="50" charset="0"/>
+                <a:cs typeface="Simplon BP Regular"/>
+              </a:rPr>
+              <a:t>Continuação a construção dos CRUD (Login &amp; </a:t>
+            </a:r>
+            <a:r>
+              <a:rPr lang="pt-BR" sz="1323" dirty="0" err="1">
+                <a:solidFill>
+                  <a:schemeClr val="tx1"/>
+                </a:solidFill>
+                <a:latin typeface="Exo 2 Medium" panose="00000600000000000000" pitchFamily="50" charset="0"/>
+                <a:cs typeface="Simplon BP Regular"/>
+              </a:rPr>
+              <a:t>Logoff</a:t>
+            </a:r>
+            <a:r>
+              <a:rPr lang="pt-BR" sz="1323" dirty="0">
+                <a:solidFill>
+                  <a:schemeClr val="tx1"/>
+                </a:solidFill>
+                <a:latin typeface="Exo 2 Medium" panose="00000600000000000000" pitchFamily="50" charset="0"/>
+                <a:cs typeface="Simplon BP Regular"/>
+              </a:rPr>
+              <a:t>) e dos </a:t>
+            </a:r>
+            <a:r>
+              <a:rPr lang="pt-BR" sz="1323" dirty="0" err="1">
+                <a:solidFill>
+                  <a:schemeClr val="tx1"/>
+                </a:solidFill>
+                <a:latin typeface="Exo 2 Medium" panose="00000600000000000000" pitchFamily="50" charset="0"/>
+                <a:cs typeface="Simplon BP Regular"/>
+              </a:rPr>
+              <a:t>endpoints</a:t>
+            </a:r>
+            <a:r>
+              <a:rPr lang="pt-BR" sz="1323" dirty="0">
+                <a:solidFill>
+                  <a:schemeClr val="tx1"/>
+                </a:solidFill>
+                <a:latin typeface="Exo 2 Medium" panose="00000600000000000000" pitchFamily="50" charset="0"/>
+                <a:cs typeface="Simplon BP Regular"/>
+              </a:rPr>
+              <a:t> com SpringBoot </a:t>
+            </a:r>
+            <a:r>
+              <a:rPr lang="pt-BR" sz="1323" b="1" dirty="0">
+                <a:solidFill>
+                  <a:schemeClr val="tx1"/>
+                </a:solidFill>
+                <a:latin typeface="Exo 2 Medium" panose="00000600000000000000" pitchFamily="50" charset="0"/>
+                <a:cs typeface="Simplon BP Regular"/>
+              </a:rPr>
+              <a:t>#Wesley</a:t>
+            </a:r>
+            <a:r>
+              <a:rPr lang="pt-BR" sz="1323" dirty="0">
+                <a:solidFill>
+                  <a:schemeClr val="tx1"/>
+                </a:solidFill>
+                <a:latin typeface="Exo 2 Medium" panose="00000600000000000000" pitchFamily="50" charset="0"/>
+                <a:cs typeface="Simplon BP Regular"/>
+              </a:rPr>
+              <a:t> </a:t>
+            </a:r>
+          </a:p>
+          <a:p>
+            <a:pPr marL="0" lvl="1"/>
+            <a:endParaRPr lang="pt-BR" sz="1323" b="1" dirty="0">
+              <a:solidFill>
+                <a:schemeClr val="tx1"/>
+              </a:solidFill>
+              <a:latin typeface="Exo 2 Medium" panose="00000600000000000000" pitchFamily="50" charset="0"/>
+              <a:cs typeface="Simplon BP Regular"/>
+            </a:endParaRPr>
+          </a:p>
+          <a:p>
+            <a:pPr marL="0" lvl="1" defTabSz="672130"/>
+            <a:r>
+              <a:rPr lang="pt-BR" sz="1323" b="1" dirty="0">
+                <a:solidFill>
+                  <a:schemeClr val="tx1"/>
+                </a:solidFill>
+                <a:latin typeface="Exo 2 Medium" panose="00000600000000000000" pitchFamily="50" charset="0"/>
+                <a:cs typeface="Simplon BP Regular"/>
+              </a:rPr>
+              <a:t>Frente Front </a:t>
+            </a:r>
+            <a:r>
+              <a:rPr lang="pt-BR" sz="1323" b="1" dirty="0" err="1">
+                <a:solidFill>
+                  <a:schemeClr val="tx1"/>
+                </a:solidFill>
+                <a:latin typeface="Exo 2 Medium" panose="00000600000000000000" pitchFamily="50" charset="0"/>
+                <a:cs typeface="Simplon BP Regular"/>
+              </a:rPr>
+              <a:t>End</a:t>
+            </a:r>
+            <a:endParaRPr lang="pt-BR" sz="1323" b="1" dirty="0">
+              <a:solidFill>
+                <a:schemeClr val="tx1"/>
+              </a:solidFill>
+              <a:latin typeface="Exo 2 Medium" panose="00000600000000000000" pitchFamily="50" charset="0"/>
+              <a:cs typeface="Simplon BP Regular"/>
+            </a:endParaRPr>
+          </a:p>
+          <a:p>
+            <a:pPr marL="0" lvl="1" indent="-252049">
+              <a:buFont typeface="Wingdings" panose="05000000000000000000" pitchFamily="2" charset="2"/>
+              <a:buChar char="§"/>
+            </a:pPr>
+            <a:r>
+              <a:rPr lang="pt-BR" sz="1323" dirty="0">
+                <a:solidFill>
+                  <a:schemeClr val="tx1"/>
+                </a:solidFill>
+                <a:latin typeface="Exo 2 Medium" panose="00000600000000000000" pitchFamily="50" charset="0"/>
+                <a:cs typeface="Simplon BP Regular"/>
+              </a:rPr>
+              <a:t>Tela de Cadastro com React </a:t>
+            </a:r>
+            <a:r>
+              <a:rPr lang="pt-BR" sz="1323" b="1" dirty="0">
+                <a:solidFill>
+                  <a:schemeClr val="tx1"/>
+                </a:solidFill>
+                <a:latin typeface="Exo 2 Medium" panose="00000600000000000000" pitchFamily="50" charset="0"/>
+                <a:cs typeface="Simplon BP Regular"/>
+              </a:rPr>
+              <a:t>#Equipe</a:t>
+            </a:r>
+          </a:p>
+          <a:p>
+            <a:pPr marL="0" lvl="1" indent="-252049">
+              <a:buFont typeface="Wingdings" panose="05000000000000000000" pitchFamily="2" charset="2"/>
+              <a:buChar char="§"/>
+            </a:pPr>
+            <a:r>
+              <a:rPr lang="pt-BR" sz="1320" dirty="0">
+                <a:solidFill>
+                  <a:schemeClr val="tx1"/>
+                </a:solidFill>
+                <a:latin typeface="Exo 2 Medium" panose="00000600000000000000" pitchFamily="50" charset="0"/>
+                <a:cs typeface="Simplon BP Regular"/>
+              </a:rPr>
+              <a:t>Continuação da prototipação da tela de agendamentos </a:t>
+            </a:r>
+            <a:r>
+              <a:rPr lang="pt-BR" sz="1320" b="1" dirty="0">
+                <a:solidFill>
+                  <a:schemeClr val="tx1"/>
+                </a:solidFill>
+                <a:latin typeface="Exo 2 Medium" panose="00000600000000000000" pitchFamily="50" charset="0"/>
+                <a:cs typeface="Simplon BP Regular"/>
+              </a:rPr>
+              <a:t>#Ferraz e Vinicius</a:t>
+            </a:r>
+          </a:p>
+          <a:p>
+            <a:pPr marL="0" lvl="1" indent="-252049">
+              <a:buFont typeface="Wingdings" panose="05000000000000000000" pitchFamily="2" charset="2"/>
+              <a:buChar char="§"/>
+            </a:pPr>
+            <a:endParaRPr lang="pt-BR" sz="1600" b="1" dirty="0">
+              <a:solidFill>
+                <a:schemeClr val="tx1"/>
+              </a:solidFill>
+              <a:latin typeface="Exo 2 Medium" panose="00000600000000000000" pitchFamily="50" charset="0"/>
+              <a:cs typeface="Simplon BP Regular"/>
+            </a:endParaRPr>
+          </a:p>
+          <a:p>
+            <a:pPr marL="0" lvl="1" defTabSz="672130"/>
+            <a:r>
+              <a:rPr lang="pt-BR" sz="1320" b="1" dirty="0">
+                <a:solidFill>
+                  <a:schemeClr val="tx1"/>
+                </a:solidFill>
+                <a:latin typeface="Exo 2 Medium" panose="00000600000000000000" pitchFamily="50" charset="0"/>
+                <a:cs typeface="Simplon BP Regular"/>
+              </a:rPr>
+              <a:t>Frente Negócios</a:t>
+            </a:r>
+            <a:endParaRPr lang="pt-BR" sz="1320" dirty="0">
+              <a:solidFill>
+                <a:schemeClr val="tx1"/>
+              </a:solidFill>
+              <a:latin typeface="Exo 2 Medium" panose="00000600000000000000" pitchFamily="50" charset="0"/>
+              <a:cs typeface="Simplon BP Regular"/>
+            </a:endParaRPr>
+          </a:p>
+          <a:p>
+            <a:pPr marL="0" lvl="1" indent="-252049">
+              <a:buFont typeface="Wingdings" panose="05000000000000000000" pitchFamily="2" charset="2"/>
+              <a:buChar char="§"/>
+            </a:pPr>
+            <a:r>
+              <a:rPr lang="pt-BR" sz="1320" dirty="0">
+                <a:latin typeface="Exo 2 Medium" panose="00000600000000000000" pitchFamily="50" charset="0"/>
+                <a:cs typeface="Simplon BP Regular"/>
+              </a:rPr>
+              <a:t>Diagrama de Solução de Software com Containers </a:t>
+            </a:r>
+            <a:r>
+              <a:rPr lang="pt-BR" sz="1320" b="1" dirty="0">
+                <a:latin typeface="Exo 2 Medium" panose="00000600000000000000" pitchFamily="50" charset="0"/>
+                <a:cs typeface="Simplon BP Regular"/>
+              </a:rPr>
+              <a:t>#Ferraz</a:t>
+            </a:r>
+          </a:p>
+          <a:p>
+            <a:pPr marL="0" lvl="1" indent="-252049">
+              <a:buFont typeface="Wingdings" panose="05000000000000000000" pitchFamily="2" charset="2"/>
+              <a:buChar char="§"/>
+            </a:pPr>
+            <a:r>
+              <a:rPr lang="pt-BR" sz="1320" dirty="0">
+                <a:solidFill>
+                  <a:schemeClr val="tx1"/>
+                </a:solidFill>
+                <a:latin typeface="Exo 2 Medium" panose="00000600000000000000" pitchFamily="50" charset="0"/>
+                <a:cs typeface="Simplon BP Regular"/>
+              </a:rPr>
+              <a:t>Planilha de Arquitetura </a:t>
+            </a:r>
+            <a:r>
+              <a:rPr lang="pt-BR" sz="1320" b="1" dirty="0">
+                <a:solidFill>
+                  <a:schemeClr val="tx1"/>
+                </a:solidFill>
+                <a:latin typeface="Exo 2 Medium" panose="00000600000000000000" pitchFamily="50" charset="0"/>
+                <a:cs typeface="Simplon BP Regular"/>
+              </a:rPr>
+              <a:t>#Equipe</a:t>
+            </a:r>
+          </a:p>
+          <a:p>
+            <a:pPr marL="0" lvl="1" indent="-252049">
+              <a:buFont typeface="Wingdings" panose="05000000000000000000" pitchFamily="2" charset="2"/>
+              <a:buChar char="§"/>
+            </a:pPr>
+            <a:r>
+              <a:rPr lang="pt-BR" sz="1400" dirty="0">
+                <a:solidFill>
+                  <a:schemeClr val="tx1"/>
+                </a:solidFill>
+                <a:latin typeface="Exo 2 Medium" panose="00000600000000000000" pitchFamily="50" charset="0"/>
+                <a:cs typeface="Simplon BP Regular"/>
+              </a:rPr>
+              <a:t>Construção do Script de inserção de dados no banco de dados na Azure </a:t>
+            </a:r>
+            <a:r>
+              <a:rPr lang="pt-BR" sz="1400" b="1" dirty="0">
+                <a:solidFill>
+                  <a:schemeClr val="tx1"/>
+                </a:solidFill>
+                <a:latin typeface="Exo 2 Medium" panose="00000600000000000000" pitchFamily="50" charset="0"/>
+                <a:cs typeface="Simplon BP Regular"/>
+              </a:rPr>
+              <a:t>#Pedro</a:t>
+            </a:r>
+          </a:p>
+          <a:p>
+            <a:pPr marL="0" lvl="1" indent="-252049">
+              <a:buFont typeface="Wingdings" panose="05000000000000000000" pitchFamily="2" charset="2"/>
+              <a:buChar char="§"/>
+            </a:pPr>
+            <a:endParaRPr lang="pt-BR" sz="1320" dirty="0">
+              <a:solidFill>
+                <a:schemeClr val="tx1"/>
+              </a:solidFill>
+              <a:latin typeface="Exo 2 Medium" panose="00000600000000000000" pitchFamily="50" charset="0"/>
+              <a:cs typeface="Simplon BP Regular"/>
+            </a:endParaRPr>
+          </a:p>
+          <a:p>
+            <a:pPr marL="0" lvl="1" indent="-252049">
+              <a:buFont typeface="Wingdings" panose="05000000000000000000" pitchFamily="2" charset="2"/>
+              <a:buChar char="§"/>
+            </a:pPr>
+            <a:endParaRPr lang="pt-BR" sz="1320" dirty="0">
+              <a:solidFill>
+                <a:schemeClr val="tx1"/>
+              </a:solidFill>
+              <a:latin typeface="Exo 2 Medium" panose="00000600000000000000" pitchFamily="50" charset="0"/>
+              <a:cs typeface="Simplon BP Regular"/>
+            </a:endParaRPr>
+          </a:p>
+          <a:p>
+            <a:pPr marL="0" lvl="1" indent="-252049">
+              <a:buFont typeface="Wingdings" panose="05000000000000000000" pitchFamily="2" charset="2"/>
+              <a:buChar char="§"/>
+            </a:pPr>
+            <a:endParaRPr lang="pt-BR" sz="1320" b="1" dirty="0">
+              <a:solidFill>
+                <a:schemeClr val="tx1"/>
+              </a:solidFill>
+              <a:latin typeface="Exo 2 Medium" panose="00000600000000000000" pitchFamily="50" charset="0"/>
+              <a:cs typeface="Simplon BP Regular"/>
+            </a:endParaRPr>
+          </a:p>
+          <a:p>
+            <a:pPr marL="0" lvl="1" indent="-252049">
+              <a:buFont typeface="Wingdings" panose="05000000000000000000" pitchFamily="2" charset="2"/>
+              <a:buChar char="§"/>
+            </a:pPr>
+            <a:endParaRPr lang="pt-BR" sz="1320" b="1" dirty="0">
+              <a:solidFill>
+                <a:schemeClr val="tx1"/>
+              </a:solidFill>
+              <a:latin typeface="Exo 2 Medium" panose="00000600000000000000" pitchFamily="50" charset="0"/>
+              <a:cs typeface="Simplon BP Regular"/>
+            </a:endParaRPr>
+          </a:p>
+          <a:p>
+            <a:pPr marL="0" lvl="1"/>
+            <a:endParaRPr lang="pt-BR" sz="1320" b="1" dirty="0">
+              <a:solidFill>
+                <a:schemeClr val="tx1"/>
+              </a:solidFill>
+              <a:latin typeface="Exo 2 Medium" panose="00000600000000000000" pitchFamily="50" charset="0"/>
+              <a:cs typeface="Simplon BP Regular"/>
+            </a:endParaRPr>
+          </a:p>
+        </p:txBody>
+      </p:sp>
+      <p:sp>
+        <p:nvSpPr>
+          <p:cNvPr id="6" name="Oval 134">
+            <a:extLst>
+              <a:ext uri="{FF2B5EF4-FFF2-40B4-BE49-F238E27FC236}">
+                <a16:creationId xmlns:a16="http://schemas.microsoft.com/office/drawing/2014/main" id="{70825C6F-9257-4CF5-8C62-1CA1EB2F8815}"/>
+              </a:ext>
+            </a:extLst>
+          </p:cNvPr>
+          <p:cNvSpPr>
+            <a:spLocks noChangeAspect="1"/>
+          </p:cNvSpPr>
+          <p:nvPr/>
+        </p:nvSpPr>
+        <p:spPr>
+          <a:xfrm>
+            <a:off x="9323960" y="297930"/>
+            <a:ext cx="211404" cy="211689"/>
+          </a:xfrm>
+          <a:prstGeom prst="ellipse">
+            <a:avLst/>
+          </a:prstGeom>
+          <a:solidFill>
+            <a:srgbClr val="FFC000"/>
+          </a:solidFill>
+          <a:ln w="12700">
+            <a:solidFill>
+              <a:schemeClr val="accent3"/>
+            </a:solidFill>
+          </a:ln>
+        </p:spPr>
+        <p:style>
+          <a:lnRef idx="2">
+            <a:schemeClr val="accent1">
+              <a:shade val="50000"/>
+            </a:schemeClr>
+          </a:lnRef>
+          <a:fillRef idx="1">
+            <a:schemeClr val="accent1"/>
+          </a:fillRef>
+          <a:effectRef idx="0">
+            <a:schemeClr val="accent1"/>
+          </a:effectRef>
+          <a:fontRef idx="minor">
+            <a:schemeClr val="lt1"/>
+          </a:fontRef>
+        </p:style>
+        <p:txBody>
+          <a:bodyPr wrap="none" lIns="52922" tIns="52922" rIns="52922" rtlCol="0" anchor="ctr"/>
+          <a:lstStyle/>
+          <a:p>
+            <a:pPr algn="ctr" defTabSz="672130"/>
+            <a:endParaRPr lang="en-US" sz="1176" dirty="0">
+              <a:solidFill>
+                <a:prstClr val="black"/>
+              </a:solidFill>
+              <a:highlight>
+                <a:srgbClr val="FFFF00"/>
+              </a:highlight>
+              <a:latin typeface="Exo 2 Medium" panose="00000600000000000000" pitchFamily="50" charset="0"/>
+              <a:cs typeface="Simplon BP Regular"/>
+            </a:endParaRPr>
+          </a:p>
+        </p:txBody>
+      </p:sp>
+      <p:sp>
+        <p:nvSpPr>
+          <p:cNvPr id="9" name="Oval 134">
+            <a:extLst>
+              <a:ext uri="{FF2B5EF4-FFF2-40B4-BE49-F238E27FC236}">
+                <a16:creationId xmlns:a16="http://schemas.microsoft.com/office/drawing/2014/main" id="{B60B13C9-0C70-4C0F-82B2-D0CD4FDFC1F0}"/>
+              </a:ext>
+            </a:extLst>
+          </p:cNvPr>
+          <p:cNvSpPr>
+            <a:spLocks noChangeAspect="1"/>
+          </p:cNvSpPr>
+          <p:nvPr/>
+        </p:nvSpPr>
+        <p:spPr>
+          <a:xfrm>
+            <a:off x="12155999" y="297930"/>
+            <a:ext cx="211404" cy="211689"/>
+          </a:xfrm>
+          <a:prstGeom prst="ellipse">
+            <a:avLst/>
+          </a:prstGeom>
+          <a:solidFill>
+            <a:srgbClr val="1BCF13"/>
+          </a:solidFill>
+          <a:ln w="12700">
+            <a:solidFill>
+              <a:schemeClr val="accent3"/>
+            </a:solidFill>
+          </a:ln>
+        </p:spPr>
+        <p:style>
+          <a:lnRef idx="2">
+            <a:schemeClr val="accent1">
+              <a:shade val="50000"/>
+            </a:schemeClr>
+          </a:lnRef>
+          <a:fillRef idx="1">
+            <a:schemeClr val="accent1"/>
+          </a:fillRef>
+          <a:effectRef idx="0">
+            <a:schemeClr val="accent1"/>
+          </a:effectRef>
+          <a:fontRef idx="minor">
+            <a:schemeClr val="lt1"/>
+          </a:fontRef>
+        </p:style>
+        <p:txBody>
+          <a:bodyPr wrap="none" lIns="52922" tIns="52922" rIns="52922" rtlCol="0" anchor="ctr"/>
+          <a:lstStyle/>
+          <a:p>
+            <a:pPr algn="ctr" defTabSz="672130"/>
+            <a:endParaRPr lang="en-US" sz="1176" dirty="0">
+              <a:solidFill>
+                <a:prstClr val="black"/>
+              </a:solidFill>
+              <a:latin typeface="Exo 2 Medium" panose="00000600000000000000" pitchFamily="50" charset="0"/>
+              <a:cs typeface="Simplon BP Regular"/>
+            </a:endParaRPr>
+          </a:p>
+        </p:txBody>
+      </p:sp>
+      <p:sp>
+        <p:nvSpPr>
+          <p:cNvPr id="44" name="Oval 120">
+            <a:extLst>
+              <a:ext uri="{FF2B5EF4-FFF2-40B4-BE49-F238E27FC236}">
+                <a16:creationId xmlns:a16="http://schemas.microsoft.com/office/drawing/2014/main" id="{2688D066-DD5D-4246-B846-8AD1218C78EC}"/>
+              </a:ext>
+            </a:extLst>
+          </p:cNvPr>
+          <p:cNvSpPr>
+            <a:spLocks noChangeAspect="1"/>
+          </p:cNvSpPr>
+          <p:nvPr/>
+        </p:nvSpPr>
+        <p:spPr>
+          <a:xfrm>
+            <a:off x="10188056" y="297930"/>
+            <a:ext cx="211404" cy="211689"/>
+          </a:xfrm>
+          <a:prstGeom prst="ellipse">
+            <a:avLst/>
+          </a:prstGeom>
+          <a:solidFill>
+            <a:srgbClr val="1BCF13"/>
+          </a:solidFill>
+          <a:ln w="12700">
+            <a:solidFill>
+              <a:schemeClr val="accent3"/>
+            </a:solidFill>
+          </a:ln>
+        </p:spPr>
+        <p:style>
+          <a:lnRef idx="2">
+            <a:schemeClr val="accent1">
+              <a:shade val="50000"/>
+            </a:schemeClr>
+          </a:lnRef>
+          <a:fillRef idx="1">
+            <a:schemeClr val="accent1"/>
+          </a:fillRef>
+          <a:effectRef idx="0">
+            <a:schemeClr val="accent1"/>
+          </a:effectRef>
+          <a:fontRef idx="minor">
+            <a:schemeClr val="lt1"/>
+          </a:fontRef>
+        </p:style>
+        <p:txBody>
+          <a:bodyPr wrap="none" lIns="52922" tIns="52922" rIns="52922" rtlCol="0" anchor="ctr"/>
+          <a:lstStyle/>
+          <a:p>
+            <a:pPr algn="ctr" defTabSz="672130"/>
+            <a:endParaRPr lang="en-US" sz="1176" dirty="0">
+              <a:solidFill>
+                <a:prstClr val="black"/>
+              </a:solidFill>
+              <a:latin typeface="Exo 2 Medium" panose="00000600000000000000" pitchFamily="50" charset="0"/>
+              <a:cs typeface="Simplon BP Regular"/>
+            </a:endParaRPr>
+          </a:p>
+        </p:txBody>
+      </p:sp>
+      <p:sp>
+        <p:nvSpPr>
+          <p:cNvPr id="5" name="Retângulo 4">
+            <a:extLst>
+              <a:ext uri="{FF2B5EF4-FFF2-40B4-BE49-F238E27FC236}">
+                <a16:creationId xmlns:a16="http://schemas.microsoft.com/office/drawing/2014/main" id="{A1C14918-6027-46B3-96BF-C5F7FDEC3276}"/>
+              </a:ext>
+            </a:extLst>
+          </p:cNvPr>
+          <p:cNvSpPr/>
+          <p:nvPr/>
+        </p:nvSpPr>
+        <p:spPr>
+          <a:xfrm>
+            <a:off x="8017619" y="209534"/>
+            <a:ext cx="5041889" cy="618769"/>
+          </a:xfrm>
+          <a:prstGeom prst="rect">
+            <a:avLst/>
+          </a:prstGeom>
+          <a:noFill/>
+          <a:ln w="6350">
+            <a:solidFill>
+              <a:schemeClr val="bg1">
+                <a:lumMod val="75000"/>
+              </a:schemeClr>
+            </a:solidFill>
+          </a:ln>
+        </p:spPr>
+        <p:style>
+          <a:lnRef idx="2">
+            <a:schemeClr val="accent1">
+              <a:shade val="50000"/>
+            </a:schemeClr>
+          </a:lnRef>
+          <a:fillRef idx="1">
+            <a:schemeClr val="accent1"/>
+          </a:fillRef>
+          <a:effectRef idx="0">
+            <a:schemeClr val="accent1"/>
+          </a:effectRef>
+          <a:fontRef idx="minor">
+            <a:schemeClr val="lt1"/>
+          </a:fontRef>
+        </p:style>
+        <p:txBody>
+          <a:bodyPr rtlCol="0" anchor="ctr"/>
+          <a:lstStyle/>
+          <a:p>
+            <a:pPr algn="ctr"/>
+            <a:endParaRPr lang="pt-BR">
+              <a:latin typeface="Exo 2 Medium" panose="00000600000000000000" pitchFamily="50" charset="0"/>
+            </a:endParaRPr>
+          </a:p>
+        </p:txBody>
+      </p:sp>
+      <p:sp>
+        <p:nvSpPr>
+          <p:cNvPr id="8" name="TextBox 138">
+            <a:extLst>
+              <a:ext uri="{FF2B5EF4-FFF2-40B4-BE49-F238E27FC236}">
+                <a16:creationId xmlns:a16="http://schemas.microsoft.com/office/drawing/2014/main" id="{5CE7D08C-795B-4BF1-97F6-F9773F4E9F4C}"/>
+              </a:ext>
+            </a:extLst>
+          </p:cNvPr>
+          <p:cNvSpPr txBox="1"/>
+          <p:nvPr/>
+        </p:nvSpPr>
+        <p:spPr>
+          <a:xfrm>
+            <a:off x="9715810" y="51570"/>
+            <a:ext cx="1478088" cy="211688"/>
+          </a:xfrm>
+          <a:prstGeom prst="rect">
+            <a:avLst/>
+          </a:prstGeom>
+          <a:solidFill>
+            <a:schemeClr val="bg1"/>
+          </a:solidFill>
+          <a:ln w="12700">
+            <a:noFill/>
+          </a:ln>
+        </p:spPr>
+        <p:style>
+          <a:lnRef idx="2">
+            <a:schemeClr val="accent4"/>
+          </a:lnRef>
+          <a:fillRef idx="1">
+            <a:schemeClr val="lt1"/>
+          </a:fillRef>
+          <a:effectRef idx="0">
+            <a:schemeClr val="accent4"/>
+          </a:effectRef>
+          <a:fontRef idx="minor">
+            <a:schemeClr val="dk1"/>
+          </a:fontRef>
+        </p:style>
+        <p:txBody>
+          <a:bodyPr wrap="none" lIns="52922" tIns="52922" rIns="52922" bIns="0" rtlCol="0" anchor="b"/>
+          <a:lstStyle>
+            <a:defPPr>
+              <a:defRPr lang="en-US"/>
+            </a:defPPr>
+            <a:lvl1pPr algn="ctr">
+              <a:defRPr sz="1000" b="1">
+                <a:latin typeface="Simplon BP Regular"/>
+                <a:cs typeface="Simplon BP Regular"/>
+              </a:defRPr>
+            </a:lvl1pPr>
+            <a:lvl2pPr>
+              <a:defRPr>
+                <a:solidFill>
+                  <a:schemeClr val="dk1"/>
+                </a:solidFill>
+              </a:defRPr>
+            </a:lvl2pPr>
+            <a:lvl3pPr>
+              <a:defRPr>
+                <a:solidFill>
+                  <a:schemeClr val="dk1"/>
+                </a:solidFill>
+              </a:defRPr>
+            </a:lvl3pPr>
+            <a:lvl4pPr>
+              <a:defRPr>
+                <a:solidFill>
+                  <a:schemeClr val="dk1"/>
+                </a:solidFill>
+              </a:defRPr>
+            </a:lvl4pPr>
+            <a:lvl5pPr>
+              <a:defRPr>
+                <a:solidFill>
+                  <a:schemeClr val="dk1"/>
+                </a:solidFill>
+              </a:defRPr>
+            </a:lvl5pPr>
+            <a:lvl6pPr>
+              <a:defRPr>
+                <a:solidFill>
+                  <a:schemeClr val="dk1"/>
+                </a:solidFill>
+              </a:defRPr>
+            </a:lvl6pPr>
+            <a:lvl7pPr>
+              <a:defRPr>
+                <a:solidFill>
+                  <a:schemeClr val="dk1"/>
+                </a:solidFill>
+              </a:defRPr>
+            </a:lvl7pPr>
+            <a:lvl8pPr>
+              <a:defRPr>
+                <a:solidFill>
+                  <a:schemeClr val="dk1"/>
+                </a:solidFill>
+              </a:defRPr>
+            </a:lvl8pPr>
+            <a:lvl9pPr>
+              <a:defRPr>
+                <a:solidFill>
+                  <a:schemeClr val="dk1"/>
+                </a:solidFill>
+              </a:defRPr>
+            </a:lvl9pPr>
+          </a:lstStyle>
+          <a:p>
+            <a:pPr defTabSz="672130"/>
+            <a:r>
+              <a:rPr lang="en-US" sz="1176" b="0" dirty="0">
+                <a:solidFill>
+                  <a:prstClr val="black"/>
+                </a:solidFill>
+                <a:latin typeface="Exo 2 Medium" panose="00000600000000000000" pitchFamily="50" charset="0"/>
+              </a:rPr>
+              <a:t>    Farol do Projeto   </a:t>
+            </a:r>
+          </a:p>
+        </p:txBody>
+      </p:sp>
+    </p:spTree>
+    <p:extLst>
+      <p:ext uri="{BB962C8B-B14F-4D97-AF65-F5344CB8AC3E}">
+        <p14:creationId xmlns:p14="http://schemas.microsoft.com/office/powerpoint/2010/main" val="2938159925"/>
       </p:ext>
     </p:extLst>
   </p:cSld>
@@ -35474,6 +37635,21 @@
 </file>
 
 <file path=customXml/item1.xml><?xml version="1.0" encoding="utf-8"?>
+<?mso-contentType ?>
+<FormTemplates xmlns="http://schemas.microsoft.com/sharepoint/v3/contenttype/forms">
+  <Display>DocumentLibraryForm</Display>
+  <Edit>DocumentLibraryForm</Edit>
+  <New>DocumentLibraryForm</New>
+</FormTemplates>
+</file>
+
+<file path=customXml/item2.xml><?xml version="1.0" encoding="utf-8"?>
+<p:properties xmlns:p="http://schemas.microsoft.com/office/2006/metadata/properties" xmlns:xsi="http://www.w3.org/2001/XMLSchema-instance" xmlns:pc="http://schemas.microsoft.com/office/infopath/2007/PartnerControls">
+  <documentManagement/>
+</p:properties>
+</file>
+
+<file path=customXml/item3.xml><?xml version="1.0" encoding="utf-8"?>
 <ct:contentTypeSchema xmlns:ct="http://schemas.microsoft.com/office/2006/metadata/contentType" xmlns:ma="http://schemas.microsoft.com/office/2006/metadata/properties/metaAttributes" ct:_="" ma:_="" ma:contentTypeName="Document" ma:contentTypeID="0x0101007F8ECE7139958D46ABEDA89D12B90CBF" ma:contentTypeVersion="0" ma:contentTypeDescription="Create a new document." ma:contentTypeScope="" ma:versionID="e6d660081116f63565d30cc13099d5ec">
   <xsd:schema xmlns:xsd="http://www.w3.org/2001/XMLSchema" xmlns:xs="http://www.w3.org/2001/XMLSchema" xmlns:p="http://schemas.microsoft.com/office/2006/metadata/properties" targetNamespace="http://schemas.microsoft.com/office/2006/metadata/properties" ma:root="true" ma:fieldsID="d413257cd9829394d17656a545d5fa4e">
     <xsd:element name="properties">
@@ -35587,33 +37763,10 @@
 </ct:contentTypeSchema>
 </file>
 
-<file path=customXml/item2.xml><?xml version="1.0" encoding="utf-8"?>
-<p:properties xmlns:p="http://schemas.microsoft.com/office/2006/metadata/properties" xmlns:xsi="http://www.w3.org/2001/XMLSchema-instance" xmlns:pc="http://schemas.microsoft.com/office/infopath/2007/PartnerControls">
-  <documentManagement/>
-</p:properties>
-</file>
-
-<file path=customXml/item3.xml><?xml version="1.0" encoding="utf-8"?>
-<?mso-contentType ?>
-<FormTemplates xmlns="http://schemas.microsoft.com/sharepoint/v3/contenttype/forms">
-  <Display>DocumentLibraryForm</Display>
-  <Edit>DocumentLibraryForm</Edit>
-  <New>DocumentLibraryForm</New>
-</FormTemplates>
-</file>
-
 <file path=customXml/itemProps1.xml><?xml version="1.0" encoding="utf-8"?>
-<ds:datastoreItem xmlns:ds="http://schemas.openxmlformats.org/officeDocument/2006/customXml" ds:itemID="{EFDE92A4-5D2A-451A-A373-EB014CDC0D59}">
+<ds:datastoreItem xmlns:ds="http://schemas.openxmlformats.org/officeDocument/2006/customXml" ds:itemID="{E2481852-F24E-4532-AF30-C154D705D105}">
   <ds:schemaRefs>
-    <ds:schemaRef ds:uri="http://schemas.microsoft.com/office/2006/metadata/contentType"/>
-    <ds:schemaRef ds:uri="http://schemas.microsoft.com/office/2006/metadata/properties/metaAttributes"/>
-    <ds:schemaRef ds:uri="http://www.w3.org/2001/XMLSchema"/>
-    <ds:schemaRef ds:uri="http://schemas.microsoft.com/office/2006/metadata/properties"/>
-    <ds:schemaRef ds:uri="http://schemas.openxmlformats.org/package/2006/metadata/core-properties"/>
-    <ds:schemaRef ds:uri="http://purl.org/dc/elements/1.1/"/>
-    <ds:schemaRef ds:uri="http://purl.org/dc/terms/"/>
-    <ds:schemaRef ds:uri="http://schemas.microsoft.com/internal/obd"/>
-    <ds:schemaRef ds:uri="http://schemas.microsoft.com/office/infopath/2007/PartnerControls"/>
+    <ds:schemaRef ds:uri="http://schemas.microsoft.com/sharepoint/v3/contenttype/forms"/>
   </ds:schemaRefs>
 </ds:datastoreItem>
 </file>
@@ -35636,9 +37789,17 @@
 </file>
 
 <file path=customXml/itemProps3.xml><?xml version="1.0" encoding="utf-8"?>
-<ds:datastoreItem xmlns:ds="http://schemas.openxmlformats.org/officeDocument/2006/customXml" ds:itemID="{E2481852-F24E-4532-AF30-C154D705D105}">
+<ds:datastoreItem xmlns:ds="http://schemas.openxmlformats.org/officeDocument/2006/customXml" ds:itemID="{EFDE92A4-5D2A-451A-A373-EB014CDC0D59}">
   <ds:schemaRefs>
-    <ds:schemaRef ds:uri="http://schemas.microsoft.com/sharepoint/v3/contenttype/forms"/>
+    <ds:schemaRef ds:uri="http://schemas.microsoft.com/office/2006/metadata/contentType"/>
+    <ds:schemaRef ds:uri="http://schemas.microsoft.com/office/2006/metadata/properties/metaAttributes"/>
+    <ds:schemaRef ds:uri="http://www.w3.org/2001/XMLSchema"/>
+    <ds:schemaRef ds:uri="http://schemas.microsoft.com/office/2006/metadata/properties"/>
+    <ds:schemaRef ds:uri="http://schemas.openxmlformats.org/package/2006/metadata/core-properties"/>
+    <ds:schemaRef ds:uri="http://purl.org/dc/elements/1.1/"/>
+    <ds:schemaRef ds:uri="http://purl.org/dc/terms/"/>
+    <ds:schemaRef ds:uri="http://schemas.microsoft.com/internal/obd"/>
+    <ds:schemaRef ds:uri="http://schemas.microsoft.com/office/infopath/2007/PartnerControls"/>
   </ds:schemaRefs>
 </ds:datastoreItem>
 </file>
</xml_diff>

<commit_message>
[documentation] adiciona o status report da semana 9 - 13/10
</commit_message>
<xml_diff>
--- a/documentacao/Status Report/Status_Report_-_Grupo_09.pptx
+++ b/documentacao/Status Report/Status_Report_-_Grupo_09.pptx
@@ -7,10 +7,10 @@
     <p:sldMasterId id="2147483665" r:id="rId6"/>
   </p:sldMasterIdLst>
   <p:notesMasterIdLst>
-    <p:notesMasterId r:id="rId15"/>
+    <p:notesMasterId r:id="rId16"/>
   </p:notesMasterIdLst>
   <p:handoutMasterIdLst>
-    <p:handoutMasterId r:id="rId16"/>
+    <p:handoutMasterId r:id="rId17"/>
   </p:handoutMasterIdLst>
   <p:sldIdLst>
     <p:sldId id="344" r:id="rId7"/>
@@ -21,6 +21,7 @@
     <p:sldId id="475" r:id="rId12"/>
     <p:sldId id="476" r:id="rId13"/>
     <p:sldId id="477" r:id="rId14"/>
+    <p:sldId id="478" r:id="rId15"/>
   </p:sldIdLst>
   <p:sldSz cx="13442950" cy="7561263"/>
   <p:notesSz cx="7104063" cy="10234613"/>
@@ -135,6 +136,7 @@
             <p14:sldId id="475"/>
             <p14:sldId id="476"/>
             <p14:sldId id="477"/>
+            <p14:sldId id="478"/>
           </p14:sldIdLst>
         </p14:section>
       </p14:sectionLst>
@@ -433,7 +435,7 @@
             <a:fld id="{C3CD65D1-5C11-455D-9F9A-0E035F00A0DA}" type="datetimeFigureOut">
               <a:rPr lang="pt-BR" smtClean="0"/>
               <a:pPr/>
-              <a:t>06/10/2021</a:t>
+              <a:t>13/10/2021</a:t>
             </a:fld>
             <a:endParaRPr lang="pt-BR"/>
           </a:p>
@@ -601,7 +603,7 @@
             <a:fld id="{A05DA3EF-18EA-43DE-B1BB-402A3C558822}" type="datetimeFigureOut">
               <a:rPr lang="pt-BR" smtClean="0"/>
               <a:pPr/>
-              <a:t>06/10/2021</a:t>
+              <a:t>13/10/2021</a:t>
             </a:fld>
             <a:endParaRPr lang="pt-BR"/>
           </a:p>
@@ -1599,6 +1601,99 @@
     <p:extLst>
       <p:ext uri="{BB962C8B-B14F-4D97-AF65-F5344CB8AC3E}">
         <p14:creationId xmlns:p14="http://schemas.microsoft.com/office/powerpoint/2010/main" val="3290959397"/>
+      </p:ext>
+    </p:extLst>
+  </p:cSld>
+  <p:clrMapOvr>
+    <a:masterClrMapping/>
+  </p:clrMapOvr>
+</p:notes>
+</file>
+
+<file path=ppt/notesSlides/notesSlide9.xml><?xml version="1.0" encoding="utf-8"?>
+<p:notes xmlns:a="http://schemas.openxmlformats.org/drawingml/2006/main" xmlns:r="http://schemas.openxmlformats.org/officeDocument/2006/relationships" xmlns:p="http://schemas.openxmlformats.org/presentationml/2006/main">
+  <p:cSld>
+    <p:spTree>
+      <p:nvGrpSpPr>
+        <p:cNvPr id="1" name=""/>
+        <p:cNvGrpSpPr/>
+        <p:nvPr/>
+      </p:nvGrpSpPr>
+      <p:grpSpPr>
+        <a:xfrm>
+          <a:off x="0" y="0"/>
+          <a:ext cx="0" cy="0"/>
+          <a:chOff x="0" y="0"/>
+          <a:chExt cx="0" cy="0"/>
+        </a:xfrm>
+      </p:grpSpPr>
+      <p:sp>
+        <p:nvSpPr>
+          <p:cNvPr id="2" name="Slide Image Placeholder 1"/>
+          <p:cNvSpPr>
+            <a:spLocks noGrp="1" noRot="1" noChangeAspect="1"/>
+          </p:cNvSpPr>
+          <p:nvPr>
+            <p:ph type="sldImg"/>
+          </p:nvPr>
+        </p:nvSpPr>
+        <p:spPr/>
+      </p:sp>
+      <p:sp>
+        <p:nvSpPr>
+          <p:cNvPr id="3" name="Notes Placeholder 2"/>
+          <p:cNvSpPr>
+            <a:spLocks noGrp="1"/>
+          </p:cNvSpPr>
+          <p:nvPr>
+            <p:ph type="body" idx="1"/>
+          </p:nvPr>
+        </p:nvSpPr>
+        <p:spPr/>
+        <p:txBody>
+          <a:bodyPr/>
+          <a:lstStyle/>
+          <a:p>
+            <a:endParaRPr lang="en-US"/>
+          </a:p>
+        </p:txBody>
+      </p:sp>
+      <p:sp>
+        <p:nvSpPr>
+          <p:cNvPr id="4" name="Slide Number Placeholder 3"/>
+          <p:cNvSpPr>
+            <a:spLocks noGrp="1"/>
+          </p:cNvSpPr>
+          <p:nvPr>
+            <p:ph type="sldNum" sz="quarter" idx="10"/>
+          </p:nvPr>
+        </p:nvSpPr>
+        <p:spPr/>
+        <p:txBody>
+          <a:bodyPr/>
+          <a:lstStyle/>
+          <a:p>
+            <a:fld id="{B39AF3DB-B6A1-2444-9DD8-53D016F8E638}" type="slidenum">
+              <a:rPr lang="pt-BR" smtClean="0">
+                <a:solidFill>
+                  <a:prstClr val="black"/>
+                </a:solidFill>
+              </a:rPr>
+              <a:pPr/>
+              <a:t>9</a:t>
+            </a:fld>
+            <a:endParaRPr lang="pt-BR">
+              <a:solidFill>
+                <a:prstClr val="black"/>
+              </a:solidFill>
+            </a:endParaRPr>
+          </a:p>
+        </p:txBody>
+      </p:sp>
+    </p:spTree>
+    <p:extLst>
+      <p:ext uri="{BB962C8B-B14F-4D97-AF65-F5344CB8AC3E}">
+        <p14:creationId xmlns:p14="http://schemas.microsoft.com/office/powerpoint/2010/main" val="462625982"/>
       </p:ext>
     </p:extLst>
   </p:cSld>
@@ -36210,6 +36305,2016 @@
     <p:extLst>
       <p:ext uri="{BB962C8B-B14F-4D97-AF65-F5344CB8AC3E}">
         <p14:creationId xmlns:p14="http://schemas.microsoft.com/office/powerpoint/2010/main" val="2938159925"/>
+      </p:ext>
+    </p:extLst>
+  </p:cSld>
+  <p:clrMapOvr>
+    <a:masterClrMapping/>
+  </p:clrMapOvr>
+</p:sld>
+</file>
+
+<file path=ppt/slides/slide9.xml><?xml version="1.0" encoding="utf-8"?>
+<p:sld xmlns:a="http://schemas.openxmlformats.org/drawingml/2006/main" xmlns:r="http://schemas.openxmlformats.org/officeDocument/2006/relationships" xmlns:p="http://schemas.openxmlformats.org/presentationml/2006/main">
+  <p:cSld>
+    <p:spTree>
+      <p:nvGrpSpPr>
+        <p:cNvPr id="1" name=""/>
+        <p:cNvGrpSpPr/>
+        <p:nvPr/>
+      </p:nvGrpSpPr>
+      <p:grpSpPr>
+        <a:xfrm>
+          <a:off x="0" y="0"/>
+          <a:ext cx="0" cy="0"/>
+          <a:chOff x="0" y="0"/>
+          <a:chExt cx="0" cy="0"/>
+        </a:xfrm>
+      </p:grpSpPr>
+      <p:sp>
+        <p:nvSpPr>
+          <p:cNvPr id="43" name="Rectangle 42"/>
+          <p:cNvSpPr/>
+          <p:nvPr/>
+        </p:nvSpPr>
+        <p:spPr>
+          <a:xfrm>
+            <a:off x="6804884" y="1106495"/>
+            <a:ext cx="6254624" cy="2191469"/>
+          </a:xfrm>
+          <a:prstGeom prst="rect">
+            <a:avLst/>
+          </a:prstGeom>
+          <a:noFill/>
+          <a:ln w="12700">
+            <a:solidFill>
+              <a:schemeClr val="bg1">
+                <a:lumMod val="50000"/>
+              </a:schemeClr>
+            </a:solidFill>
+          </a:ln>
+        </p:spPr>
+        <p:style>
+          <a:lnRef idx="2">
+            <a:schemeClr val="accent4"/>
+          </a:lnRef>
+          <a:fillRef idx="1">
+            <a:schemeClr val="lt1"/>
+          </a:fillRef>
+          <a:effectRef idx="0">
+            <a:schemeClr val="accent4"/>
+          </a:effectRef>
+          <a:fontRef idx="minor">
+            <a:schemeClr val="dk1"/>
+          </a:fontRef>
+        </p:style>
+        <p:txBody>
+          <a:bodyPr tIns="105844" rtlCol="0" anchor="t"/>
+          <a:lstStyle/>
+          <a:p>
+            <a:pPr defTabSz="672130">
+              <a:spcAft>
+                <a:spcPts val="882"/>
+              </a:spcAft>
+            </a:pPr>
+            <a:endParaRPr lang="pt-BR" sz="1470" dirty="0">
+              <a:solidFill>
+                <a:schemeClr val="tx1"/>
+              </a:solidFill>
+              <a:latin typeface="Exo 2 Medium" panose="00000600000000000000" pitchFamily="50" charset="0"/>
+              <a:cs typeface="Simplon BP Regular"/>
+            </a:endParaRPr>
+          </a:p>
+        </p:txBody>
+      </p:sp>
+      <p:sp>
+        <p:nvSpPr>
+          <p:cNvPr id="3" name="Title 2"/>
+          <p:cNvSpPr>
+            <a:spLocks noGrp="1"/>
+          </p:cNvSpPr>
+          <p:nvPr>
+            <p:ph type="title"/>
+          </p:nvPr>
+        </p:nvSpPr>
+        <p:spPr>
+          <a:xfrm>
+            <a:off x="469692" y="185232"/>
+            <a:ext cx="12098020" cy="800352"/>
+          </a:xfrm>
+        </p:spPr>
+        <p:txBody>
+          <a:bodyPr vert="horz" wrap="square" lIns="105844" tIns="0" rIns="105844" bIns="0" numCol="1" anchor="t" anchorCtr="0" compatLnSpc="1">
+            <a:prstTxWarp prst="textNoShape">
+              <a:avLst/>
+            </a:prstTxWarp>
+            <a:noAutofit/>
+          </a:bodyPr>
+          <a:lstStyle/>
+          <a:p>
+            <a:pPr algn="l">
+              <a:spcAft>
+                <a:spcPts val="882"/>
+              </a:spcAft>
+            </a:pPr>
+            <a:r>
+              <a:rPr lang="en-US" sz="2646" dirty="0">
+                <a:solidFill>
+                  <a:prstClr val="black"/>
+                </a:solidFill>
+                <a:latin typeface="Exo 2 Medium" panose="00000600000000000000" pitchFamily="50" charset="0"/>
+                <a:cs typeface="Simplon Oi Headline"/>
+              </a:rPr>
+              <a:t>SEMANA 9 - 13/10/2021</a:t>
+            </a:r>
+          </a:p>
+        </p:txBody>
+      </p:sp>
+      <p:sp>
+        <p:nvSpPr>
+          <p:cNvPr id="78" name="TextBox 118"/>
+          <p:cNvSpPr txBox="1"/>
+          <p:nvPr/>
+        </p:nvSpPr>
+        <p:spPr>
+          <a:xfrm>
+            <a:off x="11822773" y="576471"/>
+            <a:ext cx="899678" cy="179824"/>
+          </a:xfrm>
+          <a:prstGeom prst="rect">
+            <a:avLst/>
+          </a:prstGeom>
+          <a:noFill/>
+          <a:ln w="12700">
+            <a:noFill/>
+          </a:ln>
+        </p:spPr>
+        <p:style>
+          <a:lnRef idx="2">
+            <a:schemeClr val="accent4"/>
+          </a:lnRef>
+          <a:fillRef idx="1">
+            <a:schemeClr val="lt1"/>
+          </a:fillRef>
+          <a:effectRef idx="0">
+            <a:schemeClr val="accent4"/>
+          </a:effectRef>
+          <a:fontRef idx="minor">
+            <a:schemeClr val="dk1"/>
+          </a:fontRef>
+        </p:style>
+        <p:txBody>
+          <a:bodyPr wrap="none" lIns="52922" tIns="52922" rIns="52922" bIns="0" rtlCol="0" anchor="b"/>
+          <a:lstStyle>
+            <a:defPPr>
+              <a:defRPr lang="en-US"/>
+            </a:defPPr>
+            <a:lvl1pPr algn="ctr">
+              <a:defRPr sz="1000" b="1">
+                <a:latin typeface="Simplon BP Regular"/>
+                <a:cs typeface="Simplon BP Regular"/>
+              </a:defRPr>
+            </a:lvl1pPr>
+            <a:lvl2pPr>
+              <a:defRPr>
+                <a:solidFill>
+                  <a:schemeClr val="dk1"/>
+                </a:solidFill>
+              </a:defRPr>
+            </a:lvl2pPr>
+            <a:lvl3pPr>
+              <a:defRPr>
+                <a:solidFill>
+                  <a:schemeClr val="dk1"/>
+                </a:solidFill>
+              </a:defRPr>
+            </a:lvl3pPr>
+            <a:lvl4pPr>
+              <a:defRPr>
+                <a:solidFill>
+                  <a:schemeClr val="dk1"/>
+                </a:solidFill>
+              </a:defRPr>
+            </a:lvl4pPr>
+            <a:lvl5pPr>
+              <a:defRPr>
+                <a:solidFill>
+                  <a:schemeClr val="dk1"/>
+                </a:solidFill>
+              </a:defRPr>
+            </a:lvl5pPr>
+            <a:lvl6pPr>
+              <a:defRPr>
+                <a:solidFill>
+                  <a:schemeClr val="dk1"/>
+                </a:solidFill>
+              </a:defRPr>
+            </a:lvl6pPr>
+            <a:lvl7pPr>
+              <a:defRPr>
+                <a:solidFill>
+                  <a:schemeClr val="dk1"/>
+                </a:solidFill>
+              </a:defRPr>
+            </a:lvl7pPr>
+            <a:lvl8pPr>
+              <a:defRPr>
+                <a:solidFill>
+                  <a:schemeClr val="dk1"/>
+                </a:solidFill>
+              </a:defRPr>
+            </a:lvl8pPr>
+            <a:lvl9pPr>
+              <a:defRPr>
+                <a:solidFill>
+                  <a:schemeClr val="dk1"/>
+                </a:solidFill>
+              </a:defRPr>
+            </a:lvl9pPr>
+          </a:lstStyle>
+          <a:p>
+            <a:pPr defTabSz="672130"/>
+            <a:r>
+              <a:rPr lang="pt-BR" sz="1176" b="0" dirty="0">
+                <a:solidFill>
+                  <a:prstClr val="black"/>
+                </a:solidFill>
+                <a:latin typeface="Exo 2 Medium" panose="00000600000000000000" pitchFamily="50" charset="0"/>
+              </a:rPr>
+              <a:t>Negócios</a:t>
+            </a:r>
+          </a:p>
+        </p:txBody>
+      </p:sp>
+      <p:sp>
+        <p:nvSpPr>
+          <p:cNvPr id="109" name="Oval 120"/>
+          <p:cNvSpPr>
+            <a:spLocks noChangeAspect="1"/>
+          </p:cNvSpPr>
+          <p:nvPr/>
+        </p:nvSpPr>
+        <p:spPr>
+          <a:xfrm>
+            <a:off x="11193898" y="297930"/>
+            <a:ext cx="211404" cy="211689"/>
+          </a:xfrm>
+          <a:prstGeom prst="ellipse">
+            <a:avLst/>
+          </a:prstGeom>
+          <a:solidFill>
+            <a:srgbClr val="1BCF13"/>
+          </a:solidFill>
+          <a:ln w="12700">
+            <a:solidFill>
+              <a:schemeClr val="accent3"/>
+            </a:solidFill>
+          </a:ln>
+        </p:spPr>
+        <p:style>
+          <a:lnRef idx="2">
+            <a:schemeClr val="accent1">
+              <a:shade val="50000"/>
+            </a:schemeClr>
+          </a:lnRef>
+          <a:fillRef idx="1">
+            <a:schemeClr val="accent1"/>
+          </a:fillRef>
+          <a:effectRef idx="0">
+            <a:schemeClr val="accent1"/>
+          </a:effectRef>
+          <a:fontRef idx="minor">
+            <a:schemeClr val="lt1"/>
+          </a:fontRef>
+        </p:style>
+        <p:txBody>
+          <a:bodyPr wrap="none" lIns="52922" tIns="52922" rIns="52922" rtlCol="0" anchor="ctr"/>
+          <a:lstStyle/>
+          <a:p>
+            <a:pPr algn="ctr" defTabSz="672130"/>
+            <a:endParaRPr lang="en-US" sz="1176" dirty="0">
+              <a:solidFill>
+                <a:prstClr val="black"/>
+              </a:solidFill>
+              <a:latin typeface="Exo 2 Medium" panose="00000600000000000000" pitchFamily="50" charset="0"/>
+              <a:cs typeface="Simplon BP Regular"/>
+            </a:endParaRPr>
+          </a:p>
+        </p:txBody>
+      </p:sp>
+      <p:sp>
+        <p:nvSpPr>
+          <p:cNvPr id="80" name="TextBox 123"/>
+          <p:cNvSpPr txBox="1"/>
+          <p:nvPr/>
+        </p:nvSpPr>
+        <p:spPr>
+          <a:xfrm>
+            <a:off x="10852497" y="576471"/>
+            <a:ext cx="899678" cy="179824"/>
+          </a:xfrm>
+          <a:prstGeom prst="rect">
+            <a:avLst/>
+          </a:prstGeom>
+          <a:noFill/>
+          <a:ln w="12700">
+            <a:noFill/>
+          </a:ln>
+        </p:spPr>
+        <p:style>
+          <a:lnRef idx="2">
+            <a:schemeClr val="accent4"/>
+          </a:lnRef>
+          <a:fillRef idx="1">
+            <a:schemeClr val="lt1"/>
+          </a:fillRef>
+          <a:effectRef idx="0">
+            <a:schemeClr val="accent4"/>
+          </a:effectRef>
+          <a:fontRef idx="minor">
+            <a:schemeClr val="dk1"/>
+          </a:fontRef>
+        </p:style>
+        <p:txBody>
+          <a:bodyPr wrap="none" lIns="52922" tIns="52922" rIns="52922" bIns="0" rtlCol="0" anchor="b"/>
+          <a:lstStyle>
+            <a:defPPr>
+              <a:defRPr lang="en-US"/>
+            </a:defPPr>
+            <a:lvl1pPr algn="ctr">
+              <a:defRPr sz="1000" b="1">
+                <a:latin typeface="Simplon BP Regular"/>
+                <a:cs typeface="Simplon BP Regular"/>
+              </a:defRPr>
+            </a:lvl1pPr>
+            <a:lvl2pPr>
+              <a:defRPr>
+                <a:solidFill>
+                  <a:schemeClr val="dk1"/>
+                </a:solidFill>
+              </a:defRPr>
+            </a:lvl2pPr>
+            <a:lvl3pPr>
+              <a:defRPr>
+                <a:solidFill>
+                  <a:schemeClr val="dk1"/>
+                </a:solidFill>
+              </a:defRPr>
+            </a:lvl3pPr>
+            <a:lvl4pPr>
+              <a:defRPr>
+                <a:solidFill>
+                  <a:schemeClr val="dk1"/>
+                </a:solidFill>
+              </a:defRPr>
+            </a:lvl4pPr>
+            <a:lvl5pPr>
+              <a:defRPr>
+                <a:solidFill>
+                  <a:schemeClr val="dk1"/>
+                </a:solidFill>
+              </a:defRPr>
+            </a:lvl5pPr>
+            <a:lvl6pPr>
+              <a:defRPr>
+                <a:solidFill>
+                  <a:schemeClr val="dk1"/>
+                </a:solidFill>
+              </a:defRPr>
+            </a:lvl6pPr>
+            <a:lvl7pPr>
+              <a:defRPr>
+                <a:solidFill>
+                  <a:schemeClr val="dk1"/>
+                </a:solidFill>
+              </a:defRPr>
+            </a:lvl7pPr>
+            <a:lvl8pPr>
+              <a:defRPr>
+                <a:solidFill>
+                  <a:schemeClr val="dk1"/>
+                </a:solidFill>
+              </a:defRPr>
+            </a:lvl8pPr>
+            <a:lvl9pPr>
+              <a:defRPr>
+                <a:solidFill>
+                  <a:schemeClr val="dk1"/>
+                </a:solidFill>
+              </a:defRPr>
+            </a:lvl9pPr>
+          </a:lstStyle>
+          <a:p>
+            <a:pPr defTabSz="672130"/>
+            <a:r>
+              <a:rPr lang="pt-BR" sz="1176" b="0" dirty="0">
+                <a:solidFill>
+                  <a:prstClr val="black"/>
+                </a:solidFill>
+                <a:latin typeface="Exo 2 Medium" panose="00000600000000000000" pitchFamily="50" charset="0"/>
+              </a:rPr>
+              <a:t>Plataforma</a:t>
+            </a:r>
+          </a:p>
+        </p:txBody>
+      </p:sp>
+      <p:sp>
+        <p:nvSpPr>
+          <p:cNvPr id="82" name="TextBox 128"/>
+          <p:cNvSpPr txBox="1"/>
+          <p:nvPr/>
+        </p:nvSpPr>
+        <p:spPr>
+          <a:xfrm>
+            <a:off x="9854245" y="576471"/>
+            <a:ext cx="899678" cy="179824"/>
+          </a:xfrm>
+          <a:prstGeom prst="rect">
+            <a:avLst/>
+          </a:prstGeom>
+          <a:noFill/>
+          <a:ln w="12700">
+            <a:noFill/>
+          </a:ln>
+        </p:spPr>
+        <p:style>
+          <a:lnRef idx="2">
+            <a:schemeClr val="accent4"/>
+          </a:lnRef>
+          <a:fillRef idx="1">
+            <a:schemeClr val="lt1"/>
+          </a:fillRef>
+          <a:effectRef idx="0">
+            <a:schemeClr val="accent4"/>
+          </a:effectRef>
+          <a:fontRef idx="minor">
+            <a:schemeClr val="dk1"/>
+          </a:fontRef>
+        </p:style>
+        <p:txBody>
+          <a:bodyPr wrap="none" lIns="52922" tIns="52922" rIns="52922" bIns="0" rtlCol="0" anchor="b"/>
+          <a:lstStyle>
+            <a:defPPr>
+              <a:defRPr lang="en-US"/>
+            </a:defPPr>
+            <a:lvl1pPr algn="ctr">
+              <a:defRPr sz="1000" b="1">
+                <a:latin typeface="Simplon BP Regular"/>
+                <a:cs typeface="Simplon BP Regular"/>
+              </a:defRPr>
+            </a:lvl1pPr>
+            <a:lvl2pPr>
+              <a:defRPr>
+                <a:solidFill>
+                  <a:schemeClr val="dk1"/>
+                </a:solidFill>
+              </a:defRPr>
+            </a:lvl2pPr>
+            <a:lvl3pPr>
+              <a:defRPr>
+                <a:solidFill>
+                  <a:schemeClr val="dk1"/>
+                </a:solidFill>
+              </a:defRPr>
+            </a:lvl3pPr>
+            <a:lvl4pPr>
+              <a:defRPr>
+                <a:solidFill>
+                  <a:schemeClr val="dk1"/>
+                </a:solidFill>
+              </a:defRPr>
+            </a:lvl4pPr>
+            <a:lvl5pPr>
+              <a:defRPr>
+                <a:solidFill>
+                  <a:schemeClr val="dk1"/>
+                </a:solidFill>
+              </a:defRPr>
+            </a:lvl5pPr>
+            <a:lvl6pPr>
+              <a:defRPr>
+                <a:solidFill>
+                  <a:schemeClr val="dk1"/>
+                </a:solidFill>
+              </a:defRPr>
+            </a:lvl6pPr>
+            <a:lvl7pPr>
+              <a:defRPr>
+                <a:solidFill>
+                  <a:schemeClr val="dk1"/>
+                </a:solidFill>
+              </a:defRPr>
+            </a:lvl7pPr>
+            <a:lvl8pPr>
+              <a:defRPr>
+                <a:solidFill>
+                  <a:schemeClr val="dk1"/>
+                </a:solidFill>
+              </a:defRPr>
+            </a:lvl8pPr>
+            <a:lvl9pPr>
+              <a:defRPr>
+                <a:solidFill>
+                  <a:schemeClr val="dk1"/>
+                </a:solidFill>
+              </a:defRPr>
+            </a:lvl9pPr>
+          </a:lstStyle>
+          <a:p>
+            <a:pPr defTabSz="672130"/>
+            <a:r>
+              <a:rPr lang="pt-BR" sz="1176" b="0" dirty="0">
+                <a:solidFill>
+                  <a:prstClr val="black"/>
+                </a:solidFill>
+                <a:latin typeface="Exo 2 Medium" panose="00000600000000000000" pitchFamily="50" charset="0"/>
+              </a:rPr>
+              <a:t>Back</a:t>
+            </a:r>
+          </a:p>
+        </p:txBody>
+      </p:sp>
+      <p:sp>
+        <p:nvSpPr>
+          <p:cNvPr id="84" name="TextBox 133"/>
+          <p:cNvSpPr txBox="1"/>
+          <p:nvPr/>
+        </p:nvSpPr>
+        <p:spPr>
+          <a:xfrm>
+            <a:off x="8986650" y="576471"/>
+            <a:ext cx="899678" cy="179824"/>
+          </a:xfrm>
+          <a:prstGeom prst="rect">
+            <a:avLst/>
+          </a:prstGeom>
+          <a:noFill/>
+          <a:ln w="12700">
+            <a:noFill/>
+          </a:ln>
+        </p:spPr>
+        <p:style>
+          <a:lnRef idx="2">
+            <a:schemeClr val="accent4"/>
+          </a:lnRef>
+          <a:fillRef idx="1">
+            <a:schemeClr val="lt1"/>
+          </a:fillRef>
+          <a:effectRef idx="0">
+            <a:schemeClr val="accent4"/>
+          </a:effectRef>
+          <a:fontRef idx="minor">
+            <a:schemeClr val="dk1"/>
+          </a:fontRef>
+        </p:style>
+        <p:txBody>
+          <a:bodyPr wrap="none" lIns="52922" tIns="52922" rIns="52922" bIns="0" rtlCol="0" anchor="b"/>
+          <a:lstStyle>
+            <a:defPPr>
+              <a:defRPr lang="en-US"/>
+            </a:defPPr>
+            <a:lvl1pPr algn="ctr">
+              <a:defRPr sz="1000" b="1">
+                <a:latin typeface="Simplon BP Regular"/>
+                <a:cs typeface="Simplon BP Regular"/>
+              </a:defRPr>
+            </a:lvl1pPr>
+            <a:lvl2pPr>
+              <a:defRPr>
+                <a:solidFill>
+                  <a:schemeClr val="dk1"/>
+                </a:solidFill>
+              </a:defRPr>
+            </a:lvl2pPr>
+            <a:lvl3pPr>
+              <a:defRPr>
+                <a:solidFill>
+                  <a:schemeClr val="dk1"/>
+                </a:solidFill>
+              </a:defRPr>
+            </a:lvl3pPr>
+            <a:lvl4pPr>
+              <a:defRPr>
+                <a:solidFill>
+                  <a:schemeClr val="dk1"/>
+                </a:solidFill>
+              </a:defRPr>
+            </a:lvl4pPr>
+            <a:lvl5pPr>
+              <a:defRPr>
+                <a:solidFill>
+                  <a:schemeClr val="dk1"/>
+                </a:solidFill>
+              </a:defRPr>
+            </a:lvl5pPr>
+            <a:lvl6pPr>
+              <a:defRPr>
+                <a:solidFill>
+                  <a:schemeClr val="dk1"/>
+                </a:solidFill>
+              </a:defRPr>
+            </a:lvl6pPr>
+            <a:lvl7pPr>
+              <a:defRPr>
+                <a:solidFill>
+                  <a:schemeClr val="dk1"/>
+                </a:solidFill>
+              </a:defRPr>
+            </a:lvl7pPr>
+            <a:lvl8pPr>
+              <a:defRPr>
+                <a:solidFill>
+                  <a:schemeClr val="dk1"/>
+                </a:solidFill>
+              </a:defRPr>
+            </a:lvl8pPr>
+            <a:lvl9pPr>
+              <a:defRPr>
+                <a:solidFill>
+                  <a:schemeClr val="dk1"/>
+                </a:solidFill>
+              </a:defRPr>
+            </a:lvl9pPr>
+          </a:lstStyle>
+          <a:p>
+            <a:pPr defTabSz="672130"/>
+            <a:r>
+              <a:rPr lang="pt-BR" sz="1176" b="0" dirty="0">
+                <a:solidFill>
+                  <a:prstClr val="black"/>
+                </a:solidFill>
+                <a:latin typeface="Exo 2 Medium" panose="00000600000000000000" pitchFamily="50" charset="0"/>
+              </a:rPr>
+              <a:t>Front</a:t>
+            </a:r>
+          </a:p>
+        </p:txBody>
+      </p:sp>
+      <p:sp>
+        <p:nvSpPr>
+          <p:cNvPr id="88" name="Oval 134"/>
+          <p:cNvSpPr>
+            <a:spLocks noChangeAspect="1"/>
+          </p:cNvSpPr>
+          <p:nvPr/>
+        </p:nvSpPr>
+        <p:spPr>
+          <a:xfrm>
+            <a:off x="8443555" y="297930"/>
+            <a:ext cx="211404" cy="211689"/>
+          </a:xfrm>
+          <a:prstGeom prst="ellipse">
+            <a:avLst/>
+          </a:prstGeom>
+          <a:solidFill>
+            <a:srgbClr val="1BCF13"/>
+          </a:solidFill>
+          <a:ln w="12700">
+            <a:solidFill>
+              <a:schemeClr val="accent3"/>
+            </a:solidFill>
+          </a:ln>
+        </p:spPr>
+        <p:style>
+          <a:lnRef idx="2">
+            <a:schemeClr val="accent1">
+              <a:shade val="50000"/>
+            </a:schemeClr>
+          </a:lnRef>
+          <a:fillRef idx="1">
+            <a:schemeClr val="accent1"/>
+          </a:fillRef>
+          <a:effectRef idx="0">
+            <a:schemeClr val="accent1"/>
+          </a:effectRef>
+          <a:fontRef idx="minor">
+            <a:schemeClr val="lt1"/>
+          </a:fontRef>
+        </p:style>
+        <p:txBody>
+          <a:bodyPr wrap="none" lIns="52922" tIns="52922" rIns="52922" rtlCol="0" anchor="ctr"/>
+          <a:lstStyle/>
+          <a:p>
+            <a:pPr algn="ctr" defTabSz="672130"/>
+            <a:endParaRPr lang="en-US" sz="1176" dirty="0">
+              <a:solidFill>
+                <a:prstClr val="black"/>
+              </a:solidFill>
+              <a:latin typeface="Exo 2 Medium" panose="00000600000000000000" pitchFamily="50" charset="0"/>
+              <a:cs typeface="Simplon BP Regular"/>
+            </a:endParaRPr>
+          </a:p>
+        </p:txBody>
+      </p:sp>
+      <p:sp>
+        <p:nvSpPr>
+          <p:cNvPr id="86" name="TextBox 138"/>
+          <p:cNvSpPr txBox="1"/>
+          <p:nvPr/>
+        </p:nvSpPr>
+        <p:spPr>
+          <a:xfrm>
+            <a:off x="8126053" y="576471"/>
+            <a:ext cx="899678" cy="179824"/>
+          </a:xfrm>
+          <a:prstGeom prst="rect">
+            <a:avLst/>
+          </a:prstGeom>
+          <a:noFill/>
+          <a:ln w="12700">
+            <a:noFill/>
+          </a:ln>
+        </p:spPr>
+        <p:style>
+          <a:lnRef idx="2">
+            <a:schemeClr val="accent4"/>
+          </a:lnRef>
+          <a:fillRef idx="1">
+            <a:schemeClr val="lt1"/>
+          </a:fillRef>
+          <a:effectRef idx="0">
+            <a:schemeClr val="accent4"/>
+          </a:effectRef>
+          <a:fontRef idx="minor">
+            <a:schemeClr val="dk1"/>
+          </a:fontRef>
+        </p:style>
+        <p:txBody>
+          <a:bodyPr wrap="none" lIns="52922" tIns="52922" rIns="52922" bIns="0" rtlCol="0" anchor="b"/>
+          <a:lstStyle>
+            <a:defPPr>
+              <a:defRPr lang="en-US"/>
+            </a:defPPr>
+            <a:lvl1pPr algn="ctr">
+              <a:defRPr sz="1000" b="1">
+                <a:latin typeface="Simplon BP Regular"/>
+                <a:cs typeface="Simplon BP Regular"/>
+              </a:defRPr>
+            </a:lvl1pPr>
+            <a:lvl2pPr>
+              <a:defRPr>
+                <a:solidFill>
+                  <a:schemeClr val="dk1"/>
+                </a:solidFill>
+              </a:defRPr>
+            </a:lvl2pPr>
+            <a:lvl3pPr>
+              <a:defRPr>
+                <a:solidFill>
+                  <a:schemeClr val="dk1"/>
+                </a:solidFill>
+              </a:defRPr>
+            </a:lvl3pPr>
+            <a:lvl4pPr>
+              <a:defRPr>
+                <a:solidFill>
+                  <a:schemeClr val="dk1"/>
+                </a:solidFill>
+              </a:defRPr>
+            </a:lvl4pPr>
+            <a:lvl5pPr>
+              <a:defRPr>
+                <a:solidFill>
+                  <a:schemeClr val="dk1"/>
+                </a:solidFill>
+              </a:defRPr>
+            </a:lvl5pPr>
+            <a:lvl6pPr>
+              <a:defRPr>
+                <a:solidFill>
+                  <a:schemeClr val="dk1"/>
+                </a:solidFill>
+              </a:defRPr>
+            </a:lvl6pPr>
+            <a:lvl7pPr>
+              <a:defRPr>
+                <a:solidFill>
+                  <a:schemeClr val="dk1"/>
+                </a:solidFill>
+              </a:defRPr>
+            </a:lvl7pPr>
+            <a:lvl8pPr>
+              <a:defRPr>
+                <a:solidFill>
+                  <a:schemeClr val="dk1"/>
+                </a:solidFill>
+              </a:defRPr>
+            </a:lvl8pPr>
+            <a:lvl9pPr>
+              <a:defRPr>
+                <a:solidFill>
+                  <a:schemeClr val="dk1"/>
+                </a:solidFill>
+              </a:defRPr>
+            </a:lvl9pPr>
+          </a:lstStyle>
+          <a:p>
+            <a:pPr defTabSz="672130"/>
+            <a:r>
+              <a:rPr lang="en-US" sz="1176" b="0" dirty="0">
+                <a:solidFill>
+                  <a:prstClr val="black"/>
+                </a:solidFill>
+                <a:latin typeface="Exo 2 Medium" panose="00000600000000000000" pitchFamily="50" charset="0"/>
+              </a:rPr>
+              <a:t>Equipe</a:t>
+            </a:r>
+          </a:p>
+        </p:txBody>
+      </p:sp>
+      <p:sp>
+        <p:nvSpPr>
+          <p:cNvPr id="64" name="Retângulo 63"/>
+          <p:cNvSpPr/>
+          <p:nvPr/>
+        </p:nvSpPr>
+        <p:spPr>
+          <a:xfrm>
+            <a:off x="512766" y="868345"/>
+            <a:ext cx="6186608" cy="238150"/>
+          </a:xfrm>
+          <a:prstGeom prst="rect">
+            <a:avLst/>
+          </a:prstGeom>
+          <a:solidFill>
+            <a:schemeClr val="bg1">
+              <a:lumMod val="85000"/>
+            </a:schemeClr>
+          </a:solidFill>
+        </p:spPr>
+        <p:txBody>
+          <a:bodyPr vert="horz" lIns="134422" tIns="67211" rIns="134422" bIns="67211" rtlCol="0" anchor="ctr"/>
+          <a:lstStyle/>
+          <a:p>
+            <a:pPr defTabSz="672130"/>
+            <a:r>
+              <a:rPr lang="en-US" sz="1544" dirty="0">
+                <a:latin typeface="Exo 2 Medium" panose="00000600000000000000" pitchFamily="50" charset="0"/>
+                <a:ea typeface="Simplon Oi Headline" charset="0"/>
+                <a:cs typeface="Simplon Oi Headline" charset="0"/>
+              </a:rPr>
+              <a:t>Progressos c/ responsáveis </a:t>
+            </a:r>
+          </a:p>
+        </p:txBody>
+      </p:sp>
+      <p:sp>
+        <p:nvSpPr>
+          <p:cNvPr id="65" name="Retângulo 64"/>
+          <p:cNvSpPr/>
+          <p:nvPr/>
+        </p:nvSpPr>
+        <p:spPr>
+          <a:xfrm>
+            <a:off x="6814576" y="868344"/>
+            <a:ext cx="6244932" cy="250902"/>
+          </a:xfrm>
+          <a:prstGeom prst="rect">
+            <a:avLst/>
+          </a:prstGeom>
+          <a:solidFill>
+            <a:schemeClr val="bg1">
+              <a:lumMod val="85000"/>
+            </a:schemeClr>
+          </a:solidFill>
+        </p:spPr>
+        <p:txBody>
+          <a:bodyPr vert="horz" lIns="134422" tIns="67211" rIns="134422" bIns="67211" rtlCol="0" anchor="ctr"/>
+          <a:lstStyle/>
+          <a:p>
+            <a:pPr defTabSz="672130"/>
+            <a:r>
+              <a:rPr lang="pt-BR" sz="1544" dirty="0">
+                <a:latin typeface="Exo 2 Medium" panose="00000600000000000000" pitchFamily="50" charset="0"/>
+                <a:ea typeface="Simplon Oi Headline" charset="0"/>
+                <a:cs typeface="Simplon Oi Headline" charset="0"/>
+              </a:rPr>
+              <a:t>Pontos atenção/ Principais Riscos</a:t>
+            </a:r>
+          </a:p>
+        </p:txBody>
+      </p:sp>
+      <p:sp>
+        <p:nvSpPr>
+          <p:cNvPr id="66" name="Retângulo 65"/>
+          <p:cNvSpPr/>
+          <p:nvPr/>
+        </p:nvSpPr>
+        <p:spPr>
+          <a:xfrm>
+            <a:off x="528898" y="3479441"/>
+            <a:ext cx="12551972" cy="238150"/>
+          </a:xfrm>
+          <a:prstGeom prst="rect">
+            <a:avLst/>
+          </a:prstGeom>
+          <a:solidFill>
+            <a:schemeClr val="bg1">
+              <a:lumMod val="85000"/>
+            </a:schemeClr>
+          </a:solidFill>
+        </p:spPr>
+        <p:txBody>
+          <a:bodyPr vert="horz" lIns="134422" tIns="67211" rIns="134422" bIns="67211" rtlCol="0" anchor="ctr"/>
+          <a:lstStyle/>
+          <a:p>
+            <a:pPr defTabSz="672130"/>
+            <a:r>
+              <a:rPr lang="pt-BR" sz="1544" dirty="0">
+                <a:latin typeface="Exo 2 Medium" panose="00000600000000000000" pitchFamily="50" charset="0"/>
+                <a:ea typeface="Simplon Oi Headline" charset="0"/>
+                <a:cs typeface="Simplon Oi Headline" charset="0"/>
+              </a:rPr>
+              <a:t>Próximos Passos c/ responsáveis </a:t>
+            </a:r>
+          </a:p>
+        </p:txBody>
+      </p:sp>
+      <p:sp>
+        <p:nvSpPr>
+          <p:cNvPr id="63" name="Rectangle 37"/>
+          <p:cNvSpPr/>
+          <p:nvPr/>
+        </p:nvSpPr>
+        <p:spPr>
+          <a:xfrm>
+            <a:off x="496765" y="1106495"/>
+            <a:ext cx="6207777" cy="2235805"/>
+          </a:xfrm>
+          <a:prstGeom prst="rect">
+            <a:avLst/>
+          </a:prstGeom>
+          <a:noFill/>
+          <a:ln w="12700">
+            <a:solidFill>
+              <a:schemeClr val="bg1">
+                <a:lumMod val="50000"/>
+              </a:schemeClr>
+            </a:solidFill>
+          </a:ln>
+        </p:spPr>
+        <p:style>
+          <a:lnRef idx="2">
+            <a:schemeClr val="accent4"/>
+          </a:lnRef>
+          <a:fillRef idx="1">
+            <a:schemeClr val="lt1"/>
+          </a:fillRef>
+          <a:effectRef idx="0">
+            <a:schemeClr val="accent4"/>
+          </a:effectRef>
+          <a:fontRef idx="minor">
+            <a:schemeClr val="dk1"/>
+          </a:fontRef>
+        </p:style>
+        <p:txBody>
+          <a:bodyPr tIns="105844" rtlCol="0" anchor="t"/>
+          <a:lstStyle/>
+          <a:p>
+            <a:pPr marL="252049" indent="-252049" fontAlgn="base">
+              <a:spcBef>
+                <a:spcPct val="0"/>
+              </a:spcBef>
+              <a:buFont typeface="Wingdings" panose="05000000000000000000" pitchFamily="2" charset="2"/>
+              <a:buChar char="ü"/>
+              <a:defRPr/>
+            </a:pPr>
+            <a:r>
+              <a:rPr lang="pt-BR" sz="1323" dirty="0">
+                <a:solidFill>
+                  <a:schemeClr val="tx1"/>
+                </a:solidFill>
+                <a:latin typeface="Exo 2 Medium" panose="00000600000000000000" pitchFamily="50" charset="0"/>
+                <a:cs typeface="Simplon BP Regular"/>
+              </a:rPr>
+              <a:t>Prototipação da Tela Principal da Aplicação de Agendamentos </a:t>
+            </a:r>
+            <a:r>
+              <a:rPr lang="pt-BR" sz="1323" b="1" dirty="0">
+                <a:solidFill>
+                  <a:schemeClr val="tx1"/>
+                </a:solidFill>
+                <a:latin typeface="Exo 2 Medium" panose="00000600000000000000" pitchFamily="50" charset="0"/>
+                <a:cs typeface="Simplon BP Regular"/>
+              </a:rPr>
+              <a:t>#Vinicius</a:t>
+            </a:r>
+          </a:p>
+          <a:p>
+            <a:pPr marL="252049" indent="-252049" fontAlgn="base">
+              <a:spcBef>
+                <a:spcPct val="0"/>
+              </a:spcBef>
+              <a:buFont typeface="Wingdings" panose="05000000000000000000" pitchFamily="2" charset="2"/>
+              <a:buChar char="ü"/>
+              <a:defRPr/>
+            </a:pPr>
+            <a:r>
+              <a:rPr lang="pt-BR" sz="1323" dirty="0">
+                <a:solidFill>
+                  <a:schemeClr val="tx1"/>
+                </a:solidFill>
+                <a:latin typeface="Exo 2 Medium" panose="00000600000000000000" pitchFamily="50" charset="0"/>
+                <a:cs typeface="Simplon BP Regular"/>
+              </a:rPr>
+              <a:t>Desenho de Solução com Containers </a:t>
+            </a:r>
+            <a:r>
+              <a:rPr lang="pt-BR" sz="1323" b="1" dirty="0">
+                <a:solidFill>
+                  <a:schemeClr val="tx1"/>
+                </a:solidFill>
+                <a:latin typeface="Exo 2 Medium" panose="00000600000000000000" pitchFamily="50" charset="0"/>
+                <a:cs typeface="Simplon BP Regular"/>
+              </a:rPr>
+              <a:t>#Ferraz e Vinicius</a:t>
+            </a:r>
+          </a:p>
+          <a:p>
+            <a:pPr marL="252049" indent="-252049" fontAlgn="base">
+              <a:spcBef>
+                <a:spcPct val="0"/>
+              </a:spcBef>
+              <a:buFont typeface="Wingdings" panose="05000000000000000000" pitchFamily="2" charset="2"/>
+              <a:buChar char="ü"/>
+              <a:defRPr/>
+            </a:pPr>
+            <a:r>
+              <a:rPr lang="pt-BR" sz="1323" dirty="0">
+                <a:solidFill>
+                  <a:schemeClr val="tx1"/>
+                </a:solidFill>
+                <a:latin typeface="Exo 2 Medium" panose="00000600000000000000" pitchFamily="50" charset="0"/>
+                <a:cs typeface="Simplon BP Regular"/>
+              </a:rPr>
+              <a:t>Início ao código do Site Institucional </a:t>
+            </a:r>
+            <a:r>
+              <a:rPr lang="pt-BR" sz="1323" b="1" dirty="0">
+                <a:solidFill>
+                  <a:schemeClr val="tx1"/>
+                </a:solidFill>
+                <a:latin typeface="Exo 2 Medium" panose="00000600000000000000" pitchFamily="50" charset="0"/>
+                <a:cs typeface="Simplon BP Regular"/>
+              </a:rPr>
+              <a:t>#Ferraz e Vinicius</a:t>
+            </a:r>
+          </a:p>
+          <a:p>
+            <a:pPr marL="252049" indent="-252049" fontAlgn="base">
+              <a:spcBef>
+                <a:spcPct val="0"/>
+              </a:spcBef>
+              <a:buFont typeface="Wingdings" panose="05000000000000000000" pitchFamily="2" charset="2"/>
+              <a:buChar char="ü"/>
+              <a:defRPr/>
+            </a:pPr>
+            <a:r>
+              <a:rPr lang="pt-BR" sz="1323" dirty="0">
+                <a:solidFill>
+                  <a:schemeClr val="tx1"/>
+                </a:solidFill>
+                <a:latin typeface="Exo 2 Medium" panose="00000600000000000000" pitchFamily="50" charset="0"/>
+                <a:cs typeface="Simplon BP Regular"/>
+              </a:rPr>
+              <a:t>Construção dos CRUDs de Login e Cadastro dos Endpoints com ORM e SpringBoot </a:t>
+            </a:r>
+            <a:r>
+              <a:rPr lang="pt-BR" sz="1323" b="1" dirty="0">
+                <a:solidFill>
+                  <a:schemeClr val="tx1"/>
+                </a:solidFill>
+                <a:latin typeface="Exo 2 Medium" panose="00000600000000000000" pitchFamily="50" charset="0"/>
+                <a:cs typeface="Simplon BP Regular"/>
+              </a:rPr>
+              <a:t>#Wesley</a:t>
+            </a:r>
+          </a:p>
+          <a:p>
+            <a:pPr marL="252049" indent="-252049" fontAlgn="base">
+              <a:spcBef>
+                <a:spcPct val="0"/>
+              </a:spcBef>
+              <a:buFont typeface="Wingdings" panose="05000000000000000000" pitchFamily="2" charset="2"/>
+              <a:buChar char="ü"/>
+              <a:defRPr/>
+            </a:pPr>
+            <a:r>
+              <a:rPr lang="pt-BR" sz="1323" dirty="0">
+                <a:solidFill>
+                  <a:schemeClr val="tx1"/>
+                </a:solidFill>
+                <a:latin typeface="Exo 2 Medium" panose="00000600000000000000" pitchFamily="50" charset="0"/>
+                <a:cs typeface="Simplon BP Regular"/>
+              </a:rPr>
+              <a:t>Início ao código da Tela de Cadastro em React</a:t>
+            </a:r>
+            <a:r>
+              <a:rPr lang="pt-BR" sz="1323" b="1" dirty="0">
+                <a:solidFill>
+                  <a:schemeClr val="tx1"/>
+                </a:solidFill>
+                <a:latin typeface="Exo 2 Medium" panose="00000600000000000000" pitchFamily="50" charset="0"/>
+                <a:cs typeface="Simplon BP Regular"/>
+              </a:rPr>
+              <a:t> #Wesley</a:t>
+            </a:r>
+          </a:p>
+        </p:txBody>
+      </p:sp>
+      <p:sp>
+        <p:nvSpPr>
+          <p:cNvPr id="4" name="Retângulo 3"/>
+          <p:cNvSpPr/>
+          <p:nvPr/>
+        </p:nvSpPr>
+        <p:spPr>
+          <a:xfrm>
+            <a:off x="6844996" y="1121895"/>
+            <a:ext cx="6164295" cy="295915"/>
+          </a:xfrm>
+          <a:prstGeom prst="rect">
+            <a:avLst/>
+          </a:prstGeom>
+        </p:spPr>
+        <p:txBody>
+          <a:bodyPr wrap="square">
+            <a:spAutoFit/>
+          </a:bodyPr>
+          <a:lstStyle/>
+          <a:p>
+            <a:pPr fontAlgn="base">
+              <a:spcBef>
+                <a:spcPct val="0"/>
+              </a:spcBef>
+              <a:defRPr/>
+            </a:pPr>
+            <a:r>
+              <a:rPr lang="pt-BR" sz="1323" dirty="0">
+                <a:latin typeface="Exo 2 Medium" panose="00000600000000000000" pitchFamily="50" charset="0"/>
+                <a:cs typeface="Simplon BP Regular"/>
+              </a:rPr>
+              <a:t>Sem pontos a relatar</a:t>
+            </a:r>
+          </a:p>
+        </p:txBody>
+      </p:sp>
+      <p:sp>
+        <p:nvSpPr>
+          <p:cNvPr id="2" name="Rectangle 43">
+            <a:extLst>
+              <a:ext uri="{FF2B5EF4-FFF2-40B4-BE49-F238E27FC236}">
+                <a16:creationId xmlns:a16="http://schemas.microsoft.com/office/drawing/2014/main" id="{B15BA19F-C787-4E6A-ADAB-C0DFF09C66A8}"/>
+              </a:ext>
+            </a:extLst>
+          </p:cNvPr>
+          <p:cNvSpPr>
+            <a:spLocks/>
+          </p:cNvSpPr>
+          <p:nvPr/>
+        </p:nvSpPr>
+        <p:spPr>
+          <a:xfrm>
+            <a:off x="493440" y="3717591"/>
+            <a:ext cx="12566068" cy="3634138"/>
+          </a:xfrm>
+          <a:prstGeom prst="rect">
+            <a:avLst/>
+          </a:prstGeom>
+          <a:noFill/>
+          <a:ln w="12700">
+            <a:solidFill>
+              <a:schemeClr val="bg1">
+                <a:lumMod val="50000"/>
+              </a:schemeClr>
+            </a:solidFill>
+          </a:ln>
+        </p:spPr>
+        <p:style>
+          <a:lnRef idx="2">
+            <a:schemeClr val="accent4"/>
+          </a:lnRef>
+          <a:fillRef idx="1">
+            <a:schemeClr val="lt1"/>
+          </a:fillRef>
+          <a:effectRef idx="0">
+            <a:schemeClr val="accent4"/>
+          </a:effectRef>
+          <a:fontRef idx="minor">
+            <a:schemeClr val="dk1"/>
+          </a:fontRef>
+        </p:style>
+        <p:txBody>
+          <a:bodyPr wrap="square" tIns="105844" numCol="3" rtlCol="0" anchor="t"/>
+          <a:lstStyle/>
+          <a:p>
+            <a:pPr marL="0" lvl="1" defTabSz="672130"/>
+            <a:r>
+              <a:rPr lang="pt-BR" sz="1323" b="1" dirty="0">
+                <a:solidFill>
+                  <a:schemeClr val="tx1"/>
+                </a:solidFill>
+                <a:latin typeface="Exo 2 Medium" panose="00000600000000000000" pitchFamily="50" charset="0"/>
+                <a:cs typeface="Simplon BP Regular"/>
+              </a:rPr>
+              <a:t>Frente Plataforma</a:t>
+            </a:r>
+          </a:p>
+          <a:p>
+            <a:pPr marL="0" lvl="1" defTabSz="672130"/>
+            <a:r>
+              <a:rPr lang="pt-BR" sz="1323" dirty="0">
+                <a:solidFill>
+                  <a:schemeClr val="tx1"/>
+                </a:solidFill>
+                <a:latin typeface="Exo 2 Medium" panose="00000600000000000000" pitchFamily="50" charset="0"/>
+                <a:cs typeface="Simplon BP Regular"/>
+              </a:rPr>
+              <a:t>Sem atividades no momento</a:t>
+            </a:r>
+          </a:p>
+          <a:p>
+            <a:pPr marL="0" lvl="1" defTabSz="672130"/>
+            <a:endParaRPr lang="pt-BR" sz="1323" b="1" dirty="0">
+              <a:solidFill>
+                <a:schemeClr val="tx1"/>
+              </a:solidFill>
+              <a:latin typeface="Exo 2 Medium" panose="00000600000000000000" pitchFamily="50" charset="0"/>
+              <a:cs typeface="Simplon BP Regular"/>
+            </a:endParaRPr>
+          </a:p>
+          <a:p>
+            <a:pPr marL="0" lvl="1" defTabSz="672130"/>
+            <a:r>
+              <a:rPr lang="pt-BR" sz="1323" b="1" dirty="0">
+                <a:solidFill>
+                  <a:schemeClr val="tx1"/>
+                </a:solidFill>
+                <a:latin typeface="Exo 2 Medium" panose="00000600000000000000" pitchFamily="50" charset="0"/>
+                <a:cs typeface="Simplon BP Regular"/>
+              </a:rPr>
+              <a:t>Frente Back-End</a:t>
+            </a:r>
+          </a:p>
+          <a:p>
+            <a:pPr marL="0" lvl="1" indent="-252049">
+              <a:buFont typeface="Wingdings" panose="05000000000000000000" pitchFamily="2" charset="2"/>
+              <a:buChar char="§"/>
+            </a:pPr>
+            <a:r>
+              <a:rPr lang="pt-BR" sz="1323" dirty="0">
+                <a:solidFill>
+                  <a:schemeClr val="tx1"/>
+                </a:solidFill>
+                <a:latin typeface="Exo 2 Medium" panose="00000600000000000000" pitchFamily="50" charset="0"/>
+                <a:cs typeface="Simplon BP Regular"/>
+              </a:rPr>
+              <a:t>Continuação da implementação de Lista </a:t>
+            </a:r>
+            <a:r>
+              <a:rPr lang="pt-BR" sz="1323" b="1" dirty="0">
+                <a:solidFill>
+                  <a:schemeClr val="tx1"/>
+                </a:solidFill>
+                <a:latin typeface="Exo 2 Medium" panose="00000600000000000000" pitchFamily="50" charset="0"/>
+                <a:cs typeface="Simplon BP Regular"/>
+              </a:rPr>
+              <a:t>#Pedro </a:t>
+            </a:r>
+          </a:p>
+          <a:p>
+            <a:pPr marL="0" lvl="1" indent="-252049">
+              <a:buFont typeface="Wingdings" panose="05000000000000000000" pitchFamily="2" charset="2"/>
+              <a:buChar char="§"/>
+            </a:pPr>
+            <a:r>
+              <a:rPr lang="pt-BR" sz="1323" dirty="0">
+                <a:solidFill>
+                  <a:schemeClr val="tx1"/>
+                </a:solidFill>
+                <a:latin typeface="Exo 2 Medium" panose="00000600000000000000" pitchFamily="50" charset="0"/>
+                <a:cs typeface="Simplon BP Regular"/>
+              </a:rPr>
+              <a:t>Implementação do Padrão de Projeto Observer no projeto </a:t>
+            </a:r>
+            <a:r>
+              <a:rPr lang="pt-BR" sz="1323" b="1" dirty="0">
+                <a:solidFill>
+                  <a:schemeClr val="tx1"/>
+                </a:solidFill>
+                <a:latin typeface="Exo 2 Medium" panose="00000600000000000000" pitchFamily="50" charset="0"/>
+                <a:cs typeface="Simplon BP Regular"/>
+              </a:rPr>
+              <a:t>#Pedro e Wesley</a:t>
+            </a:r>
+          </a:p>
+          <a:p>
+            <a:pPr marL="0" lvl="1" indent="-252049">
+              <a:buFont typeface="Wingdings" panose="05000000000000000000" pitchFamily="2" charset="2"/>
+              <a:buChar char="§"/>
+            </a:pPr>
+            <a:r>
+              <a:rPr lang="pt-BR" sz="1323" dirty="0">
+                <a:solidFill>
+                  <a:schemeClr val="tx1"/>
+                </a:solidFill>
+                <a:latin typeface="Exo 2 Medium" panose="00000600000000000000" pitchFamily="50" charset="0"/>
+                <a:cs typeface="Simplon BP Regular"/>
+              </a:rPr>
+              <a:t>Atualizar o Diagrama de Classes com o novo Padrão de Projeto </a:t>
+            </a:r>
+            <a:r>
+              <a:rPr lang="pt-BR" sz="1323" b="1" dirty="0">
+                <a:solidFill>
+                  <a:schemeClr val="tx1"/>
+                </a:solidFill>
+                <a:latin typeface="Exo 2 Medium" panose="00000600000000000000" pitchFamily="50" charset="0"/>
+                <a:cs typeface="Simplon BP Regular"/>
+              </a:rPr>
+              <a:t>#Pedro e Wesley</a:t>
+            </a:r>
+            <a:br>
+              <a:rPr lang="pt-BR" sz="1323" b="1" dirty="0">
+                <a:solidFill>
+                  <a:schemeClr val="tx1"/>
+                </a:solidFill>
+                <a:latin typeface="Exo 2 Medium" panose="00000600000000000000" pitchFamily="50" charset="0"/>
+                <a:cs typeface="Simplon BP Regular"/>
+              </a:rPr>
+            </a:br>
+            <a:endParaRPr lang="pt-BR" sz="1323" b="1" dirty="0">
+              <a:solidFill>
+                <a:schemeClr val="tx1"/>
+              </a:solidFill>
+              <a:latin typeface="Exo 2 Medium" panose="00000600000000000000" pitchFamily="50" charset="0"/>
+              <a:cs typeface="Simplon BP Regular"/>
+            </a:endParaRPr>
+          </a:p>
+          <a:p>
+            <a:pPr marL="0" lvl="1" defTabSz="672130"/>
+            <a:r>
+              <a:rPr lang="pt-BR" sz="1323" b="1" dirty="0">
+                <a:solidFill>
+                  <a:schemeClr val="tx1"/>
+                </a:solidFill>
+                <a:latin typeface="Exo 2 Medium" panose="00000600000000000000" pitchFamily="50" charset="0"/>
+                <a:cs typeface="Simplon BP Regular"/>
+              </a:rPr>
+              <a:t>Frente Front-End</a:t>
+            </a:r>
+          </a:p>
+          <a:p>
+            <a:pPr marL="0" lvl="1" indent="-252049">
+              <a:buFont typeface="Wingdings" panose="05000000000000000000" pitchFamily="2" charset="2"/>
+              <a:buChar char="§"/>
+            </a:pPr>
+            <a:r>
+              <a:rPr lang="pt-BR" sz="1323" dirty="0">
+                <a:solidFill>
+                  <a:schemeClr val="tx1"/>
+                </a:solidFill>
+                <a:latin typeface="Exo 2 Medium" panose="00000600000000000000" pitchFamily="50" charset="0"/>
+                <a:cs typeface="Simplon BP Regular"/>
+              </a:rPr>
+              <a:t>Finalização do código da Tela de Cadastro com React </a:t>
+            </a:r>
+            <a:r>
+              <a:rPr lang="pt-BR" sz="1323" b="1" dirty="0">
+                <a:solidFill>
+                  <a:schemeClr val="tx1"/>
+                </a:solidFill>
+                <a:latin typeface="Exo 2 Medium" panose="00000600000000000000" pitchFamily="50" charset="0"/>
+                <a:cs typeface="Simplon BP Regular"/>
+              </a:rPr>
+              <a:t>#Wesley</a:t>
+            </a:r>
+          </a:p>
+          <a:p>
+            <a:pPr marL="0" lvl="1" indent="-252049">
+              <a:buFont typeface="Wingdings" panose="05000000000000000000" pitchFamily="2" charset="2"/>
+              <a:buChar char="§"/>
+            </a:pPr>
+            <a:r>
+              <a:rPr lang="pt-BR" sz="1323" dirty="0">
+                <a:solidFill>
+                  <a:schemeClr val="tx1"/>
+                </a:solidFill>
+                <a:latin typeface="Exo 2 Medium" panose="00000600000000000000" pitchFamily="50" charset="0"/>
+                <a:cs typeface="Simplon BP Regular"/>
+              </a:rPr>
+              <a:t>Tela de Login com React </a:t>
+            </a:r>
+            <a:r>
+              <a:rPr lang="pt-BR" sz="1323" b="1" dirty="0">
+                <a:solidFill>
+                  <a:schemeClr val="tx1"/>
+                </a:solidFill>
+                <a:latin typeface="Exo 2 Medium" panose="00000600000000000000" pitchFamily="50" charset="0"/>
+                <a:cs typeface="Simplon BP Regular"/>
+              </a:rPr>
+              <a:t>#Equipe</a:t>
+            </a:r>
+          </a:p>
+          <a:p>
+            <a:pPr marL="0" lvl="1" indent="-252049">
+              <a:buFont typeface="Wingdings" panose="05000000000000000000" pitchFamily="2" charset="2"/>
+              <a:buChar char="§"/>
+            </a:pPr>
+            <a:r>
+              <a:rPr lang="pt-BR" sz="1323" dirty="0">
+                <a:solidFill>
+                  <a:schemeClr val="tx1"/>
+                </a:solidFill>
+                <a:latin typeface="Exo 2 Medium" panose="00000600000000000000" pitchFamily="50" charset="0"/>
+                <a:cs typeface="Simplon BP Regular"/>
+              </a:rPr>
+              <a:t>Finalização do código do Site Institucional </a:t>
+            </a:r>
+            <a:r>
+              <a:rPr lang="pt-BR" sz="1323" b="1" dirty="0">
+                <a:solidFill>
+                  <a:schemeClr val="tx1"/>
+                </a:solidFill>
+                <a:latin typeface="Exo 2 Medium" panose="00000600000000000000" pitchFamily="50" charset="0"/>
+                <a:cs typeface="Simplon BP Regular"/>
+              </a:rPr>
+              <a:t>#Vinicius e Ferraz</a:t>
+            </a:r>
+          </a:p>
+          <a:p>
+            <a:pPr marL="0" lvl="1" indent="-252049">
+              <a:buFont typeface="Wingdings" panose="05000000000000000000" pitchFamily="2" charset="2"/>
+              <a:buChar char="§"/>
+            </a:pPr>
+            <a:r>
+              <a:rPr lang="pt-BR" sz="1320" dirty="0">
+                <a:solidFill>
+                  <a:schemeClr val="tx1"/>
+                </a:solidFill>
+                <a:latin typeface="Exo 2 Medium" panose="00000600000000000000" pitchFamily="50" charset="0"/>
+                <a:cs typeface="Simplon BP Regular"/>
+              </a:rPr>
+              <a:t>Prototipação da tela de Agendamentos </a:t>
+            </a:r>
+            <a:r>
+              <a:rPr lang="pt-BR" sz="1320" b="1" dirty="0">
+                <a:solidFill>
+                  <a:schemeClr val="tx1"/>
+                </a:solidFill>
+                <a:latin typeface="Exo 2 Medium" panose="00000600000000000000" pitchFamily="50" charset="0"/>
+                <a:cs typeface="Simplon BP Regular"/>
+              </a:rPr>
+              <a:t>#Vinicius</a:t>
+            </a:r>
+          </a:p>
+          <a:p>
+            <a:pPr marL="0" lvl="1"/>
+            <a:br>
+              <a:rPr lang="pt-BR" sz="1200" b="1" dirty="0">
+                <a:solidFill>
+                  <a:schemeClr val="tx1"/>
+                </a:solidFill>
+                <a:latin typeface="Exo 2 Medium" panose="00000600000000000000" pitchFamily="50" charset="0"/>
+                <a:cs typeface="Simplon BP Regular"/>
+              </a:rPr>
+            </a:br>
+            <a:endParaRPr lang="pt-BR" sz="1200" b="1" dirty="0">
+              <a:solidFill>
+                <a:schemeClr val="tx1"/>
+              </a:solidFill>
+              <a:latin typeface="Exo 2 Medium" panose="00000600000000000000" pitchFamily="50" charset="0"/>
+              <a:cs typeface="Simplon BP Regular"/>
+            </a:endParaRPr>
+          </a:p>
+          <a:p>
+            <a:pPr marL="0" lvl="1" defTabSz="672130"/>
+            <a:r>
+              <a:rPr lang="pt-BR" sz="1320" b="1" dirty="0">
+                <a:solidFill>
+                  <a:schemeClr val="tx1"/>
+                </a:solidFill>
+                <a:latin typeface="Exo 2 Medium" panose="00000600000000000000" pitchFamily="50" charset="0"/>
+                <a:cs typeface="Simplon BP Regular"/>
+              </a:rPr>
+              <a:t>Frente Negócios</a:t>
+            </a:r>
+            <a:endParaRPr lang="pt-BR" sz="1320" dirty="0">
+              <a:solidFill>
+                <a:schemeClr val="tx1"/>
+              </a:solidFill>
+              <a:latin typeface="Exo 2 Medium" panose="00000600000000000000" pitchFamily="50" charset="0"/>
+              <a:cs typeface="Simplon BP Regular"/>
+            </a:endParaRPr>
+          </a:p>
+          <a:p>
+            <a:pPr marL="0" lvl="1" indent="-252049">
+              <a:buFont typeface="Wingdings" panose="05000000000000000000" pitchFamily="2" charset="2"/>
+              <a:buChar char="§"/>
+            </a:pPr>
+            <a:r>
+              <a:rPr lang="pt-BR" sz="1300" dirty="0">
+                <a:solidFill>
+                  <a:schemeClr val="tx1"/>
+                </a:solidFill>
+                <a:latin typeface="Exo 2 Medium" panose="00000600000000000000" pitchFamily="50" charset="0"/>
+                <a:cs typeface="Simplon BP Regular"/>
+              </a:rPr>
+              <a:t>Organização do Product e Spring Backlog </a:t>
+            </a:r>
+            <a:r>
+              <a:rPr lang="pt-BR" sz="1300" b="1" dirty="0">
+                <a:solidFill>
+                  <a:schemeClr val="tx1"/>
+                </a:solidFill>
+                <a:latin typeface="Exo 2 Medium" panose="00000600000000000000" pitchFamily="50" charset="0"/>
+                <a:cs typeface="Simplon BP Regular"/>
+              </a:rPr>
+              <a:t>#Vinicius</a:t>
+            </a:r>
+          </a:p>
+          <a:p>
+            <a:pPr marL="0" lvl="1" indent="-252049">
+              <a:buFont typeface="Wingdings" panose="05000000000000000000" pitchFamily="2" charset="2"/>
+              <a:buChar char="§"/>
+            </a:pPr>
+            <a:r>
+              <a:rPr lang="pt-BR" sz="1300" dirty="0">
+                <a:solidFill>
+                  <a:schemeClr val="tx1"/>
+                </a:solidFill>
+                <a:latin typeface="Exo 2 Medium" panose="00000600000000000000" pitchFamily="50" charset="0"/>
+                <a:cs typeface="Simplon BP Regular"/>
+              </a:rPr>
+              <a:t>Timeline Report (Gant) </a:t>
+            </a:r>
+            <a:r>
+              <a:rPr lang="pt-BR" sz="1300" b="1" dirty="0">
+                <a:solidFill>
+                  <a:schemeClr val="tx1"/>
+                </a:solidFill>
+                <a:latin typeface="Exo 2 Medium" panose="00000600000000000000" pitchFamily="50" charset="0"/>
+                <a:cs typeface="Simplon BP Regular"/>
+              </a:rPr>
+              <a:t>#Equipe</a:t>
+            </a:r>
+          </a:p>
+          <a:p>
+            <a:pPr marL="0" lvl="1" indent="-252049">
+              <a:buFont typeface="Wingdings" panose="05000000000000000000" pitchFamily="2" charset="2"/>
+              <a:buChar char="§"/>
+            </a:pPr>
+            <a:r>
+              <a:rPr lang="pt-BR" sz="1300" dirty="0">
+                <a:solidFill>
+                  <a:schemeClr val="tx1"/>
+                </a:solidFill>
+                <a:latin typeface="Exo 2 Medium" panose="00000600000000000000" pitchFamily="50" charset="0"/>
+                <a:cs typeface="Simplon BP Regular"/>
+              </a:rPr>
+              <a:t>Elaborar o documento de apresentação da Sprint 2 </a:t>
+            </a:r>
+            <a:r>
+              <a:rPr lang="pt-BR" sz="1300" b="1" dirty="0">
+                <a:solidFill>
+                  <a:schemeClr val="tx1"/>
+                </a:solidFill>
+                <a:latin typeface="Exo 2 Medium" panose="00000600000000000000" pitchFamily="50" charset="0"/>
+                <a:cs typeface="Simplon BP Regular"/>
+              </a:rPr>
+              <a:t>#Pedro</a:t>
+            </a:r>
+            <a:endParaRPr lang="pt-BR" sz="1320" b="1" dirty="0">
+              <a:solidFill>
+                <a:schemeClr val="tx1"/>
+              </a:solidFill>
+              <a:latin typeface="Exo 2 Medium" panose="00000600000000000000" pitchFamily="50" charset="0"/>
+              <a:cs typeface="Simplon BP Regular"/>
+            </a:endParaRPr>
+          </a:p>
+          <a:p>
+            <a:pPr marL="0" lvl="1" indent="-252049">
+              <a:buFont typeface="Wingdings" panose="05000000000000000000" pitchFamily="2" charset="2"/>
+              <a:buChar char="§"/>
+            </a:pPr>
+            <a:endParaRPr lang="pt-BR" sz="1320" dirty="0">
+              <a:solidFill>
+                <a:schemeClr val="tx1"/>
+              </a:solidFill>
+              <a:latin typeface="Exo 2 Medium" panose="00000600000000000000" pitchFamily="50" charset="0"/>
+              <a:cs typeface="Simplon BP Regular"/>
+            </a:endParaRPr>
+          </a:p>
+          <a:p>
+            <a:pPr marL="0" lvl="1" indent="-252049">
+              <a:buFont typeface="Wingdings" panose="05000000000000000000" pitchFamily="2" charset="2"/>
+              <a:buChar char="§"/>
+            </a:pPr>
+            <a:endParaRPr lang="pt-BR" sz="1320" b="1" dirty="0">
+              <a:solidFill>
+                <a:schemeClr val="tx1"/>
+              </a:solidFill>
+              <a:latin typeface="Exo 2 Medium" panose="00000600000000000000" pitchFamily="50" charset="0"/>
+              <a:cs typeface="Simplon BP Regular"/>
+            </a:endParaRPr>
+          </a:p>
+          <a:p>
+            <a:pPr marL="0" lvl="1" indent="-252049">
+              <a:buFont typeface="Wingdings" panose="05000000000000000000" pitchFamily="2" charset="2"/>
+              <a:buChar char="§"/>
+            </a:pPr>
+            <a:endParaRPr lang="pt-BR" sz="1320" b="1" dirty="0">
+              <a:solidFill>
+                <a:schemeClr val="tx1"/>
+              </a:solidFill>
+              <a:latin typeface="Exo 2 Medium" panose="00000600000000000000" pitchFamily="50" charset="0"/>
+              <a:cs typeface="Simplon BP Regular"/>
+            </a:endParaRPr>
+          </a:p>
+          <a:p>
+            <a:pPr marL="0" lvl="1"/>
+            <a:endParaRPr lang="pt-BR" sz="1320" b="1" dirty="0">
+              <a:solidFill>
+                <a:schemeClr val="tx1"/>
+              </a:solidFill>
+              <a:latin typeface="Exo 2 Medium" panose="00000600000000000000" pitchFamily="50" charset="0"/>
+              <a:cs typeface="Simplon BP Regular"/>
+            </a:endParaRPr>
+          </a:p>
+        </p:txBody>
+      </p:sp>
+      <p:sp>
+        <p:nvSpPr>
+          <p:cNvPr id="6" name="Oval 134">
+            <a:extLst>
+              <a:ext uri="{FF2B5EF4-FFF2-40B4-BE49-F238E27FC236}">
+                <a16:creationId xmlns:a16="http://schemas.microsoft.com/office/drawing/2014/main" id="{70825C6F-9257-4CF5-8C62-1CA1EB2F8815}"/>
+              </a:ext>
+            </a:extLst>
+          </p:cNvPr>
+          <p:cNvSpPr>
+            <a:spLocks noChangeAspect="1"/>
+          </p:cNvSpPr>
+          <p:nvPr/>
+        </p:nvSpPr>
+        <p:spPr>
+          <a:xfrm>
+            <a:off x="9323960" y="297930"/>
+            <a:ext cx="211404" cy="211689"/>
+          </a:xfrm>
+          <a:prstGeom prst="ellipse">
+            <a:avLst/>
+          </a:prstGeom>
+          <a:solidFill>
+            <a:srgbClr val="1BCF13"/>
+          </a:solidFill>
+          <a:ln w="12700">
+            <a:solidFill>
+              <a:schemeClr val="accent3"/>
+            </a:solidFill>
+          </a:ln>
+        </p:spPr>
+        <p:style>
+          <a:lnRef idx="2">
+            <a:schemeClr val="accent1">
+              <a:shade val="50000"/>
+            </a:schemeClr>
+          </a:lnRef>
+          <a:fillRef idx="1">
+            <a:schemeClr val="accent1"/>
+          </a:fillRef>
+          <a:effectRef idx="0">
+            <a:schemeClr val="accent1"/>
+          </a:effectRef>
+          <a:fontRef idx="minor">
+            <a:schemeClr val="lt1"/>
+          </a:fontRef>
+        </p:style>
+        <p:txBody>
+          <a:bodyPr wrap="none" lIns="52922" tIns="52922" rIns="52922" rtlCol="0" anchor="ctr"/>
+          <a:lstStyle/>
+          <a:p>
+            <a:pPr algn="ctr" defTabSz="672130"/>
+            <a:endParaRPr lang="en-US" sz="1176" dirty="0">
+              <a:solidFill>
+                <a:prstClr val="black"/>
+              </a:solidFill>
+              <a:highlight>
+                <a:srgbClr val="FFFF00"/>
+              </a:highlight>
+              <a:latin typeface="Exo 2 Medium" panose="00000600000000000000" pitchFamily="50" charset="0"/>
+              <a:cs typeface="Simplon BP Regular"/>
+            </a:endParaRPr>
+          </a:p>
+        </p:txBody>
+      </p:sp>
+      <p:sp>
+        <p:nvSpPr>
+          <p:cNvPr id="9" name="Oval 134">
+            <a:extLst>
+              <a:ext uri="{FF2B5EF4-FFF2-40B4-BE49-F238E27FC236}">
+                <a16:creationId xmlns:a16="http://schemas.microsoft.com/office/drawing/2014/main" id="{B60B13C9-0C70-4C0F-82B2-D0CD4FDFC1F0}"/>
+              </a:ext>
+            </a:extLst>
+          </p:cNvPr>
+          <p:cNvSpPr>
+            <a:spLocks noChangeAspect="1"/>
+          </p:cNvSpPr>
+          <p:nvPr/>
+        </p:nvSpPr>
+        <p:spPr>
+          <a:xfrm>
+            <a:off x="12155999" y="297930"/>
+            <a:ext cx="211404" cy="211689"/>
+          </a:xfrm>
+          <a:prstGeom prst="ellipse">
+            <a:avLst/>
+          </a:prstGeom>
+          <a:solidFill>
+            <a:srgbClr val="1BCF13"/>
+          </a:solidFill>
+          <a:ln w="12700">
+            <a:solidFill>
+              <a:schemeClr val="accent3"/>
+            </a:solidFill>
+          </a:ln>
+        </p:spPr>
+        <p:style>
+          <a:lnRef idx="2">
+            <a:schemeClr val="accent1">
+              <a:shade val="50000"/>
+            </a:schemeClr>
+          </a:lnRef>
+          <a:fillRef idx="1">
+            <a:schemeClr val="accent1"/>
+          </a:fillRef>
+          <a:effectRef idx="0">
+            <a:schemeClr val="accent1"/>
+          </a:effectRef>
+          <a:fontRef idx="minor">
+            <a:schemeClr val="lt1"/>
+          </a:fontRef>
+        </p:style>
+        <p:txBody>
+          <a:bodyPr wrap="none" lIns="52922" tIns="52922" rIns="52922" rtlCol="0" anchor="ctr"/>
+          <a:lstStyle/>
+          <a:p>
+            <a:pPr algn="ctr" defTabSz="672130"/>
+            <a:endParaRPr lang="en-US" sz="1176" dirty="0">
+              <a:solidFill>
+                <a:prstClr val="black"/>
+              </a:solidFill>
+              <a:latin typeface="Exo 2 Medium" panose="00000600000000000000" pitchFamily="50" charset="0"/>
+              <a:cs typeface="Simplon BP Regular"/>
+            </a:endParaRPr>
+          </a:p>
+        </p:txBody>
+      </p:sp>
+      <p:sp>
+        <p:nvSpPr>
+          <p:cNvPr id="44" name="Oval 120">
+            <a:extLst>
+              <a:ext uri="{FF2B5EF4-FFF2-40B4-BE49-F238E27FC236}">
+                <a16:creationId xmlns:a16="http://schemas.microsoft.com/office/drawing/2014/main" id="{2688D066-DD5D-4246-B846-8AD1218C78EC}"/>
+              </a:ext>
+            </a:extLst>
+          </p:cNvPr>
+          <p:cNvSpPr>
+            <a:spLocks noChangeAspect="1"/>
+          </p:cNvSpPr>
+          <p:nvPr/>
+        </p:nvSpPr>
+        <p:spPr>
+          <a:xfrm>
+            <a:off x="10188056" y="297930"/>
+            <a:ext cx="211404" cy="211689"/>
+          </a:xfrm>
+          <a:prstGeom prst="ellipse">
+            <a:avLst/>
+          </a:prstGeom>
+          <a:solidFill>
+            <a:srgbClr val="1BCF13"/>
+          </a:solidFill>
+          <a:ln w="12700">
+            <a:solidFill>
+              <a:schemeClr val="accent3"/>
+            </a:solidFill>
+          </a:ln>
+        </p:spPr>
+        <p:style>
+          <a:lnRef idx="2">
+            <a:schemeClr val="accent1">
+              <a:shade val="50000"/>
+            </a:schemeClr>
+          </a:lnRef>
+          <a:fillRef idx="1">
+            <a:schemeClr val="accent1"/>
+          </a:fillRef>
+          <a:effectRef idx="0">
+            <a:schemeClr val="accent1"/>
+          </a:effectRef>
+          <a:fontRef idx="minor">
+            <a:schemeClr val="lt1"/>
+          </a:fontRef>
+        </p:style>
+        <p:txBody>
+          <a:bodyPr wrap="none" lIns="52922" tIns="52922" rIns="52922" rtlCol="0" anchor="ctr"/>
+          <a:lstStyle/>
+          <a:p>
+            <a:pPr algn="ctr" defTabSz="672130"/>
+            <a:endParaRPr lang="en-US" sz="1176" dirty="0">
+              <a:solidFill>
+                <a:prstClr val="black"/>
+              </a:solidFill>
+              <a:latin typeface="Exo 2 Medium" panose="00000600000000000000" pitchFamily="50" charset="0"/>
+              <a:cs typeface="Simplon BP Regular"/>
+            </a:endParaRPr>
+          </a:p>
+        </p:txBody>
+      </p:sp>
+      <p:sp>
+        <p:nvSpPr>
+          <p:cNvPr id="5" name="Retângulo 4">
+            <a:extLst>
+              <a:ext uri="{FF2B5EF4-FFF2-40B4-BE49-F238E27FC236}">
+                <a16:creationId xmlns:a16="http://schemas.microsoft.com/office/drawing/2014/main" id="{A1C14918-6027-46B3-96BF-C5F7FDEC3276}"/>
+              </a:ext>
+            </a:extLst>
+          </p:cNvPr>
+          <p:cNvSpPr/>
+          <p:nvPr/>
+        </p:nvSpPr>
+        <p:spPr>
+          <a:xfrm>
+            <a:off x="8017619" y="209534"/>
+            <a:ext cx="5041889" cy="618769"/>
+          </a:xfrm>
+          <a:prstGeom prst="rect">
+            <a:avLst/>
+          </a:prstGeom>
+          <a:noFill/>
+          <a:ln w="6350">
+            <a:solidFill>
+              <a:schemeClr val="bg1">
+                <a:lumMod val="75000"/>
+              </a:schemeClr>
+            </a:solidFill>
+          </a:ln>
+        </p:spPr>
+        <p:style>
+          <a:lnRef idx="2">
+            <a:schemeClr val="accent1">
+              <a:shade val="50000"/>
+            </a:schemeClr>
+          </a:lnRef>
+          <a:fillRef idx="1">
+            <a:schemeClr val="accent1"/>
+          </a:fillRef>
+          <a:effectRef idx="0">
+            <a:schemeClr val="accent1"/>
+          </a:effectRef>
+          <a:fontRef idx="minor">
+            <a:schemeClr val="lt1"/>
+          </a:fontRef>
+        </p:style>
+        <p:txBody>
+          <a:bodyPr rtlCol="0" anchor="ctr"/>
+          <a:lstStyle/>
+          <a:p>
+            <a:pPr algn="ctr"/>
+            <a:endParaRPr lang="pt-BR">
+              <a:latin typeface="Exo 2 Medium" panose="00000600000000000000" pitchFamily="50" charset="0"/>
+            </a:endParaRPr>
+          </a:p>
+        </p:txBody>
+      </p:sp>
+      <p:sp>
+        <p:nvSpPr>
+          <p:cNvPr id="8" name="TextBox 138">
+            <a:extLst>
+              <a:ext uri="{FF2B5EF4-FFF2-40B4-BE49-F238E27FC236}">
+                <a16:creationId xmlns:a16="http://schemas.microsoft.com/office/drawing/2014/main" id="{5CE7D08C-795B-4BF1-97F6-F9773F4E9F4C}"/>
+              </a:ext>
+            </a:extLst>
+          </p:cNvPr>
+          <p:cNvSpPr txBox="1"/>
+          <p:nvPr/>
+        </p:nvSpPr>
+        <p:spPr>
+          <a:xfrm>
+            <a:off x="9715810" y="51570"/>
+            <a:ext cx="1478088" cy="211688"/>
+          </a:xfrm>
+          <a:prstGeom prst="rect">
+            <a:avLst/>
+          </a:prstGeom>
+          <a:solidFill>
+            <a:schemeClr val="bg1"/>
+          </a:solidFill>
+          <a:ln w="12700">
+            <a:noFill/>
+          </a:ln>
+        </p:spPr>
+        <p:style>
+          <a:lnRef idx="2">
+            <a:schemeClr val="accent4"/>
+          </a:lnRef>
+          <a:fillRef idx="1">
+            <a:schemeClr val="lt1"/>
+          </a:fillRef>
+          <a:effectRef idx="0">
+            <a:schemeClr val="accent4"/>
+          </a:effectRef>
+          <a:fontRef idx="minor">
+            <a:schemeClr val="dk1"/>
+          </a:fontRef>
+        </p:style>
+        <p:txBody>
+          <a:bodyPr wrap="none" lIns="52922" tIns="52922" rIns="52922" bIns="0" rtlCol="0" anchor="b"/>
+          <a:lstStyle>
+            <a:defPPr>
+              <a:defRPr lang="en-US"/>
+            </a:defPPr>
+            <a:lvl1pPr algn="ctr">
+              <a:defRPr sz="1000" b="1">
+                <a:latin typeface="Simplon BP Regular"/>
+                <a:cs typeface="Simplon BP Regular"/>
+              </a:defRPr>
+            </a:lvl1pPr>
+            <a:lvl2pPr>
+              <a:defRPr>
+                <a:solidFill>
+                  <a:schemeClr val="dk1"/>
+                </a:solidFill>
+              </a:defRPr>
+            </a:lvl2pPr>
+            <a:lvl3pPr>
+              <a:defRPr>
+                <a:solidFill>
+                  <a:schemeClr val="dk1"/>
+                </a:solidFill>
+              </a:defRPr>
+            </a:lvl3pPr>
+            <a:lvl4pPr>
+              <a:defRPr>
+                <a:solidFill>
+                  <a:schemeClr val="dk1"/>
+                </a:solidFill>
+              </a:defRPr>
+            </a:lvl4pPr>
+            <a:lvl5pPr>
+              <a:defRPr>
+                <a:solidFill>
+                  <a:schemeClr val="dk1"/>
+                </a:solidFill>
+              </a:defRPr>
+            </a:lvl5pPr>
+            <a:lvl6pPr>
+              <a:defRPr>
+                <a:solidFill>
+                  <a:schemeClr val="dk1"/>
+                </a:solidFill>
+              </a:defRPr>
+            </a:lvl6pPr>
+            <a:lvl7pPr>
+              <a:defRPr>
+                <a:solidFill>
+                  <a:schemeClr val="dk1"/>
+                </a:solidFill>
+              </a:defRPr>
+            </a:lvl7pPr>
+            <a:lvl8pPr>
+              <a:defRPr>
+                <a:solidFill>
+                  <a:schemeClr val="dk1"/>
+                </a:solidFill>
+              </a:defRPr>
+            </a:lvl8pPr>
+            <a:lvl9pPr>
+              <a:defRPr>
+                <a:solidFill>
+                  <a:schemeClr val="dk1"/>
+                </a:solidFill>
+              </a:defRPr>
+            </a:lvl9pPr>
+          </a:lstStyle>
+          <a:p>
+            <a:pPr defTabSz="672130"/>
+            <a:r>
+              <a:rPr lang="en-US" sz="1176" b="0" dirty="0">
+                <a:solidFill>
+                  <a:prstClr val="black"/>
+                </a:solidFill>
+                <a:latin typeface="Exo 2 Medium" panose="00000600000000000000" pitchFamily="50" charset="0"/>
+              </a:rPr>
+              <a:t>    Farol do Projeto   </a:t>
+            </a:r>
+          </a:p>
+        </p:txBody>
+      </p:sp>
+    </p:spTree>
+    <p:extLst>
+      <p:ext uri="{BB962C8B-B14F-4D97-AF65-F5344CB8AC3E}">
+        <p14:creationId xmlns:p14="http://schemas.microsoft.com/office/powerpoint/2010/main" val="3586648129"/>
       </p:ext>
     </p:extLst>
   </p:cSld>

</xml_diff>

<commit_message>
[feature] adiciona a tela home do institucional codado
</commit_message>
<xml_diff>
--- a/documentacao/Status Report/Status_Report_-_Grupo_09.pptx
+++ b/documentacao/Status Report/Status_Report_-_Grupo_09.pptx
@@ -37443,10 +37443,12 @@
           </a:bodyPr>
           <a:lstStyle/>
           <a:p>
-            <a:pPr fontAlgn="base">
+            <a:pPr marL="285750" indent="-285750" fontAlgn="base">
               <a:spcBef>
                 <a:spcPct val="0"/>
               </a:spcBef>
+              <a:buFont typeface="Arial" panose="020B0604020202020204" pitchFamily="34" charset="0"/>
+              <a:buChar char="•"/>
               <a:defRPr/>
             </a:pPr>
             <a:r>
@@ -37454,7 +37456,7 @@
                 <a:latin typeface="Exo 2 Medium" panose="00000600000000000000" pitchFamily="50" charset="0"/>
                 <a:cs typeface="Simplon BP Regular"/>
               </a:rPr>
-              <a:t>Sem pontos a relatar</a:t>
+              <a:t>Atenção nos desenvolvimentos das telas de Login e Cadastros em React</a:t>
             </a:r>
           </a:p>
         </p:txBody>
@@ -37958,14 +37960,14 @@
         </p:nvSpPr>
         <p:spPr>
           <a:xfrm>
-            <a:off x="9323960" y="297930"/>
+            <a:off x="9323960" y="269355"/>
             <a:ext cx="211404" cy="211689"/>
           </a:xfrm>
           <a:prstGeom prst="ellipse">
             <a:avLst/>
           </a:prstGeom>
           <a:solidFill>
-            <a:srgbClr val="1BCF13"/>
+            <a:srgbClr val="FFC000"/>
           </a:solidFill>
           <a:ln w="12700">
             <a:solidFill>
@@ -39740,21 +39742,6 @@
 </file>
 
 <file path=customXml/item1.xml><?xml version="1.0" encoding="utf-8"?>
-<?mso-contentType ?>
-<FormTemplates xmlns="http://schemas.microsoft.com/sharepoint/v3/contenttype/forms">
-  <Display>DocumentLibraryForm</Display>
-  <Edit>DocumentLibraryForm</Edit>
-  <New>DocumentLibraryForm</New>
-</FormTemplates>
-</file>
-
-<file path=customXml/item2.xml><?xml version="1.0" encoding="utf-8"?>
-<p:properties xmlns:p="http://schemas.microsoft.com/office/2006/metadata/properties" xmlns:xsi="http://www.w3.org/2001/XMLSchema-instance" xmlns:pc="http://schemas.microsoft.com/office/infopath/2007/PartnerControls">
-  <documentManagement/>
-</p:properties>
-</file>
-
-<file path=customXml/item3.xml><?xml version="1.0" encoding="utf-8"?>
 <ct:contentTypeSchema xmlns:ct="http://schemas.microsoft.com/office/2006/metadata/contentType" xmlns:ma="http://schemas.microsoft.com/office/2006/metadata/properties/metaAttributes" ct:_="" ma:_="" ma:contentTypeName="Document" ma:contentTypeID="0x0101007F8ECE7139958D46ABEDA89D12B90CBF" ma:contentTypeVersion="0" ma:contentTypeDescription="Create a new document." ma:contentTypeScope="" ma:versionID="e6d660081116f63565d30cc13099d5ec">
   <xsd:schema xmlns:xsd="http://www.w3.org/2001/XMLSchema" xmlns:xs="http://www.w3.org/2001/XMLSchema" xmlns:p="http://schemas.microsoft.com/office/2006/metadata/properties" targetNamespace="http://schemas.microsoft.com/office/2006/metadata/properties" ma:root="true" ma:fieldsID="d413257cd9829394d17656a545d5fa4e">
     <xsd:element name="properties">
@@ -39868,10 +39855,33 @@
 </ct:contentTypeSchema>
 </file>
 
+<file path=customXml/item2.xml><?xml version="1.0" encoding="utf-8"?>
+<p:properties xmlns:p="http://schemas.microsoft.com/office/2006/metadata/properties" xmlns:xsi="http://www.w3.org/2001/XMLSchema-instance" xmlns:pc="http://schemas.microsoft.com/office/infopath/2007/PartnerControls">
+  <documentManagement/>
+</p:properties>
+</file>
+
+<file path=customXml/item3.xml><?xml version="1.0" encoding="utf-8"?>
+<?mso-contentType ?>
+<FormTemplates xmlns="http://schemas.microsoft.com/sharepoint/v3/contenttype/forms">
+  <Display>DocumentLibraryForm</Display>
+  <Edit>DocumentLibraryForm</Edit>
+  <New>DocumentLibraryForm</New>
+</FormTemplates>
+</file>
+
 <file path=customXml/itemProps1.xml><?xml version="1.0" encoding="utf-8"?>
-<ds:datastoreItem xmlns:ds="http://schemas.openxmlformats.org/officeDocument/2006/customXml" ds:itemID="{E2481852-F24E-4532-AF30-C154D705D105}">
+<ds:datastoreItem xmlns:ds="http://schemas.openxmlformats.org/officeDocument/2006/customXml" ds:itemID="{EFDE92A4-5D2A-451A-A373-EB014CDC0D59}">
   <ds:schemaRefs>
-    <ds:schemaRef ds:uri="http://schemas.microsoft.com/sharepoint/v3/contenttype/forms"/>
+    <ds:schemaRef ds:uri="http://schemas.microsoft.com/office/2006/metadata/contentType"/>
+    <ds:schemaRef ds:uri="http://schemas.microsoft.com/office/2006/metadata/properties/metaAttributes"/>
+    <ds:schemaRef ds:uri="http://www.w3.org/2001/XMLSchema"/>
+    <ds:schemaRef ds:uri="http://schemas.microsoft.com/office/2006/metadata/properties"/>
+    <ds:schemaRef ds:uri="http://schemas.openxmlformats.org/package/2006/metadata/core-properties"/>
+    <ds:schemaRef ds:uri="http://purl.org/dc/elements/1.1/"/>
+    <ds:schemaRef ds:uri="http://purl.org/dc/terms/"/>
+    <ds:schemaRef ds:uri="http://schemas.microsoft.com/internal/obd"/>
+    <ds:schemaRef ds:uri="http://schemas.microsoft.com/office/infopath/2007/PartnerControls"/>
   </ds:schemaRefs>
 </ds:datastoreItem>
 </file>
@@ -39894,17 +39904,9 @@
 </file>
 
 <file path=customXml/itemProps3.xml><?xml version="1.0" encoding="utf-8"?>
-<ds:datastoreItem xmlns:ds="http://schemas.openxmlformats.org/officeDocument/2006/customXml" ds:itemID="{EFDE92A4-5D2A-451A-A373-EB014CDC0D59}">
+<ds:datastoreItem xmlns:ds="http://schemas.openxmlformats.org/officeDocument/2006/customXml" ds:itemID="{E2481852-F24E-4532-AF30-C154D705D105}">
   <ds:schemaRefs>
-    <ds:schemaRef ds:uri="http://schemas.microsoft.com/office/2006/metadata/contentType"/>
-    <ds:schemaRef ds:uri="http://schemas.microsoft.com/office/2006/metadata/properties/metaAttributes"/>
-    <ds:schemaRef ds:uri="http://www.w3.org/2001/XMLSchema"/>
-    <ds:schemaRef ds:uri="http://schemas.microsoft.com/office/2006/metadata/properties"/>
-    <ds:schemaRef ds:uri="http://schemas.openxmlformats.org/package/2006/metadata/core-properties"/>
-    <ds:schemaRef ds:uri="http://purl.org/dc/elements/1.1/"/>
-    <ds:schemaRef ds:uri="http://purl.org/dc/terms/"/>
-    <ds:schemaRef ds:uri="http://schemas.microsoft.com/internal/obd"/>
-    <ds:schemaRef ds:uri="http://schemas.microsoft.com/office/infopath/2007/PartnerControls"/>
+    <ds:schemaRef ds:uri="http://schemas.microsoft.com/sharepoint/v3/contenttype/forms"/>
   </ds:schemaRefs>
 </ds:datastoreItem>
 </file>
</xml_diff>

<commit_message>
[feature] adiciona a refatoração da tela de cadastro em react e organização das pastas frontend
</commit_message>
<xml_diff>
--- a/documentacao/Status Report/Status_Report_-_Grupo_09.pptx
+++ b/documentacao/Status Report/Status_Report_-_Grupo_09.pptx
@@ -7,10 +7,10 @@
     <p:sldMasterId id="2147483665" r:id="rId6"/>
   </p:sldMasterIdLst>
   <p:notesMasterIdLst>
-    <p:notesMasterId r:id="rId16"/>
+    <p:notesMasterId r:id="rId17"/>
   </p:notesMasterIdLst>
   <p:handoutMasterIdLst>
-    <p:handoutMasterId r:id="rId17"/>
+    <p:handoutMasterId r:id="rId18"/>
   </p:handoutMasterIdLst>
   <p:sldIdLst>
     <p:sldId id="344" r:id="rId7"/>
@@ -22,6 +22,7 @@
     <p:sldId id="476" r:id="rId13"/>
     <p:sldId id="477" r:id="rId14"/>
     <p:sldId id="478" r:id="rId15"/>
+    <p:sldId id="479" r:id="rId16"/>
   </p:sldIdLst>
   <p:sldSz cx="13442950" cy="7561263"/>
   <p:notesSz cx="7104063" cy="10234613"/>
@@ -137,6 +138,7 @@
             <p14:sldId id="476"/>
             <p14:sldId id="477"/>
             <p14:sldId id="478"/>
+            <p14:sldId id="479"/>
           </p14:sldIdLst>
         </p14:section>
       </p14:sectionLst>
@@ -435,7 +437,7 @@
             <a:fld id="{C3CD65D1-5C11-455D-9F9A-0E035F00A0DA}" type="datetimeFigureOut">
               <a:rPr lang="pt-BR" smtClean="0"/>
               <a:pPr/>
-              <a:t>13/10/2021</a:t>
+              <a:t>03/11/2021</a:t>
             </a:fld>
             <a:endParaRPr lang="pt-BR"/>
           </a:p>
@@ -603,7 +605,7 @@
             <a:fld id="{A05DA3EF-18EA-43DE-B1BB-402A3C558822}" type="datetimeFigureOut">
               <a:rPr lang="pt-BR" smtClean="0"/>
               <a:pPr/>
-              <a:t>13/10/2021</a:t>
+              <a:t>03/11/2021</a:t>
             </a:fld>
             <a:endParaRPr lang="pt-BR"/>
           </a:p>
@@ -950,6 +952,99 @@
     <p:extLst>
       <p:ext uri="{BB962C8B-B14F-4D97-AF65-F5344CB8AC3E}">
         <p14:creationId xmlns:p14="http://schemas.microsoft.com/office/powerpoint/2010/main" val="3296992401"/>
+      </p:ext>
+    </p:extLst>
+  </p:cSld>
+  <p:clrMapOvr>
+    <a:masterClrMapping/>
+  </p:clrMapOvr>
+</p:notes>
+</file>
+
+<file path=ppt/notesSlides/notesSlide10.xml><?xml version="1.0" encoding="utf-8"?>
+<p:notes xmlns:a="http://schemas.openxmlformats.org/drawingml/2006/main" xmlns:r="http://schemas.openxmlformats.org/officeDocument/2006/relationships" xmlns:p="http://schemas.openxmlformats.org/presentationml/2006/main">
+  <p:cSld>
+    <p:spTree>
+      <p:nvGrpSpPr>
+        <p:cNvPr id="1" name=""/>
+        <p:cNvGrpSpPr/>
+        <p:nvPr/>
+      </p:nvGrpSpPr>
+      <p:grpSpPr>
+        <a:xfrm>
+          <a:off x="0" y="0"/>
+          <a:ext cx="0" cy="0"/>
+          <a:chOff x="0" y="0"/>
+          <a:chExt cx="0" cy="0"/>
+        </a:xfrm>
+      </p:grpSpPr>
+      <p:sp>
+        <p:nvSpPr>
+          <p:cNvPr id="2" name="Slide Image Placeholder 1"/>
+          <p:cNvSpPr>
+            <a:spLocks noGrp="1" noRot="1" noChangeAspect="1"/>
+          </p:cNvSpPr>
+          <p:nvPr>
+            <p:ph type="sldImg"/>
+          </p:nvPr>
+        </p:nvSpPr>
+        <p:spPr/>
+      </p:sp>
+      <p:sp>
+        <p:nvSpPr>
+          <p:cNvPr id="3" name="Notes Placeholder 2"/>
+          <p:cNvSpPr>
+            <a:spLocks noGrp="1"/>
+          </p:cNvSpPr>
+          <p:nvPr>
+            <p:ph type="body" idx="1"/>
+          </p:nvPr>
+        </p:nvSpPr>
+        <p:spPr/>
+        <p:txBody>
+          <a:bodyPr/>
+          <a:lstStyle/>
+          <a:p>
+            <a:endParaRPr lang="en-US"/>
+          </a:p>
+        </p:txBody>
+      </p:sp>
+      <p:sp>
+        <p:nvSpPr>
+          <p:cNvPr id="4" name="Slide Number Placeholder 3"/>
+          <p:cNvSpPr>
+            <a:spLocks noGrp="1"/>
+          </p:cNvSpPr>
+          <p:nvPr>
+            <p:ph type="sldNum" sz="quarter" idx="10"/>
+          </p:nvPr>
+        </p:nvSpPr>
+        <p:spPr/>
+        <p:txBody>
+          <a:bodyPr/>
+          <a:lstStyle/>
+          <a:p>
+            <a:fld id="{B39AF3DB-B6A1-2444-9DD8-53D016F8E638}" type="slidenum">
+              <a:rPr lang="pt-BR" smtClean="0">
+                <a:solidFill>
+                  <a:prstClr val="black"/>
+                </a:solidFill>
+              </a:rPr>
+              <a:pPr/>
+              <a:t>10</a:t>
+            </a:fld>
+            <a:endParaRPr lang="pt-BR">
+              <a:solidFill>
+                <a:prstClr val="black"/>
+              </a:solidFill>
+            </a:endParaRPr>
+          </a:p>
+        </p:txBody>
+      </p:sp>
+    </p:spTree>
+    <p:extLst>
+      <p:ext uri="{BB962C8B-B14F-4D97-AF65-F5344CB8AC3E}">
+        <p14:creationId xmlns:p14="http://schemas.microsoft.com/office/powerpoint/2010/main" val="2926183806"/>
       </p:ext>
     </p:extLst>
   </p:cSld>
@@ -21538,6 +21633,1916 @@
     <p:extLst>
       <p:ext uri="{BB962C8B-B14F-4D97-AF65-F5344CB8AC3E}">
         <p14:creationId xmlns:p14="http://schemas.microsoft.com/office/powerpoint/2010/main" val="948876888"/>
+      </p:ext>
+    </p:extLst>
+  </p:cSld>
+  <p:clrMapOvr>
+    <a:masterClrMapping/>
+  </p:clrMapOvr>
+</p:sld>
+</file>
+
+<file path=ppt/slides/slide10.xml><?xml version="1.0" encoding="utf-8"?>
+<p:sld xmlns:a="http://schemas.openxmlformats.org/drawingml/2006/main" xmlns:r="http://schemas.openxmlformats.org/officeDocument/2006/relationships" xmlns:p="http://schemas.openxmlformats.org/presentationml/2006/main">
+  <p:cSld>
+    <p:spTree>
+      <p:nvGrpSpPr>
+        <p:cNvPr id="1" name=""/>
+        <p:cNvGrpSpPr/>
+        <p:nvPr/>
+      </p:nvGrpSpPr>
+      <p:grpSpPr>
+        <a:xfrm>
+          <a:off x="0" y="0"/>
+          <a:ext cx="0" cy="0"/>
+          <a:chOff x="0" y="0"/>
+          <a:chExt cx="0" cy="0"/>
+        </a:xfrm>
+      </p:grpSpPr>
+      <p:sp>
+        <p:nvSpPr>
+          <p:cNvPr id="43" name="Rectangle 42"/>
+          <p:cNvSpPr/>
+          <p:nvPr/>
+        </p:nvSpPr>
+        <p:spPr>
+          <a:xfrm>
+            <a:off x="6804884" y="1106495"/>
+            <a:ext cx="6254624" cy="2191469"/>
+          </a:xfrm>
+          <a:prstGeom prst="rect">
+            <a:avLst/>
+          </a:prstGeom>
+          <a:noFill/>
+          <a:ln w="12700">
+            <a:solidFill>
+              <a:schemeClr val="bg1">
+                <a:lumMod val="50000"/>
+              </a:schemeClr>
+            </a:solidFill>
+          </a:ln>
+        </p:spPr>
+        <p:style>
+          <a:lnRef idx="2">
+            <a:schemeClr val="accent4"/>
+          </a:lnRef>
+          <a:fillRef idx="1">
+            <a:schemeClr val="lt1"/>
+          </a:fillRef>
+          <a:effectRef idx="0">
+            <a:schemeClr val="accent4"/>
+          </a:effectRef>
+          <a:fontRef idx="minor">
+            <a:schemeClr val="dk1"/>
+          </a:fontRef>
+        </p:style>
+        <p:txBody>
+          <a:bodyPr tIns="105844" rtlCol="0" anchor="t"/>
+          <a:lstStyle/>
+          <a:p>
+            <a:pPr defTabSz="672130">
+              <a:spcAft>
+                <a:spcPts val="882"/>
+              </a:spcAft>
+            </a:pPr>
+            <a:endParaRPr lang="pt-BR" sz="1470" dirty="0">
+              <a:solidFill>
+                <a:schemeClr val="tx1"/>
+              </a:solidFill>
+              <a:latin typeface="Exo 2 Medium" panose="00000600000000000000" pitchFamily="50" charset="0"/>
+              <a:cs typeface="Simplon BP Regular"/>
+            </a:endParaRPr>
+          </a:p>
+        </p:txBody>
+      </p:sp>
+      <p:sp>
+        <p:nvSpPr>
+          <p:cNvPr id="3" name="Title 2"/>
+          <p:cNvSpPr>
+            <a:spLocks noGrp="1"/>
+          </p:cNvSpPr>
+          <p:nvPr>
+            <p:ph type="title"/>
+          </p:nvPr>
+        </p:nvSpPr>
+        <p:spPr>
+          <a:xfrm>
+            <a:off x="469692" y="185232"/>
+            <a:ext cx="12098020" cy="800352"/>
+          </a:xfrm>
+        </p:spPr>
+        <p:txBody>
+          <a:bodyPr vert="horz" wrap="square" lIns="105844" tIns="0" rIns="105844" bIns="0" numCol="1" anchor="t" anchorCtr="0" compatLnSpc="1">
+            <a:prstTxWarp prst="textNoShape">
+              <a:avLst/>
+            </a:prstTxWarp>
+            <a:noAutofit/>
+          </a:bodyPr>
+          <a:lstStyle/>
+          <a:p>
+            <a:pPr algn="l">
+              <a:spcAft>
+                <a:spcPts val="882"/>
+              </a:spcAft>
+            </a:pPr>
+            <a:r>
+              <a:rPr lang="en-US" sz="2646" dirty="0">
+                <a:solidFill>
+                  <a:prstClr val="black"/>
+                </a:solidFill>
+                <a:latin typeface="Exo 2 Medium" panose="00000600000000000000" pitchFamily="50" charset="0"/>
+                <a:cs typeface="Simplon Oi Headline"/>
+              </a:rPr>
+              <a:t>SEMANA 12 - 03/11/2021</a:t>
+            </a:r>
+          </a:p>
+        </p:txBody>
+      </p:sp>
+      <p:sp>
+        <p:nvSpPr>
+          <p:cNvPr id="78" name="TextBox 118"/>
+          <p:cNvSpPr txBox="1"/>
+          <p:nvPr/>
+        </p:nvSpPr>
+        <p:spPr>
+          <a:xfrm>
+            <a:off x="11822773" y="576471"/>
+            <a:ext cx="899678" cy="179824"/>
+          </a:xfrm>
+          <a:prstGeom prst="rect">
+            <a:avLst/>
+          </a:prstGeom>
+          <a:noFill/>
+          <a:ln w="12700">
+            <a:noFill/>
+          </a:ln>
+        </p:spPr>
+        <p:style>
+          <a:lnRef idx="2">
+            <a:schemeClr val="accent4"/>
+          </a:lnRef>
+          <a:fillRef idx="1">
+            <a:schemeClr val="lt1"/>
+          </a:fillRef>
+          <a:effectRef idx="0">
+            <a:schemeClr val="accent4"/>
+          </a:effectRef>
+          <a:fontRef idx="minor">
+            <a:schemeClr val="dk1"/>
+          </a:fontRef>
+        </p:style>
+        <p:txBody>
+          <a:bodyPr wrap="none" lIns="52922" tIns="52922" rIns="52922" bIns="0" rtlCol="0" anchor="b"/>
+          <a:lstStyle>
+            <a:defPPr>
+              <a:defRPr lang="en-US"/>
+            </a:defPPr>
+            <a:lvl1pPr algn="ctr">
+              <a:defRPr sz="1000" b="1">
+                <a:latin typeface="Simplon BP Regular"/>
+                <a:cs typeface="Simplon BP Regular"/>
+              </a:defRPr>
+            </a:lvl1pPr>
+            <a:lvl2pPr>
+              <a:defRPr>
+                <a:solidFill>
+                  <a:schemeClr val="dk1"/>
+                </a:solidFill>
+              </a:defRPr>
+            </a:lvl2pPr>
+            <a:lvl3pPr>
+              <a:defRPr>
+                <a:solidFill>
+                  <a:schemeClr val="dk1"/>
+                </a:solidFill>
+              </a:defRPr>
+            </a:lvl3pPr>
+            <a:lvl4pPr>
+              <a:defRPr>
+                <a:solidFill>
+                  <a:schemeClr val="dk1"/>
+                </a:solidFill>
+              </a:defRPr>
+            </a:lvl4pPr>
+            <a:lvl5pPr>
+              <a:defRPr>
+                <a:solidFill>
+                  <a:schemeClr val="dk1"/>
+                </a:solidFill>
+              </a:defRPr>
+            </a:lvl5pPr>
+            <a:lvl6pPr>
+              <a:defRPr>
+                <a:solidFill>
+                  <a:schemeClr val="dk1"/>
+                </a:solidFill>
+              </a:defRPr>
+            </a:lvl6pPr>
+            <a:lvl7pPr>
+              <a:defRPr>
+                <a:solidFill>
+                  <a:schemeClr val="dk1"/>
+                </a:solidFill>
+              </a:defRPr>
+            </a:lvl7pPr>
+            <a:lvl8pPr>
+              <a:defRPr>
+                <a:solidFill>
+                  <a:schemeClr val="dk1"/>
+                </a:solidFill>
+              </a:defRPr>
+            </a:lvl8pPr>
+            <a:lvl9pPr>
+              <a:defRPr>
+                <a:solidFill>
+                  <a:schemeClr val="dk1"/>
+                </a:solidFill>
+              </a:defRPr>
+            </a:lvl9pPr>
+          </a:lstStyle>
+          <a:p>
+            <a:pPr defTabSz="672130"/>
+            <a:r>
+              <a:rPr lang="pt-BR" sz="1176" b="0" dirty="0">
+                <a:solidFill>
+                  <a:prstClr val="black"/>
+                </a:solidFill>
+                <a:latin typeface="Exo 2 Medium" panose="00000600000000000000" pitchFamily="50" charset="0"/>
+              </a:rPr>
+              <a:t>Negócios</a:t>
+            </a:r>
+          </a:p>
+        </p:txBody>
+      </p:sp>
+      <p:sp>
+        <p:nvSpPr>
+          <p:cNvPr id="109" name="Oval 120"/>
+          <p:cNvSpPr>
+            <a:spLocks noChangeAspect="1"/>
+          </p:cNvSpPr>
+          <p:nvPr/>
+        </p:nvSpPr>
+        <p:spPr>
+          <a:xfrm>
+            <a:off x="11193898" y="297930"/>
+            <a:ext cx="211404" cy="211689"/>
+          </a:xfrm>
+          <a:prstGeom prst="ellipse">
+            <a:avLst/>
+          </a:prstGeom>
+          <a:solidFill>
+            <a:srgbClr val="1BCF13"/>
+          </a:solidFill>
+          <a:ln w="12700">
+            <a:solidFill>
+              <a:schemeClr val="accent3"/>
+            </a:solidFill>
+          </a:ln>
+        </p:spPr>
+        <p:style>
+          <a:lnRef idx="2">
+            <a:schemeClr val="accent1">
+              <a:shade val="50000"/>
+            </a:schemeClr>
+          </a:lnRef>
+          <a:fillRef idx="1">
+            <a:schemeClr val="accent1"/>
+          </a:fillRef>
+          <a:effectRef idx="0">
+            <a:schemeClr val="accent1"/>
+          </a:effectRef>
+          <a:fontRef idx="minor">
+            <a:schemeClr val="lt1"/>
+          </a:fontRef>
+        </p:style>
+        <p:txBody>
+          <a:bodyPr wrap="none" lIns="52922" tIns="52922" rIns="52922" rtlCol="0" anchor="ctr"/>
+          <a:lstStyle/>
+          <a:p>
+            <a:pPr algn="ctr" defTabSz="672130"/>
+            <a:endParaRPr lang="en-US" sz="1176" dirty="0">
+              <a:solidFill>
+                <a:prstClr val="black"/>
+              </a:solidFill>
+              <a:latin typeface="Exo 2 Medium" panose="00000600000000000000" pitchFamily="50" charset="0"/>
+              <a:cs typeface="Simplon BP Regular"/>
+            </a:endParaRPr>
+          </a:p>
+        </p:txBody>
+      </p:sp>
+      <p:sp>
+        <p:nvSpPr>
+          <p:cNvPr id="80" name="TextBox 123"/>
+          <p:cNvSpPr txBox="1"/>
+          <p:nvPr/>
+        </p:nvSpPr>
+        <p:spPr>
+          <a:xfrm>
+            <a:off x="10852497" y="576471"/>
+            <a:ext cx="899678" cy="179824"/>
+          </a:xfrm>
+          <a:prstGeom prst="rect">
+            <a:avLst/>
+          </a:prstGeom>
+          <a:noFill/>
+          <a:ln w="12700">
+            <a:noFill/>
+          </a:ln>
+        </p:spPr>
+        <p:style>
+          <a:lnRef idx="2">
+            <a:schemeClr val="accent4"/>
+          </a:lnRef>
+          <a:fillRef idx="1">
+            <a:schemeClr val="lt1"/>
+          </a:fillRef>
+          <a:effectRef idx="0">
+            <a:schemeClr val="accent4"/>
+          </a:effectRef>
+          <a:fontRef idx="minor">
+            <a:schemeClr val="dk1"/>
+          </a:fontRef>
+        </p:style>
+        <p:txBody>
+          <a:bodyPr wrap="none" lIns="52922" tIns="52922" rIns="52922" bIns="0" rtlCol="0" anchor="b"/>
+          <a:lstStyle>
+            <a:defPPr>
+              <a:defRPr lang="en-US"/>
+            </a:defPPr>
+            <a:lvl1pPr algn="ctr">
+              <a:defRPr sz="1000" b="1">
+                <a:latin typeface="Simplon BP Regular"/>
+                <a:cs typeface="Simplon BP Regular"/>
+              </a:defRPr>
+            </a:lvl1pPr>
+            <a:lvl2pPr>
+              <a:defRPr>
+                <a:solidFill>
+                  <a:schemeClr val="dk1"/>
+                </a:solidFill>
+              </a:defRPr>
+            </a:lvl2pPr>
+            <a:lvl3pPr>
+              <a:defRPr>
+                <a:solidFill>
+                  <a:schemeClr val="dk1"/>
+                </a:solidFill>
+              </a:defRPr>
+            </a:lvl3pPr>
+            <a:lvl4pPr>
+              <a:defRPr>
+                <a:solidFill>
+                  <a:schemeClr val="dk1"/>
+                </a:solidFill>
+              </a:defRPr>
+            </a:lvl4pPr>
+            <a:lvl5pPr>
+              <a:defRPr>
+                <a:solidFill>
+                  <a:schemeClr val="dk1"/>
+                </a:solidFill>
+              </a:defRPr>
+            </a:lvl5pPr>
+            <a:lvl6pPr>
+              <a:defRPr>
+                <a:solidFill>
+                  <a:schemeClr val="dk1"/>
+                </a:solidFill>
+              </a:defRPr>
+            </a:lvl6pPr>
+            <a:lvl7pPr>
+              <a:defRPr>
+                <a:solidFill>
+                  <a:schemeClr val="dk1"/>
+                </a:solidFill>
+              </a:defRPr>
+            </a:lvl7pPr>
+            <a:lvl8pPr>
+              <a:defRPr>
+                <a:solidFill>
+                  <a:schemeClr val="dk1"/>
+                </a:solidFill>
+              </a:defRPr>
+            </a:lvl8pPr>
+            <a:lvl9pPr>
+              <a:defRPr>
+                <a:solidFill>
+                  <a:schemeClr val="dk1"/>
+                </a:solidFill>
+              </a:defRPr>
+            </a:lvl9pPr>
+          </a:lstStyle>
+          <a:p>
+            <a:pPr defTabSz="672130"/>
+            <a:r>
+              <a:rPr lang="pt-BR" sz="1176" b="0" dirty="0">
+                <a:solidFill>
+                  <a:prstClr val="black"/>
+                </a:solidFill>
+                <a:latin typeface="Exo 2 Medium" panose="00000600000000000000" pitchFamily="50" charset="0"/>
+              </a:rPr>
+              <a:t>Plataforma</a:t>
+            </a:r>
+          </a:p>
+        </p:txBody>
+      </p:sp>
+      <p:sp>
+        <p:nvSpPr>
+          <p:cNvPr id="82" name="TextBox 128"/>
+          <p:cNvSpPr txBox="1"/>
+          <p:nvPr/>
+        </p:nvSpPr>
+        <p:spPr>
+          <a:xfrm>
+            <a:off x="9854245" y="576471"/>
+            <a:ext cx="899678" cy="179824"/>
+          </a:xfrm>
+          <a:prstGeom prst="rect">
+            <a:avLst/>
+          </a:prstGeom>
+          <a:noFill/>
+          <a:ln w="12700">
+            <a:noFill/>
+          </a:ln>
+        </p:spPr>
+        <p:style>
+          <a:lnRef idx="2">
+            <a:schemeClr val="accent4"/>
+          </a:lnRef>
+          <a:fillRef idx="1">
+            <a:schemeClr val="lt1"/>
+          </a:fillRef>
+          <a:effectRef idx="0">
+            <a:schemeClr val="accent4"/>
+          </a:effectRef>
+          <a:fontRef idx="minor">
+            <a:schemeClr val="dk1"/>
+          </a:fontRef>
+        </p:style>
+        <p:txBody>
+          <a:bodyPr wrap="none" lIns="52922" tIns="52922" rIns="52922" bIns="0" rtlCol="0" anchor="b"/>
+          <a:lstStyle>
+            <a:defPPr>
+              <a:defRPr lang="en-US"/>
+            </a:defPPr>
+            <a:lvl1pPr algn="ctr">
+              <a:defRPr sz="1000" b="1">
+                <a:latin typeface="Simplon BP Regular"/>
+                <a:cs typeface="Simplon BP Regular"/>
+              </a:defRPr>
+            </a:lvl1pPr>
+            <a:lvl2pPr>
+              <a:defRPr>
+                <a:solidFill>
+                  <a:schemeClr val="dk1"/>
+                </a:solidFill>
+              </a:defRPr>
+            </a:lvl2pPr>
+            <a:lvl3pPr>
+              <a:defRPr>
+                <a:solidFill>
+                  <a:schemeClr val="dk1"/>
+                </a:solidFill>
+              </a:defRPr>
+            </a:lvl3pPr>
+            <a:lvl4pPr>
+              <a:defRPr>
+                <a:solidFill>
+                  <a:schemeClr val="dk1"/>
+                </a:solidFill>
+              </a:defRPr>
+            </a:lvl4pPr>
+            <a:lvl5pPr>
+              <a:defRPr>
+                <a:solidFill>
+                  <a:schemeClr val="dk1"/>
+                </a:solidFill>
+              </a:defRPr>
+            </a:lvl5pPr>
+            <a:lvl6pPr>
+              <a:defRPr>
+                <a:solidFill>
+                  <a:schemeClr val="dk1"/>
+                </a:solidFill>
+              </a:defRPr>
+            </a:lvl6pPr>
+            <a:lvl7pPr>
+              <a:defRPr>
+                <a:solidFill>
+                  <a:schemeClr val="dk1"/>
+                </a:solidFill>
+              </a:defRPr>
+            </a:lvl7pPr>
+            <a:lvl8pPr>
+              <a:defRPr>
+                <a:solidFill>
+                  <a:schemeClr val="dk1"/>
+                </a:solidFill>
+              </a:defRPr>
+            </a:lvl8pPr>
+            <a:lvl9pPr>
+              <a:defRPr>
+                <a:solidFill>
+                  <a:schemeClr val="dk1"/>
+                </a:solidFill>
+              </a:defRPr>
+            </a:lvl9pPr>
+          </a:lstStyle>
+          <a:p>
+            <a:pPr defTabSz="672130"/>
+            <a:r>
+              <a:rPr lang="pt-BR" sz="1176" b="0" dirty="0">
+                <a:solidFill>
+                  <a:prstClr val="black"/>
+                </a:solidFill>
+                <a:latin typeface="Exo 2 Medium" panose="00000600000000000000" pitchFamily="50" charset="0"/>
+              </a:rPr>
+              <a:t>Back</a:t>
+            </a:r>
+          </a:p>
+        </p:txBody>
+      </p:sp>
+      <p:sp>
+        <p:nvSpPr>
+          <p:cNvPr id="84" name="TextBox 133"/>
+          <p:cNvSpPr txBox="1"/>
+          <p:nvPr/>
+        </p:nvSpPr>
+        <p:spPr>
+          <a:xfrm>
+            <a:off x="8986650" y="576471"/>
+            <a:ext cx="899678" cy="179824"/>
+          </a:xfrm>
+          <a:prstGeom prst="rect">
+            <a:avLst/>
+          </a:prstGeom>
+          <a:noFill/>
+          <a:ln w="12700">
+            <a:noFill/>
+          </a:ln>
+        </p:spPr>
+        <p:style>
+          <a:lnRef idx="2">
+            <a:schemeClr val="accent4"/>
+          </a:lnRef>
+          <a:fillRef idx="1">
+            <a:schemeClr val="lt1"/>
+          </a:fillRef>
+          <a:effectRef idx="0">
+            <a:schemeClr val="accent4"/>
+          </a:effectRef>
+          <a:fontRef idx="minor">
+            <a:schemeClr val="dk1"/>
+          </a:fontRef>
+        </p:style>
+        <p:txBody>
+          <a:bodyPr wrap="none" lIns="52922" tIns="52922" rIns="52922" bIns="0" rtlCol="0" anchor="b"/>
+          <a:lstStyle>
+            <a:defPPr>
+              <a:defRPr lang="en-US"/>
+            </a:defPPr>
+            <a:lvl1pPr algn="ctr">
+              <a:defRPr sz="1000" b="1">
+                <a:latin typeface="Simplon BP Regular"/>
+                <a:cs typeface="Simplon BP Regular"/>
+              </a:defRPr>
+            </a:lvl1pPr>
+            <a:lvl2pPr>
+              <a:defRPr>
+                <a:solidFill>
+                  <a:schemeClr val="dk1"/>
+                </a:solidFill>
+              </a:defRPr>
+            </a:lvl2pPr>
+            <a:lvl3pPr>
+              <a:defRPr>
+                <a:solidFill>
+                  <a:schemeClr val="dk1"/>
+                </a:solidFill>
+              </a:defRPr>
+            </a:lvl3pPr>
+            <a:lvl4pPr>
+              <a:defRPr>
+                <a:solidFill>
+                  <a:schemeClr val="dk1"/>
+                </a:solidFill>
+              </a:defRPr>
+            </a:lvl4pPr>
+            <a:lvl5pPr>
+              <a:defRPr>
+                <a:solidFill>
+                  <a:schemeClr val="dk1"/>
+                </a:solidFill>
+              </a:defRPr>
+            </a:lvl5pPr>
+            <a:lvl6pPr>
+              <a:defRPr>
+                <a:solidFill>
+                  <a:schemeClr val="dk1"/>
+                </a:solidFill>
+              </a:defRPr>
+            </a:lvl6pPr>
+            <a:lvl7pPr>
+              <a:defRPr>
+                <a:solidFill>
+                  <a:schemeClr val="dk1"/>
+                </a:solidFill>
+              </a:defRPr>
+            </a:lvl7pPr>
+            <a:lvl8pPr>
+              <a:defRPr>
+                <a:solidFill>
+                  <a:schemeClr val="dk1"/>
+                </a:solidFill>
+              </a:defRPr>
+            </a:lvl8pPr>
+            <a:lvl9pPr>
+              <a:defRPr>
+                <a:solidFill>
+                  <a:schemeClr val="dk1"/>
+                </a:solidFill>
+              </a:defRPr>
+            </a:lvl9pPr>
+          </a:lstStyle>
+          <a:p>
+            <a:pPr defTabSz="672130"/>
+            <a:r>
+              <a:rPr lang="pt-BR" sz="1176" b="0" dirty="0">
+                <a:solidFill>
+                  <a:prstClr val="black"/>
+                </a:solidFill>
+                <a:latin typeface="Exo 2 Medium" panose="00000600000000000000" pitchFamily="50" charset="0"/>
+              </a:rPr>
+              <a:t>Front</a:t>
+            </a:r>
+          </a:p>
+        </p:txBody>
+      </p:sp>
+      <p:sp>
+        <p:nvSpPr>
+          <p:cNvPr id="88" name="Oval 134"/>
+          <p:cNvSpPr>
+            <a:spLocks noChangeAspect="1"/>
+          </p:cNvSpPr>
+          <p:nvPr/>
+        </p:nvSpPr>
+        <p:spPr>
+          <a:xfrm>
+            <a:off x="8443555" y="297930"/>
+            <a:ext cx="211404" cy="211689"/>
+          </a:xfrm>
+          <a:prstGeom prst="ellipse">
+            <a:avLst/>
+          </a:prstGeom>
+          <a:solidFill>
+            <a:srgbClr val="1BCF13"/>
+          </a:solidFill>
+          <a:ln w="12700">
+            <a:solidFill>
+              <a:schemeClr val="accent3"/>
+            </a:solidFill>
+          </a:ln>
+        </p:spPr>
+        <p:style>
+          <a:lnRef idx="2">
+            <a:schemeClr val="accent1">
+              <a:shade val="50000"/>
+            </a:schemeClr>
+          </a:lnRef>
+          <a:fillRef idx="1">
+            <a:schemeClr val="accent1"/>
+          </a:fillRef>
+          <a:effectRef idx="0">
+            <a:schemeClr val="accent1"/>
+          </a:effectRef>
+          <a:fontRef idx="minor">
+            <a:schemeClr val="lt1"/>
+          </a:fontRef>
+        </p:style>
+        <p:txBody>
+          <a:bodyPr wrap="none" lIns="52922" tIns="52922" rIns="52922" rtlCol="0" anchor="ctr"/>
+          <a:lstStyle/>
+          <a:p>
+            <a:pPr algn="ctr" defTabSz="672130"/>
+            <a:endParaRPr lang="en-US" sz="1176" dirty="0">
+              <a:solidFill>
+                <a:prstClr val="black"/>
+              </a:solidFill>
+              <a:latin typeface="Exo 2 Medium" panose="00000600000000000000" pitchFamily="50" charset="0"/>
+              <a:cs typeface="Simplon BP Regular"/>
+            </a:endParaRPr>
+          </a:p>
+        </p:txBody>
+      </p:sp>
+      <p:sp>
+        <p:nvSpPr>
+          <p:cNvPr id="86" name="TextBox 138"/>
+          <p:cNvSpPr txBox="1"/>
+          <p:nvPr/>
+        </p:nvSpPr>
+        <p:spPr>
+          <a:xfrm>
+            <a:off x="8126053" y="576471"/>
+            <a:ext cx="899678" cy="179824"/>
+          </a:xfrm>
+          <a:prstGeom prst="rect">
+            <a:avLst/>
+          </a:prstGeom>
+          <a:noFill/>
+          <a:ln w="12700">
+            <a:noFill/>
+          </a:ln>
+        </p:spPr>
+        <p:style>
+          <a:lnRef idx="2">
+            <a:schemeClr val="accent4"/>
+          </a:lnRef>
+          <a:fillRef idx="1">
+            <a:schemeClr val="lt1"/>
+          </a:fillRef>
+          <a:effectRef idx="0">
+            <a:schemeClr val="accent4"/>
+          </a:effectRef>
+          <a:fontRef idx="minor">
+            <a:schemeClr val="dk1"/>
+          </a:fontRef>
+        </p:style>
+        <p:txBody>
+          <a:bodyPr wrap="none" lIns="52922" tIns="52922" rIns="52922" bIns="0" rtlCol="0" anchor="b"/>
+          <a:lstStyle>
+            <a:defPPr>
+              <a:defRPr lang="en-US"/>
+            </a:defPPr>
+            <a:lvl1pPr algn="ctr">
+              <a:defRPr sz="1000" b="1">
+                <a:latin typeface="Simplon BP Regular"/>
+                <a:cs typeface="Simplon BP Regular"/>
+              </a:defRPr>
+            </a:lvl1pPr>
+            <a:lvl2pPr>
+              <a:defRPr>
+                <a:solidFill>
+                  <a:schemeClr val="dk1"/>
+                </a:solidFill>
+              </a:defRPr>
+            </a:lvl2pPr>
+            <a:lvl3pPr>
+              <a:defRPr>
+                <a:solidFill>
+                  <a:schemeClr val="dk1"/>
+                </a:solidFill>
+              </a:defRPr>
+            </a:lvl3pPr>
+            <a:lvl4pPr>
+              <a:defRPr>
+                <a:solidFill>
+                  <a:schemeClr val="dk1"/>
+                </a:solidFill>
+              </a:defRPr>
+            </a:lvl4pPr>
+            <a:lvl5pPr>
+              <a:defRPr>
+                <a:solidFill>
+                  <a:schemeClr val="dk1"/>
+                </a:solidFill>
+              </a:defRPr>
+            </a:lvl5pPr>
+            <a:lvl6pPr>
+              <a:defRPr>
+                <a:solidFill>
+                  <a:schemeClr val="dk1"/>
+                </a:solidFill>
+              </a:defRPr>
+            </a:lvl6pPr>
+            <a:lvl7pPr>
+              <a:defRPr>
+                <a:solidFill>
+                  <a:schemeClr val="dk1"/>
+                </a:solidFill>
+              </a:defRPr>
+            </a:lvl7pPr>
+            <a:lvl8pPr>
+              <a:defRPr>
+                <a:solidFill>
+                  <a:schemeClr val="dk1"/>
+                </a:solidFill>
+              </a:defRPr>
+            </a:lvl8pPr>
+            <a:lvl9pPr>
+              <a:defRPr>
+                <a:solidFill>
+                  <a:schemeClr val="dk1"/>
+                </a:solidFill>
+              </a:defRPr>
+            </a:lvl9pPr>
+          </a:lstStyle>
+          <a:p>
+            <a:pPr defTabSz="672130"/>
+            <a:r>
+              <a:rPr lang="en-US" sz="1176" b="0" dirty="0">
+                <a:solidFill>
+                  <a:prstClr val="black"/>
+                </a:solidFill>
+                <a:latin typeface="Exo 2 Medium" panose="00000600000000000000" pitchFamily="50" charset="0"/>
+              </a:rPr>
+              <a:t>Equipe</a:t>
+            </a:r>
+          </a:p>
+        </p:txBody>
+      </p:sp>
+      <p:sp>
+        <p:nvSpPr>
+          <p:cNvPr id="64" name="Retângulo 63"/>
+          <p:cNvSpPr/>
+          <p:nvPr/>
+        </p:nvSpPr>
+        <p:spPr>
+          <a:xfrm>
+            <a:off x="512766" y="868345"/>
+            <a:ext cx="6186608" cy="238150"/>
+          </a:xfrm>
+          <a:prstGeom prst="rect">
+            <a:avLst/>
+          </a:prstGeom>
+          <a:solidFill>
+            <a:schemeClr val="bg1">
+              <a:lumMod val="85000"/>
+            </a:schemeClr>
+          </a:solidFill>
+        </p:spPr>
+        <p:txBody>
+          <a:bodyPr vert="horz" lIns="134422" tIns="67211" rIns="134422" bIns="67211" rtlCol="0" anchor="ctr"/>
+          <a:lstStyle/>
+          <a:p>
+            <a:pPr defTabSz="672130"/>
+            <a:r>
+              <a:rPr lang="en-US" sz="1544" dirty="0">
+                <a:latin typeface="Exo 2 Medium" panose="00000600000000000000" pitchFamily="50" charset="0"/>
+                <a:ea typeface="Simplon Oi Headline" charset="0"/>
+                <a:cs typeface="Simplon Oi Headline" charset="0"/>
+              </a:rPr>
+              <a:t>Progressos c/ responsáveis </a:t>
+            </a:r>
+          </a:p>
+        </p:txBody>
+      </p:sp>
+      <p:sp>
+        <p:nvSpPr>
+          <p:cNvPr id="65" name="Retângulo 64"/>
+          <p:cNvSpPr/>
+          <p:nvPr/>
+        </p:nvSpPr>
+        <p:spPr>
+          <a:xfrm>
+            <a:off x="6814576" y="868344"/>
+            <a:ext cx="6244932" cy="250902"/>
+          </a:xfrm>
+          <a:prstGeom prst="rect">
+            <a:avLst/>
+          </a:prstGeom>
+          <a:solidFill>
+            <a:schemeClr val="bg1">
+              <a:lumMod val="85000"/>
+            </a:schemeClr>
+          </a:solidFill>
+        </p:spPr>
+        <p:txBody>
+          <a:bodyPr vert="horz" lIns="134422" tIns="67211" rIns="134422" bIns="67211" rtlCol="0" anchor="ctr"/>
+          <a:lstStyle/>
+          <a:p>
+            <a:pPr defTabSz="672130"/>
+            <a:r>
+              <a:rPr lang="pt-BR" sz="1544" dirty="0">
+                <a:latin typeface="Exo 2 Medium" panose="00000600000000000000" pitchFamily="50" charset="0"/>
+                <a:ea typeface="Simplon Oi Headline" charset="0"/>
+                <a:cs typeface="Simplon Oi Headline" charset="0"/>
+              </a:rPr>
+              <a:t>Pontos atenção/ Principais Riscos</a:t>
+            </a:r>
+          </a:p>
+        </p:txBody>
+      </p:sp>
+      <p:sp>
+        <p:nvSpPr>
+          <p:cNvPr id="66" name="Retângulo 65"/>
+          <p:cNvSpPr/>
+          <p:nvPr/>
+        </p:nvSpPr>
+        <p:spPr>
+          <a:xfrm>
+            <a:off x="528898" y="3479441"/>
+            <a:ext cx="12551972" cy="238150"/>
+          </a:xfrm>
+          <a:prstGeom prst="rect">
+            <a:avLst/>
+          </a:prstGeom>
+          <a:solidFill>
+            <a:schemeClr val="bg1">
+              <a:lumMod val="85000"/>
+            </a:schemeClr>
+          </a:solidFill>
+        </p:spPr>
+        <p:txBody>
+          <a:bodyPr vert="horz" lIns="134422" tIns="67211" rIns="134422" bIns="67211" rtlCol="0" anchor="ctr"/>
+          <a:lstStyle/>
+          <a:p>
+            <a:pPr defTabSz="672130"/>
+            <a:r>
+              <a:rPr lang="pt-BR" sz="1544" dirty="0">
+                <a:latin typeface="Exo 2 Medium" panose="00000600000000000000" pitchFamily="50" charset="0"/>
+                <a:ea typeface="Simplon Oi Headline" charset="0"/>
+                <a:cs typeface="Simplon Oi Headline" charset="0"/>
+              </a:rPr>
+              <a:t>Próximos Passos c/ responsáveis </a:t>
+            </a:r>
+          </a:p>
+        </p:txBody>
+      </p:sp>
+      <p:sp>
+        <p:nvSpPr>
+          <p:cNvPr id="63" name="Rectangle 37"/>
+          <p:cNvSpPr/>
+          <p:nvPr/>
+        </p:nvSpPr>
+        <p:spPr>
+          <a:xfrm>
+            <a:off x="496765" y="1106495"/>
+            <a:ext cx="6207777" cy="2235805"/>
+          </a:xfrm>
+          <a:prstGeom prst="rect">
+            <a:avLst/>
+          </a:prstGeom>
+          <a:noFill/>
+          <a:ln w="12700">
+            <a:solidFill>
+              <a:schemeClr val="bg1">
+                <a:lumMod val="50000"/>
+              </a:schemeClr>
+            </a:solidFill>
+          </a:ln>
+        </p:spPr>
+        <p:style>
+          <a:lnRef idx="2">
+            <a:schemeClr val="accent4"/>
+          </a:lnRef>
+          <a:fillRef idx="1">
+            <a:schemeClr val="lt1"/>
+          </a:fillRef>
+          <a:effectRef idx="0">
+            <a:schemeClr val="accent4"/>
+          </a:effectRef>
+          <a:fontRef idx="minor">
+            <a:schemeClr val="dk1"/>
+          </a:fontRef>
+        </p:style>
+        <p:txBody>
+          <a:bodyPr tIns="105844" rtlCol="0" anchor="t"/>
+          <a:lstStyle/>
+          <a:p>
+            <a:pPr marL="252049" indent="-252049" fontAlgn="base">
+              <a:spcBef>
+                <a:spcPct val="0"/>
+              </a:spcBef>
+              <a:buFont typeface="Wingdings" panose="05000000000000000000" pitchFamily="2" charset="2"/>
+              <a:buChar char="ü"/>
+              <a:defRPr/>
+            </a:pPr>
+            <a:r>
+              <a:rPr lang="pt-BR" sz="1323" dirty="0">
+                <a:solidFill>
+                  <a:schemeClr val="tx1"/>
+                </a:solidFill>
+                <a:latin typeface="Exo 2 Medium" panose="00000600000000000000" pitchFamily="50" charset="0"/>
+                <a:cs typeface="Simplon BP Regular"/>
+              </a:rPr>
+              <a:t>Retrospectiva da Sprint 2 </a:t>
+            </a:r>
+            <a:r>
+              <a:rPr lang="pt-BR" sz="1323" b="1" dirty="0">
+                <a:solidFill>
+                  <a:schemeClr val="tx1"/>
+                </a:solidFill>
+                <a:latin typeface="Exo 2 Medium" panose="00000600000000000000" pitchFamily="50" charset="0"/>
+                <a:cs typeface="Simplon BP Regular"/>
+              </a:rPr>
+              <a:t>#Equipe</a:t>
+            </a:r>
+          </a:p>
+          <a:p>
+            <a:pPr marL="252049" indent="-252049" fontAlgn="base">
+              <a:spcBef>
+                <a:spcPct val="0"/>
+              </a:spcBef>
+              <a:buFont typeface="Wingdings" panose="05000000000000000000" pitchFamily="2" charset="2"/>
+              <a:buChar char="ü"/>
+              <a:defRPr/>
+            </a:pPr>
+            <a:r>
+              <a:rPr lang="pt-BR" sz="1323" dirty="0">
+                <a:solidFill>
+                  <a:schemeClr val="tx1"/>
+                </a:solidFill>
+                <a:latin typeface="Exo 2 Medium" panose="00000600000000000000" pitchFamily="50" charset="0"/>
+                <a:cs typeface="Simplon BP Regular"/>
+              </a:rPr>
+              <a:t>Revisão da Sprint 2 </a:t>
+            </a:r>
+            <a:r>
+              <a:rPr lang="pt-BR" sz="1323" b="1" dirty="0">
+                <a:solidFill>
+                  <a:schemeClr val="tx1"/>
+                </a:solidFill>
+                <a:latin typeface="Exo 2 Medium" panose="00000600000000000000" pitchFamily="50" charset="0"/>
+                <a:cs typeface="Simplon BP Regular"/>
+              </a:rPr>
+              <a:t>#Equipe</a:t>
+            </a:r>
+          </a:p>
+          <a:p>
+            <a:pPr marL="252049" indent="-252049" fontAlgn="base">
+              <a:spcBef>
+                <a:spcPct val="0"/>
+              </a:spcBef>
+              <a:buFont typeface="Wingdings" panose="05000000000000000000" pitchFamily="2" charset="2"/>
+              <a:buChar char="ü"/>
+              <a:defRPr/>
+            </a:pPr>
+            <a:r>
+              <a:rPr lang="pt-BR" sz="1323" dirty="0">
+                <a:solidFill>
+                  <a:schemeClr val="tx1"/>
+                </a:solidFill>
+                <a:latin typeface="Exo 2 Medium" panose="00000600000000000000" pitchFamily="50" charset="0"/>
+                <a:cs typeface="Simplon BP Regular"/>
+              </a:rPr>
+              <a:t>Planejamento da Sprint 3 </a:t>
+            </a:r>
+            <a:r>
+              <a:rPr lang="pt-BR" sz="1323" b="1" dirty="0">
+                <a:solidFill>
+                  <a:schemeClr val="tx1"/>
+                </a:solidFill>
+                <a:latin typeface="Exo 2 Medium" panose="00000600000000000000" pitchFamily="50" charset="0"/>
+                <a:cs typeface="Simplon BP Regular"/>
+              </a:rPr>
+              <a:t>#Equipe</a:t>
+            </a:r>
+          </a:p>
+          <a:p>
+            <a:pPr marL="252049" indent="-252049" fontAlgn="base">
+              <a:spcBef>
+                <a:spcPct val="0"/>
+              </a:spcBef>
+              <a:buFont typeface="Wingdings" panose="05000000000000000000" pitchFamily="2" charset="2"/>
+              <a:buChar char="ü"/>
+              <a:defRPr/>
+            </a:pPr>
+            <a:r>
+              <a:rPr lang="pt-BR" sz="1323" dirty="0">
+                <a:solidFill>
+                  <a:schemeClr val="tx1"/>
+                </a:solidFill>
+                <a:latin typeface="Exo 2 Medium" panose="00000600000000000000" pitchFamily="50" charset="0"/>
+                <a:cs typeface="Simplon BP Regular"/>
+              </a:rPr>
+              <a:t>Organização do Backlog no Jira </a:t>
+            </a:r>
+            <a:r>
+              <a:rPr lang="pt-BR" sz="1323" b="1" dirty="0">
+                <a:solidFill>
+                  <a:schemeClr val="tx1"/>
+                </a:solidFill>
+                <a:latin typeface="Exo 2 Medium" panose="00000600000000000000" pitchFamily="50" charset="0"/>
+                <a:cs typeface="Simplon BP Regular"/>
+              </a:rPr>
+              <a:t>#Vinicius</a:t>
+            </a:r>
+          </a:p>
+          <a:p>
+            <a:pPr marL="252049" indent="-252049" fontAlgn="base">
+              <a:spcBef>
+                <a:spcPct val="0"/>
+              </a:spcBef>
+              <a:buFont typeface="Wingdings" panose="05000000000000000000" pitchFamily="2" charset="2"/>
+              <a:buChar char="ü"/>
+              <a:defRPr/>
+            </a:pPr>
+            <a:r>
+              <a:rPr lang="pt-BR" sz="1323" dirty="0">
+                <a:solidFill>
+                  <a:schemeClr val="tx1"/>
+                </a:solidFill>
+                <a:latin typeface="Exo 2 Medium" panose="00000600000000000000" pitchFamily="50" charset="0"/>
+                <a:cs typeface="Simplon BP Regular"/>
+              </a:rPr>
+              <a:t>Planilha de Solução de Software</a:t>
+            </a:r>
+            <a:r>
+              <a:rPr lang="pt-BR" sz="1323" b="1" dirty="0">
+                <a:solidFill>
+                  <a:schemeClr val="tx1"/>
+                </a:solidFill>
+                <a:latin typeface="Exo 2 Medium" panose="00000600000000000000" pitchFamily="50" charset="0"/>
+                <a:cs typeface="Simplon BP Regular"/>
+              </a:rPr>
+              <a:t> #Pedro e Ferraz</a:t>
+            </a:r>
+          </a:p>
+          <a:p>
+            <a:pPr marL="252049" indent="-252049" fontAlgn="base">
+              <a:spcBef>
+                <a:spcPct val="0"/>
+              </a:spcBef>
+              <a:buFont typeface="Wingdings" panose="05000000000000000000" pitchFamily="2" charset="2"/>
+              <a:buChar char="ü"/>
+              <a:defRPr/>
+            </a:pPr>
+            <a:r>
+              <a:rPr lang="pt-BR" sz="1323" dirty="0">
+                <a:solidFill>
+                  <a:schemeClr val="tx1"/>
+                </a:solidFill>
+                <a:latin typeface="Exo 2 Medium" panose="00000600000000000000" pitchFamily="50" charset="0"/>
+                <a:cs typeface="Simplon BP Regular"/>
+              </a:rPr>
+              <a:t>Inicio do desenvolvimento do Documento de Layout da Solução </a:t>
+            </a:r>
+            <a:r>
+              <a:rPr lang="pt-BR" sz="1323" b="1" dirty="0">
+                <a:solidFill>
+                  <a:schemeClr val="tx1"/>
+                </a:solidFill>
+                <a:latin typeface="Exo 2 Medium" panose="00000600000000000000" pitchFamily="50" charset="0"/>
+                <a:cs typeface="Simplon BP Regular"/>
+              </a:rPr>
+              <a:t>#Pedro </a:t>
+            </a:r>
+          </a:p>
+        </p:txBody>
+      </p:sp>
+      <p:sp>
+        <p:nvSpPr>
+          <p:cNvPr id="2" name="Rectangle 43">
+            <a:extLst>
+              <a:ext uri="{FF2B5EF4-FFF2-40B4-BE49-F238E27FC236}">
+                <a16:creationId xmlns:a16="http://schemas.microsoft.com/office/drawing/2014/main" id="{B15BA19F-C787-4E6A-ADAB-C0DFF09C66A8}"/>
+              </a:ext>
+            </a:extLst>
+          </p:cNvPr>
+          <p:cNvSpPr>
+            <a:spLocks/>
+          </p:cNvSpPr>
+          <p:nvPr/>
+        </p:nvSpPr>
+        <p:spPr>
+          <a:xfrm>
+            <a:off x="493440" y="3717591"/>
+            <a:ext cx="12587430" cy="3634138"/>
+          </a:xfrm>
+          <a:prstGeom prst="rect">
+            <a:avLst/>
+          </a:prstGeom>
+          <a:noFill/>
+          <a:ln w="12700">
+            <a:solidFill>
+              <a:schemeClr val="bg1">
+                <a:lumMod val="50000"/>
+              </a:schemeClr>
+            </a:solidFill>
+          </a:ln>
+        </p:spPr>
+        <p:style>
+          <a:lnRef idx="2">
+            <a:schemeClr val="accent4"/>
+          </a:lnRef>
+          <a:fillRef idx="1">
+            <a:schemeClr val="lt1"/>
+          </a:fillRef>
+          <a:effectRef idx="0">
+            <a:schemeClr val="accent4"/>
+          </a:effectRef>
+          <a:fontRef idx="minor">
+            <a:schemeClr val="dk1"/>
+          </a:fontRef>
+        </p:style>
+        <p:txBody>
+          <a:bodyPr wrap="square" tIns="105844" numCol="3" rtlCol="0" anchor="t"/>
+          <a:lstStyle/>
+          <a:p>
+            <a:pPr marL="0" lvl="1" defTabSz="672130"/>
+            <a:r>
+              <a:rPr lang="pt-BR" sz="1323" b="1" dirty="0">
+                <a:solidFill>
+                  <a:schemeClr val="tx1"/>
+                </a:solidFill>
+                <a:latin typeface="Exo 2 Medium" panose="00000600000000000000" pitchFamily="50" charset="0"/>
+                <a:cs typeface="Simplon BP Regular"/>
+              </a:rPr>
+              <a:t>Frente Plataforma</a:t>
+            </a:r>
+          </a:p>
+          <a:p>
+            <a:pPr marL="0" lvl="1" defTabSz="672130"/>
+            <a:r>
+              <a:rPr lang="pt-BR" sz="1323" dirty="0">
+                <a:solidFill>
+                  <a:schemeClr val="tx1"/>
+                </a:solidFill>
+                <a:latin typeface="Exo 2 Medium" panose="00000600000000000000" pitchFamily="50" charset="0"/>
+                <a:cs typeface="Simplon BP Regular"/>
+              </a:rPr>
+              <a:t>Sem atividades no momento</a:t>
+            </a:r>
+          </a:p>
+          <a:p>
+            <a:pPr marL="0" lvl="1" defTabSz="672130"/>
+            <a:endParaRPr lang="pt-BR" sz="1323" b="1" dirty="0">
+              <a:solidFill>
+                <a:schemeClr val="tx1"/>
+              </a:solidFill>
+              <a:latin typeface="Exo 2 Medium" panose="00000600000000000000" pitchFamily="50" charset="0"/>
+              <a:cs typeface="Simplon BP Regular"/>
+            </a:endParaRPr>
+          </a:p>
+          <a:p>
+            <a:pPr marL="0" lvl="1" defTabSz="672130"/>
+            <a:r>
+              <a:rPr lang="pt-BR" sz="1323" b="1" dirty="0">
+                <a:solidFill>
+                  <a:schemeClr val="tx1"/>
+                </a:solidFill>
+                <a:latin typeface="Exo 2 Medium" panose="00000600000000000000" pitchFamily="50" charset="0"/>
+                <a:cs typeface="Simplon BP Regular"/>
+              </a:rPr>
+              <a:t>Frente Back-End</a:t>
+            </a:r>
+          </a:p>
+          <a:p>
+            <a:pPr marL="0" lvl="1" indent="-252049">
+              <a:buFont typeface="Wingdings" panose="05000000000000000000" pitchFamily="2" charset="2"/>
+              <a:buChar char="§"/>
+            </a:pPr>
+            <a:r>
+              <a:rPr lang="pt-BR" sz="1323" dirty="0">
+                <a:solidFill>
+                  <a:schemeClr val="tx1"/>
+                </a:solidFill>
+                <a:latin typeface="Exo 2 Medium" panose="00000600000000000000" pitchFamily="50" charset="0"/>
+                <a:cs typeface="Simplon BP Regular"/>
+              </a:rPr>
+              <a:t>Implementar a conexão do Back-end com nosso Banco de Dados na Azure #Equipe</a:t>
+            </a:r>
+            <a:br>
+              <a:rPr lang="pt-BR" sz="1323" b="1" dirty="0">
+                <a:solidFill>
+                  <a:schemeClr val="tx1"/>
+                </a:solidFill>
+                <a:latin typeface="Exo 2 Medium" panose="00000600000000000000" pitchFamily="50" charset="0"/>
+                <a:cs typeface="Simplon BP Regular"/>
+              </a:rPr>
+            </a:br>
+            <a:endParaRPr lang="pt-BR" sz="1323" b="1" dirty="0">
+              <a:solidFill>
+                <a:schemeClr val="tx1"/>
+              </a:solidFill>
+              <a:latin typeface="Exo 2 Medium" panose="00000600000000000000" pitchFamily="50" charset="0"/>
+              <a:cs typeface="Simplon BP Regular"/>
+            </a:endParaRPr>
+          </a:p>
+          <a:p>
+            <a:pPr marL="0" lvl="1" defTabSz="672130"/>
+            <a:r>
+              <a:rPr lang="pt-BR" sz="1323" b="1" dirty="0">
+                <a:solidFill>
+                  <a:schemeClr val="tx1"/>
+                </a:solidFill>
+                <a:latin typeface="Exo 2 Medium" panose="00000600000000000000" pitchFamily="50" charset="0"/>
+                <a:cs typeface="Simplon BP Regular"/>
+              </a:rPr>
+              <a:t>Frente Front-End</a:t>
+            </a:r>
+          </a:p>
+          <a:p>
+            <a:pPr marL="0" lvl="1" indent="-252049">
+              <a:buFont typeface="Wingdings" panose="05000000000000000000" pitchFamily="2" charset="2"/>
+              <a:buChar char="§"/>
+            </a:pPr>
+            <a:r>
+              <a:rPr lang="pt-BR" sz="1323" dirty="0">
+                <a:solidFill>
+                  <a:schemeClr val="tx1"/>
+                </a:solidFill>
+                <a:latin typeface="Exo 2 Medium" panose="00000600000000000000" pitchFamily="50" charset="0"/>
+                <a:cs typeface="Simplon BP Regular"/>
+              </a:rPr>
+              <a:t>Refatorar as telas Sobre e Equipe do Institucional</a:t>
+            </a:r>
+            <a:r>
+              <a:rPr lang="pt-BR" sz="1323" b="1" dirty="0">
+                <a:solidFill>
+                  <a:schemeClr val="tx1"/>
+                </a:solidFill>
+                <a:latin typeface="Exo 2 Medium" panose="00000600000000000000" pitchFamily="50" charset="0"/>
+                <a:cs typeface="Simplon BP Regular"/>
+              </a:rPr>
+              <a:t> #Ferraz e Vinicius</a:t>
+            </a:r>
+          </a:p>
+          <a:p>
+            <a:pPr marL="0" lvl="1" indent="-252049">
+              <a:buFont typeface="Wingdings" panose="05000000000000000000" pitchFamily="2" charset="2"/>
+              <a:buChar char="§"/>
+            </a:pPr>
+            <a:r>
+              <a:rPr lang="pt-BR" sz="1200" dirty="0">
+                <a:solidFill>
+                  <a:schemeClr val="tx1"/>
+                </a:solidFill>
+                <a:latin typeface="Exo 2 Medium" panose="00000600000000000000" pitchFamily="50" charset="0"/>
+                <a:cs typeface="Simplon BP Regular"/>
+              </a:rPr>
+              <a:t>Refatorar as telas de Cadastro e Login em React</a:t>
+            </a:r>
+            <a:r>
+              <a:rPr lang="pt-BR" sz="1200" b="1" dirty="0">
+                <a:solidFill>
+                  <a:schemeClr val="tx1"/>
+                </a:solidFill>
+                <a:latin typeface="Exo 2 Medium" panose="00000600000000000000" pitchFamily="50" charset="0"/>
+                <a:cs typeface="Simplon BP Regular"/>
+              </a:rPr>
+              <a:t> </a:t>
+            </a:r>
+            <a:br>
+              <a:rPr lang="pt-BR" sz="1200" b="1" dirty="0">
+                <a:solidFill>
+                  <a:schemeClr val="tx1"/>
+                </a:solidFill>
+                <a:latin typeface="Exo 2 Medium" panose="00000600000000000000" pitchFamily="50" charset="0"/>
+                <a:cs typeface="Simplon BP Regular"/>
+              </a:rPr>
+            </a:br>
+            <a:r>
+              <a:rPr lang="pt-BR" sz="1200" b="1" dirty="0">
+                <a:solidFill>
+                  <a:schemeClr val="tx1"/>
+                </a:solidFill>
+                <a:latin typeface="Exo 2 Medium" panose="00000600000000000000" pitchFamily="50" charset="0"/>
+                <a:cs typeface="Simplon BP Regular"/>
+              </a:rPr>
+              <a:t>#Wesley e Vinicius</a:t>
+            </a:r>
+          </a:p>
+          <a:p>
+            <a:pPr marL="0" lvl="1" indent="-252049">
+              <a:buFont typeface="Wingdings" panose="05000000000000000000" pitchFamily="2" charset="2"/>
+              <a:buChar char="§"/>
+            </a:pPr>
+            <a:r>
+              <a:rPr lang="pt-BR" sz="1200" dirty="0">
+                <a:solidFill>
+                  <a:schemeClr val="tx1"/>
+                </a:solidFill>
+                <a:latin typeface="Exo 2 Medium" panose="00000600000000000000" pitchFamily="50" charset="0"/>
+                <a:cs typeface="Simplon BP Regular"/>
+              </a:rPr>
+              <a:t>Finalizar o Protótipo das Telas Finais</a:t>
+            </a:r>
+            <a:r>
+              <a:rPr lang="pt-BR" sz="1200" b="1" dirty="0">
+                <a:solidFill>
+                  <a:schemeClr val="tx1"/>
+                </a:solidFill>
+                <a:latin typeface="Exo 2 Medium" panose="00000600000000000000" pitchFamily="50" charset="0"/>
+                <a:cs typeface="Simplon BP Regular"/>
+              </a:rPr>
+              <a:t> #Vinicius</a:t>
+            </a:r>
+            <a:br>
+              <a:rPr lang="pt-BR" sz="1200" b="1" dirty="0">
+                <a:solidFill>
+                  <a:schemeClr val="tx1"/>
+                </a:solidFill>
+                <a:latin typeface="Exo 2 Medium" panose="00000600000000000000" pitchFamily="50" charset="0"/>
+                <a:cs typeface="Simplon BP Regular"/>
+              </a:rPr>
+            </a:br>
+            <a:endParaRPr lang="pt-BR" sz="1200" b="1" dirty="0">
+              <a:solidFill>
+                <a:schemeClr val="tx1"/>
+              </a:solidFill>
+              <a:latin typeface="Exo 2 Medium" panose="00000600000000000000" pitchFamily="50" charset="0"/>
+              <a:cs typeface="Simplon BP Regular"/>
+            </a:endParaRPr>
+          </a:p>
+          <a:p>
+            <a:pPr marL="0" lvl="1" defTabSz="672130"/>
+            <a:r>
+              <a:rPr lang="pt-BR" sz="1320" b="1" dirty="0">
+                <a:solidFill>
+                  <a:schemeClr val="tx1"/>
+                </a:solidFill>
+                <a:latin typeface="Exo 2 Medium" panose="00000600000000000000" pitchFamily="50" charset="0"/>
+                <a:cs typeface="Simplon BP Regular"/>
+              </a:rPr>
+              <a:t>Frente Negócios</a:t>
+            </a:r>
+            <a:endParaRPr lang="pt-BR" sz="1320" dirty="0">
+              <a:solidFill>
+                <a:schemeClr val="tx1"/>
+              </a:solidFill>
+              <a:latin typeface="Exo 2 Medium" panose="00000600000000000000" pitchFamily="50" charset="0"/>
+              <a:cs typeface="Simplon BP Regular"/>
+            </a:endParaRPr>
+          </a:p>
+          <a:p>
+            <a:pPr marL="0" lvl="1" indent="-252049">
+              <a:buFont typeface="Wingdings" panose="05000000000000000000" pitchFamily="2" charset="2"/>
+              <a:buChar char="§"/>
+            </a:pPr>
+            <a:r>
+              <a:rPr lang="pt-BR" sz="1300" dirty="0">
+                <a:solidFill>
+                  <a:schemeClr val="tx1"/>
+                </a:solidFill>
+                <a:latin typeface="Exo 2 Medium" panose="00000600000000000000" pitchFamily="50" charset="0"/>
+                <a:cs typeface="Simplon BP Regular"/>
+              </a:rPr>
+              <a:t>Discutir sobre a lógica de Emissão de Boletos</a:t>
+            </a:r>
+            <a:r>
+              <a:rPr lang="pt-BR" sz="1300" b="1" dirty="0">
+                <a:solidFill>
+                  <a:schemeClr val="tx1"/>
+                </a:solidFill>
+                <a:latin typeface="Exo 2 Medium" panose="00000600000000000000" pitchFamily="50" charset="0"/>
+                <a:cs typeface="Simplon BP Regular"/>
+              </a:rPr>
+              <a:t> #Equipe</a:t>
+            </a:r>
+          </a:p>
+          <a:p>
+            <a:pPr marL="0" lvl="1" indent="-252049">
+              <a:buFont typeface="Wingdings" panose="05000000000000000000" pitchFamily="2" charset="2"/>
+              <a:buChar char="§"/>
+            </a:pPr>
+            <a:r>
+              <a:rPr lang="pt-BR" sz="1300" dirty="0">
+                <a:solidFill>
+                  <a:schemeClr val="tx1"/>
+                </a:solidFill>
+                <a:latin typeface="Exo 2 Medium" panose="00000600000000000000" pitchFamily="50" charset="0"/>
+                <a:cs typeface="Simplon BP Regular"/>
+              </a:rPr>
+              <a:t>Discutir sobre a lógica de Agendamentos </a:t>
+            </a:r>
+            <a:r>
+              <a:rPr lang="pt-BR" sz="1300" b="1" dirty="0">
+                <a:solidFill>
+                  <a:schemeClr val="tx1"/>
+                </a:solidFill>
+                <a:latin typeface="Exo 2 Medium" panose="00000600000000000000" pitchFamily="50" charset="0"/>
+                <a:cs typeface="Simplon BP Regular"/>
+              </a:rPr>
+              <a:t>#Equipe</a:t>
+            </a:r>
+            <a:endParaRPr lang="pt-BR" sz="1320" b="1" dirty="0">
+              <a:solidFill>
+                <a:schemeClr val="tx1"/>
+              </a:solidFill>
+              <a:latin typeface="Exo 2 Medium" panose="00000600000000000000" pitchFamily="50" charset="0"/>
+              <a:cs typeface="Simplon BP Regular"/>
+            </a:endParaRPr>
+          </a:p>
+          <a:p>
+            <a:pPr marL="0" lvl="1" indent="-252049">
+              <a:buFont typeface="Wingdings" panose="05000000000000000000" pitchFamily="2" charset="2"/>
+              <a:buChar char="§"/>
+            </a:pPr>
+            <a:endParaRPr lang="pt-BR" sz="1320" dirty="0">
+              <a:solidFill>
+                <a:schemeClr val="tx1"/>
+              </a:solidFill>
+              <a:latin typeface="Exo 2 Medium" panose="00000600000000000000" pitchFamily="50" charset="0"/>
+              <a:cs typeface="Simplon BP Regular"/>
+            </a:endParaRPr>
+          </a:p>
+          <a:p>
+            <a:pPr marL="0" lvl="1" indent="-252049">
+              <a:buFont typeface="Wingdings" panose="05000000000000000000" pitchFamily="2" charset="2"/>
+              <a:buChar char="§"/>
+            </a:pPr>
+            <a:endParaRPr lang="pt-BR" sz="1320" b="1" dirty="0">
+              <a:solidFill>
+                <a:schemeClr val="tx1"/>
+              </a:solidFill>
+              <a:latin typeface="Exo 2 Medium" panose="00000600000000000000" pitchFamily="50" charset="0"/>
+              <a:cs typeface="Simplon BP Regular"/>
+            </a:endParaRPr>
+          </a:p>
+          <a:p>
+            <a:pPr marL="0" lvl="1" indent="-252049">
+              <a:buFont typeface="Wingdings" panose="05000000000000000000" pitchFamily="2" charset="2"/>
+              <a:buChar char="§"/>
+            </a:pPr>
+            <a:endParaRPr lang="pt-BR" sz="1320" b="1" dirty="0">
+              <a:solidFill>
+                <a:schemeClr val="tx1"/>
+              </a:solidFill>
+              <a:latin typeface="Exo 2 Medium" panose="00000600000000000000" pitchFamily="50" charset="0"/>
+              <a:cs typeface="Simplon BP Regular"/>
+            </a:endParaRPr>
+          </a:p>
+          <a:p>
+            <a:pPr marL="0" lvl="1"/>
+            <a:endParaRPr lang="pt-BR" sz="1320" b="1" dirty="0">
+              <a:solidFill>
+                <a:schemeClr val="tx1"/>
+              </a:solidFill>
+              <a:latin typeface="Exo 2 Medium" panose="00000600000000000000" pitchFamily="50" charset="0"/>
+              <a:cs typeface="Simplon BP Regular"/>
+            </a:endParaRPr>
+          </a:p>
+        </p:txBody>
+      </p:sp>
+      <p:sp>
+        <p:nvSpPr>
+          <p:cNvPr id="6" name="Oval 134">
+            <a:extLst>
+              <a:ext uri="{FF2B5EF4-FFF2-40B4-BE49-F238E27FC236}">
+                <a16:creationId xmlns:a16="http://schemas.microsoft.com/office/drawing/2014/main" id="{70825C6F-9257-4CF5-8C62-1CA1EB2F8815}"/>
+              </a:ext>
+            </a:extLst>
+          </p:cNvPr>
+          <p:cNvSpPr>
+            <a:spLocks noChangeAspect="1"/>
+          </p:cNvSpPr>
+          <p:nvPr/>
+        </p:nvSpPr>
+        <p:spPr>
+          <a:xfrm>
+            <a:off x="9323960" y="269355"/>
+            <a:ext cx="211404" cy="211689"/>
+          </a:xfrm>
+          <a:prstGeom prst="ellipse">
+            <a:avLst/>
+          </a:prstGeom>
+          <a:solidFill>
+            <a:srgbClr val="1BCF13"/>
+          </a:solidFill>
+          <a:ln w="12700">
+            <a:solidFill>
+              <a:schemeClr val="accent3"/>
+            </a:solidFill>
+          </a:ln>
+        </p:spPr>
+        <p:style>
+          <a:lnRef idx="2">
+            <a:schemeClr val="accent1">
+              <a:shade val="50000"/>
+            </a:schemeClr>
+          </a:lnRef>
+          <a:fillRef idx="1">
+            <a:schemeClr val="accent1"/>
+          </a:fillRef>
+          <a:effectRef idx="0">
+            <a:schemeClr val="accent1"/>
+          </a:effectRef>
+          <a:fontRef idx="minor">
+            <a:schemeClr val="lt1"/>
+          </a:fontRef>
+        </p:style>
+        <p:txBody>
+          <a:bodyPr wrap="none" lIns="52922" tIns="52922" rIns="52922" rtlCol="0" anchor="ctr"/>
+          <a:lstStyle/>
+          <a:p>
+            <a:pPr algn="ctr" defTabSz="672130"/>
+            <a:endParaRPr lang="en-US" sz="1176" dirty="0">
+              <a:ln>
+                <a:solidFill>
+                  <a:srgbClr val="00B050"/>
+                </a:solidFill>
+              </a:ln>
+              <a:solidFill>
+                <a:srgbClr val="1BCF13"/>
+              </a:solidFill>
+              <a:highlight>
+                <a:srgbClr val="FFFF00"/>
+              </a:highlight>
+              <a:latin typeface="Exo 2 Medium" panose="00000600000000000000" pitchFamily="50" charset="0"/>
+              <a:cs typeface="Simplon BP Regular"/>
+            </a:endParaRPr>
+          </a:p>
+        </p:txBody>
+      </p:sp>
+      <p:sp>
+        <p:nvSpPr>
+          <p:cNvPr id="9" name="Oval 134">
+            <a:extLst>
+              <a:ext uri="{FF2B5EF4-FFF2-40B4-BE49-F238E27FC236}">
+                <a16:creationId xmlns:a16="http://schemas.microsoft.com/office/drawing/2014/main" id="{B60B13C9-0C70-4C0F-82B2-D0CD4FDFC1F0}"/>
+              </a:ext>
+            </a:extLst>
+          </p:cNvPr>
+          <p:cNvSpPr>
+            <a:spLocks noChangeAspect="1"/>
+          </p:cNvSpPr>
+          <p:nvPr/>
+        </p:nvSpPr>
+        <p:spPr>
+          <a:xfrm>
+            <a:off x="12155999" y="297930"/>
+            <a:ext cx="211404" cy="211689"/>
+          </a:xfrm>
+          <a:prstGeom prst="ellipse">
+            <a:avLst/>
+          </a:prstGeom>
+          <a:solidFill>
+            <a:srgbClr val="1BCF13"/>
+          </a:solidFill>
+          <a:ln w="12700">
+            <a:solidFill>
+              <a:schemeClr val="accent3"/>
+            </a:solidFill>
+          </a:ln>
+        </p:spPr>
+        <p:style>
+          <a:lnRef idx="2">
+            <a:schemeClr val="accent1">
+              <a:shade val="50000"/>
+            </a:schemeClr>
+          </a:lnRef>
+          <a:fillRef idx="1">
+            <a:schemeClr val="accent1"/>
+          </a:fillRef>
+          <a:effectRef idx="0">
+            <a:schemeClr val="accent1"/>
+          </a:effectRef>
+          <a:fontRef idx="minor">
+            <a:schemeClr val="lt1"/>
+          </a:fontRef>
+        </p:style>
+        <p:txBody>
+          <a:bodyPr wrap="none" lIns="52922" tIns="52922" rIns="52922" rtlCol="0" anchor="ctr"/>
+          <a:lstStyle/>
+          <a:p>
+            <a:pPr algn="ctr" defTabSz="672130"/>
+            <a:endParaRPr lang="en-US" sz="1176" dirty="0">
+              <a:solidFill>
+                <a:prstClr val="black"/>
+              </a:solidFill>
+              <a:latin typeface="Exo 2 Medium" panose="00000600000000000000" pitchFamily="50" charset="0"/>
+              <a:cs typeface="Simplon BP Regular"/>
+            </a:endParaRPr>
+          </a:p>
+        </p:txBody>
+      </p:sp>
+      <p:sp>
+        <p:nvSpPr>
+          <p:cNvPr id="44" name="Oval 120">
+            <a:extLst>
+              <a:ext uri="{FF2B5EF4-FFF2-40B4-BE49-F238E27FC236}">
+                <a16:creationId xmlns:a16="http://schemas.microsoft.com/office/drawing/2014/main" id="{2688D066-DD5D-4246-B846-8AD1218C78EC}"/>
+              </a:ext>
+            </a:extLst>
+          </p:cNvPr>
+          <p:cNvSpPr>
+            <a:spLocks noChangeAspect="1"/>
+          </p:cNvSpPr>
+          <p:nvPr/>
+        </p:nvSpPr>
+        <p:spPr>
+          <a:xfrm>
+            <a:off x="10188056" y="297930"/>
+            <a:ext cx="211404" cy="211689"/>
+          </a:xfrm>
+          <a:prstGeom prst="ellipse">
+            <a:avLst/>
+          </a:prstGeom>
+          <a:solidFill>
+            <a:srgbClr val="1BCF13"/>
+          </a:solidFill>
+          <a:ln w="12700">
+            <a:solidFill>
+              <a:schemeClr val="accent3"/>
+            </a:solidFill>
+          </a:ln>
+        </p:spPr>
+        <p:style>
+          <a:lnRef idx="2">
+            <a:schemeClr val="accent1">
+              <a:shade val="50000"/>
+            </a:schemeClr>
+          </a:lnRef>
+          <a:fillRef idx="1">
+            <a:schemeClr val="accent1"/>
+          </a:fillRef>
+          <a:effectRef idx="0">
+            <a:schemeClr val="accent1"/>
+          </a:effectRef>
+          <a:fontRef idx="minor">
+            <a:schemeClr val="lt1"/>
+          </a:fontRef>
+        </p:style>
+        <p:txBody>
+          <a:bodyPr wrap="none" lIns="52922" tIns="52922" rIns="52922" rtlCol="0" anchor="ctr"/>
+          <a:lstStyle/>
+          <a:p>
+            <a:pPr algn="ctr" defTabSz="672130"/>
+            <a:endParaRPr lang="en-US" sz="1176" dirty="0">
+              <a:solidFill>
+                <a:prstClr val="black"/>
+              </a:solidFill>
+              <a:latin typeface="Exo 2 Medium" panose="00000600000000000000" pitchFamily="50" charset="0"/>
+              <a:cs typeface="Simplon BP Regular"/>
+            </a:endParaRPr>
+          </a:p>
+        </p:txBody>
+      </p:sp>
+      <p:sp>
+        <p:nvSpPr>
+          <p:cNvPr id="5" name="Retângulo 4">
+            <a:extLst>
+              <a:ext uri="{FF2B5EF4-FFF2-40B4-BE49-F238E27FC236}">
+                <a16:creationId xmlns:a16="http://schemas.microsoft.com/office/drawing/2014/main" id="{A1C14918-6027-46B3-96BF-C5F7FDEC3276}"/>
+              </a:ext>
+            </a:extLst>
+          </p:cNvPr>
+          <p:cNvSpPr/>
+          <p:nvPr/>
+        </p:nvSpPr>
+        <p:spPr>
+          <a:xfrm>
+            <a:off x="8017619" y="209534"/>
+            <a:ext cx="5041889" cy="618769"/>
+          </a:xfrm>
+          <a:prstGeom prst="rect">
+            <a:avLst/>
+          </a:prstGeom>
+          <a:noFill/>
+          <a:ln w="6350">
+            <a:solidFill>
+              <a:schemeClr val="bg1">
+                <a:lumMod val="75000"/>
+              </a:schemeClr>
+            </a:solidFill>
+          </a:ln>
+        </p:spPr>
+        <p:style>
+          <a:lnRef idx="2">
+            <a:schemeClr val="accent1">
+              <a:shade val="50000"/>
+            </a:schemeClr>
+          </a:lnRef>
+          <a:fillRef idx="1">
+            <a:schemeClr val="accent1"/>
+          </a:fillRef>
+          <a:effectRef idx="0">
+            <a:schemeClr val="accent1"/>
+          </a:effectRef>
+          <a:fontRef idx="minor">
+            <a:schemeClr val="lt1"/>
+          </a:fontRef>
+        </p:style>
+        <p:txBody>
+          <a:bodyPr rtlCol="0" anchor="ctr"/>
+          <a:lstStyle/>
+          <a:p>
+            <a:pPr algn="ctr"/>
+            <a:endParaRPr lang="pt-BR">
+              <a:latin typeface="Exo 2 Medium" panose="00000600000000000000" pitchFamily="50" charset="0"/>
+            </a:endParaRPr>
+          </a:p>
+        </p:txBody>
+      </p:sp>
+      <p:sp>
+        <p:nvSpPr>
+          <p:cNvPr id="8" name="TextBox 138">
+            <a:extLst>
+              <a:ext uri="{FF2B5EF4-FFF2-40B4-BE49-F238E27FC236}">
+                <a16:creationId xmlns:a16="http://schemas.microsoft.com/office/drawing/2014/main" id="{5CE7D08C-795B-4BF1-97F6-F9773F4E9F4C}"/>
+              </a:ext>
+            </a:extLst>
+          </p:cNvPr>
+          <p:cNvSpPr txBox="1"/>
+          <p:nvPr/>
+        </p:nvSpPr>
+        <p:spPr>
+          <a:xfrm>
+            <a:off x="9715810" y="51570"/>
+            <a:ext cx="1478088" cy="211688"/>
+          </a:xfrm>
+          <a:prstGeom prst="rect">
+            <a:avLst/>
+          </a:prstGeom>
+          <a:solidFill>
+            <a:schemeClr val="bg1"/>
+          </a:solidFill>
+          <a:ln w="12700">
+            <a:noFill/>
+          </a:ln>
+        </p:spPr>
+        <p:style>
+          <a:lnRef idx="2">
+            <a:schemeClr val="accent4"/>
+          </a:lnRef>
+          <a:fillRef idx="1">
+            <a:schemeClr val="lt1"/>
+          </a:fillRef>
+          <a:effectRef idx="0">
+            <a:schemeClr val="accent4"/>
+          </a:effectRef>
+          <a:fontRef idx="minor">
+            <a:schemeClr val="dk1"/>
+          </a:fontRef>
+        </p:style>
+        <p:txBody>
+          <a:bodyPr wrap="none" lIns="52922" tIns="52922" rIns="52922" bIns="0" rtlCol="0" anchor="b"/>
+          <a:lstStyle>
+            <a:defPPr>
+              <a:defRPr lang="en-US"/>
+            </a:defPPr>
+            <a:lvl1pPr algn="ctr">
+              <a:defRPr sz="1000" b="1">
+                <a:latin typeface="Simplon BP Regular"/>
+                <a:cs typeface="Simplon BP Regular"/>
+              </a:defRPr>
+            </a:lvl1pPr>
+            <a:lvl2pPr>
+              <a:defRPr>
+                <a:solidFill>
+                  <a:schemeClr val="dk1"/>
+                </a:solidFill>
+              </a:defRPr>
+            </a:lvl2pPr>
+            <a:lvl3pPr>
+              <a:defRPr>
+                <a:solidFill>
+                  <a:schemeClr val="dk1"/>
+                </a:solidFill>
+              </a:defRPr>
+            </a:lvl3pPr>
+            <a:lvl4pPr>
+              <a:defRPr>
+                <a:solidFill>
+                  <a:schemeClr val="dk1"/>
+                </a:solidFill>
+              </a:defRPr>
+            </a:lvl4pPr>
+            <a:lvl5pPr>
+              <a:defRPr>
+                <a:solidFill>
+                  <a:schemeClr val="dk1"/>
+                </a:solidFill>
+              </a:defRPr>
+            </a:lvl5pPr>
+            <a:lvl6pPr>
+              <a:defRPr>
+                <a:solidFill>
+                  <a:schemeClr val="dk1"/>
+                </a:solidFill>
+              </a:defRPr>
+            </a:lvl6pPr>
+            <a:lvl7pPr>
+              <a:defRPr>
+                <a:solidFill>
+                  <a:schemeClr val="dk1"/>
+                </a:solidFill>
+              </a:defRPr>
+            </a:lvl7pPr>
+            <a:lvl8pPr>
+              <a:defRPr>
+                <a:solidFill>
+                  <a:schemeClr val="dk1"/>
+                </a:solidFill>
+              </a:defRPr>
+            </a:lvl8pPr>
+            <a:lvl9pPr>
+              <a:defRPr>
+                <a:solidFill>
+                  <a:schemeClr val="dk1"/>
+                </a:solidFill>
+              </a:defRPr>
+            </a:lvl9pPr>
+          </a:lstStyle>
+          <a:p>
+            <a:pPr defTabSz="672130"/>
+            <a:r>
+              <a:rPr lang="en-US" sz="1176" b="0" dirty="0">
+                <a:solidFill>
+                  <a:prstClr val="black"/>
+                </a:solidFill>
+                <a:latin typeface="Exo 2 Medium" panose="00000600000000000000" pitchFamily="50" charset="0"/>
+              </a:rPr>
+              <a:t>    Farol do Projeto   </a:t>
+            </a:r>
+          </a:p>
+        </p:txBody>
+      </p:sp>
+    </p:spTree>
+    <p:extLst>
+      <p:ext uri="{BB962C8B-B14F-4D97-AF65-F5344CB8AC3E}">
+        <p14:creationId xmlns:p14="http://schemas.microsoft.com/office/powerpoint/2010/main" val="84309309"/>
       </p:ext>
     </p:extLst>
   </p:cSld>
@@ -39742,6 +41747,21 @@
 </file>
 
 <file path=customXml/item1.xml><?xml version="1.0" encoding="utf-8"?>
+<?mso-contentType ?>
+<FormTemplates xmlns="http://schemas.microsoft.com/sharepoint/v3/contenttype/forms">
+  <Display>DocumentLibraryForm</Display>
+  <Edit>DocumentLibraryForm</Edit>
+  <New>DocumentLibraryForm</New>
+</FormTemplates>
+</file>
+
+<file path=customXml/item2.xml><?xml version="1.0" encoding="utf-8"?>
+<p:properties xmlns:p="http://schemas.microsoft.com/office/2006/metadata/properties" xmlns:xsi="http://www.w3.org/2001/XMLSchema-instance" xmlns:pc="http://schemas.microsoft.com/office/infopath/2007/PartnerControls">
+  <documentManagement/>
+</p:properties>
+</file>
+
+<file path=customXml/item3.xml><?xml version="1.0" encoding="utf-8"?>
 <ct:contentTypeSchema xmlns:ct="http://schemas.microsoft.com/office/2006/metadata/contentType" xmlns:ma="http://schemas.microsoft.com/office/2006/metadata/properties/metaAttributes" ct:_="" ma:_="" ma:contentTypeName="Document" ma:contentTypeID="0x0101007F8ECE7139958D46ABEDA89D12B90CBF" ma:contentTypeVersion="0" ma:contentTypeDescription="Create a new document." ma:contentTypeScope="" ma:versionID="e6d660081116f63565d30cc13099d5ec">
   <xsd:schema xmlns:xsd="http://www.w3.org/2001/XMLSchema" xmlns:xs="http://www.w3.org/2001/XMLSchema" xmlns:p="http://schemas.microsoft.com/office/2006/metadata/properties" targetNamespace="http://schemas.microsoft.com/office/2006/metadata/properties" ma:root="true" ma:fieldsID="d413257cd9829394d17656a545d5fa4e">
     <xsd:element name="properties">
@@ -39855,33 +41875,10 @@
 </ct:contentTypeSchema>
 </file>
 
-<file path=customXml/item2.xml><?xml version="1.0" encoding="utf-8"?>
-<p:properties xmlns:p="http://schemas.microsoft.com/office/2006/metadata/properties" xmlns:xsi="http://www.w3.org/2001/XMLSchema-instance" xmlns:pc="http://schemas.microsoft.com/office/infopath/2007/PartnerControls">
-  <documentManagement/>
-</p:properties>
-</file>
-
-<file path=customXml/item3.xml><?xml version="1.0" encoding="utf-8"?>
-<?mso-contentType ?>
-<FormTemplates xmlns="http://schemas.microsoft.com/sharepoint/v3/contenttype/forms">
-  <Display>DocumentLibraryForm</Display>
-  <Edit>DocumentLibraryForm</Edit>
-  <New>DocumentLibraryForm</New>
-</FormTemplates>
-</file>
-
 <file path=customXml/itemProps1.xml><?xml version="1.0" encoding="utf-8"?>
-<ds:datastoreItem xmlns:ds="http://schemas.openxmlformats.org/officeDocument/2006/customXml" ds:itemID="{EFDE92A4-5D2A-451A-A373-EB014CDC0D59}">
+<ds:datastoreItem xmlns:ds="http://schemas.openxmlformats.org/officeDocument/2006/customXml" ds:itemID="{E2481852-F24E-4532-AF30-C154D705D105}">
   <ds:schemaRefs>
-    <ds:schemaRef ds:uri="http://schemas.microsoft.com/office/2006/metadata/contentType"/>
-    <ds:schemaRef ds:uri="http://schemas.microsoft.com/office/2006/metadata/properties/metaAttributes"/>
-    <ds:schemaRef ds:uri="http://www.w3.org/2001/XMLSchema"/>
-    <ds:schemaRef ds:uri="http://schemas.microsoft.com/office/2006/metadata/properties"/>
-    <ds:schemaRef ds:uri="http://schemas.openxmlformats.org/package/2006/metadata/core-properties"/>
-    <ds:schemaRef ds:uri="http://purl.org/dc/elements/1.1/"/>
-    <ds:schemaRef ds:uri="http://purl.org/dc/terms/"/>
-    <ds:schemaRef ds:uri="http://schemas.microsoft.com/internal/obd"/>
-    <ds:schemaRef ds:uri="http://schemas.microsoft.com/office/infopath/2007/PartnerControls"/>
+    <ds:schemaRef ds:uri="http://schemas.microsoft.com/sharepoint/v3/contenttype/forms"/>
   </ds:schemaRefs>
 </ds:datastoreItem>
 </file>
@@ -39904,9 +41901,17 @@
 </file>
 
 <file path=customXml/itemProps3.xml><?xml version="1.0" encoding="utf-8"?>
-<ds:datastoreItem xmlns:ds="http://schemas.openxmlformats.org/officeDocument/2006/customXml" ds:itemID="{E2481852-F24E-4532-AF30-C154D705D105}">
+<ds:datastoreItem xmlns:ds="http://schemas.openxmlformats.org/officeDocument/2006/customXml" ds:itemID="{EFDE92A4-5D2A-451A-A373-EB014CDC0D59}">
   <ds:schemaRefs>
-    <ds:schemaRef ds:uri="http://schemas.microsoft.com/sharepoint/v3/contenttype/forms"/>
+    <ds:schemaRef ds:uri="http://schemas.microsoft.com/office/2006/metadata/contentType"/>
+    <ds:schemaRef ds:uri="http://schemas.microsoft.com/office/2006/metadata/properties/metaAttributes"/>
+    <ds:schemaRef ds:uri="http://www.w3.org/2001/XMLSchema"/>
+    <ds:schemaRef ds:uri="http://schemas.microsoft.com/office/2006/metadata/properties"/>
+    <ds:schemaRef ds:uri="http://schemas.openxmlformats.org/package/2006/metadata/core-properties"/>
+    <ds:schemaRef ds:uri="http://purl.org/dc/elements/1.1/"/>
+    <ds:schemaRef ds:uri="http://purl.org/dc/terms/"/>
+    <ds:schemaRef ds:uri="http://schemas.microsoft.com/internal/obd"/>
+    <ds:schemaRef ds:uri="http://schemas.microsoft.com/office/infopath/2007/PartnerControls"/>
   </ds:schemaRefs>
 </ds:datastoreItem>
 </file>
</xml_diff>